<commit_message>
[ADDITIVE] Added indirect interfaces in component editor and validation. [PERFECTIVE] Updated help.
</commit_message>
<xml_diff>
--- a/Help/images/img_sources.pptx
+++ b/Help/images/img_sources.pptx
@@ -17,9 +17,10 @@
     <p:sldId id="260" r:id="rId11"/>
     <p:sldId id="270" r:id="rId12"/>
     <p:sldId id="264" r:id="rId13"/>
-    <p:sldId id="265" r:id="rId14"/>
-    <p:sldId id="266" r:id="rId15"/>
-    <p:sldId id="267" r:id="rId16"/>
+    <p:sldId id="271" r:id="rId14"/>
+    <p:sldId id="265" r:id="rId15"/>
+    <p:sldId id="266" r:id="rId16"/>
+    <p:sldId id="267" r:id="rId17"/>
   </p:sldIdLst>
   <p:sldSz cx="9144000" cy="6858000" type="screen4x3"/>
   <p:notesSz cx="6858000" cy="9144000"/>
@@ -118,6 +119,22 @@
       </a:defRPr>
     </a:lvl9pPr>
   </p:defaultTextStyle>
+  <p:extLst>
+    <p:ext uri="{EFAFB233-063F-42B5-8137-9DF3F51BA10A}">
+      <p15:sldGuideLst xmlns:p15="http://schemas.microsoft.com/office/powerpoint/2012/main">
+        <p15:guide id="1" orient="horz" pos="2160">
+          <p15:clr>
+            <a:srgbClr val="A4A3A4"/>
+          </p15:clr>
+        </p15:guide>
+        <p15:guide id="2" pos="2880">
+          <p15:clr>
+            <a:srgbClr val="A4A3A4"/>
+          </p15:clr>
+        </p15:guide>
+      </p15:sldGuideLst>
+    </p:ext>
+  </p:extLst>
 </p:presentation>
 </file>
 
@@ -302,7 +319,7 @@
           <a:p>
             <a:fld id="{54379204-0DE5-4A8F-A5DB-A53F02487498}" type="datetimeFigureOut">
               <a:rPr lang="en-US" smtClean="0"/>
-              <a:t>4/2/2013</a:t>
+              <a:t>8/4/2017</a:t>
             </a:fld>
             <a:endParaRPr lang="en-US"/>
           </a:p>
@@ -472,7 +489,7 @@
           <a:p>
             <a:fld id="{54379204-0DE5-4A8F-A5DB-A53F02487498}" type="datetimeFigureOut">
               <a:rPr lang="en-US" smtClean="0"/>
-              <a:t>4/2/2013</a:t>
+              <a:t>8/4/2017</a:t>
             </a:fld>
             <a:endParaRPr lang="en-US"/>
           </a:p>
@@ -652,7 +669,7 @@
           <a:p>
             <a:fld id="{54379204-0DE5-4A8F-A5DB-A53F02487498}" type="datetimeFigureOut">
               <a:rPr lang="en-US" smtClean="0"/>
-              <a:t>4/2/2013</a:t>
+              <a:t>8/4/2017</a:t>
             </a:fld>
             <a:endParaRPr lang="en-US"/>
           </a:p>
@@ -822,7 +839,7 @@
           <a:p>
             <a:fld id="{54379204-0DE5-4A8F-A5DB-A53F02487498}" type="datetimeFigureOut">
               <a:rPr lang="en-US" smtClean="0"/>
-              <a:t>4/2/2013</a:t>
+              <a:t>8/4/2017</a:t>
             </a:fld>
             <a:endParaRPr lang="en-US"/>
           </a:p>
@@ -1068,7 +1085,7 @@
           <a:p>
             <a:fld id="{54379204-0DE5-4A8F-A5DB-A53F02487498}" type="datetimeFigureOut">
               <a:rPr lang="en-US" smtClean="0"/>
-              <a:t>4/2/2013</a:t>
+              <a:t>8/4/2017</a:t>
             </a:fld>
             <a:endParaRPr lang="en-US"/>
           </a:p>
@@ -1356,7 +1373,7 @@
           <a:p>
             <a:fld id="{54379204-0DE5-4A8F-A5DB-A53F02487498}" type="datetimeFigureOut">
               <a:rPr lang="en-US" smtClean="0"/>
-              <a:t>4/2/2013</a:t>
+              <a:t>8/4/2017</a:t>
             </a:fld>
             <a:endParaRPr lang="en-US"/>
           </a:p>
@@ -1778,7 +1795,7 @@
           <a:p>
             <a:fld id="{54379204-0DE5-4A8F-A5DB-A53F02487498}" type="datetimeFigureOut">
               <a:rPr lang="en-US" smtClean="0"/>
-              <a:t>4/2/2013</a:t>
+              <a:t>8/4/2017</a:t>
             </a:fld>
             <a:endParaRPr lang="en-US"/>
           </a:p>
@@ -1896,7 +1913,7 @@
           <a:p>
             <a:fld id="{54379204-0DE5-4A8F-A5DB-A53F02487498}" type="datetimeFigureOut">
               <a:rPr lang="en-US" smtClean="0"/>
-              <a:t>4/2/2013</a:t>
+              <a:t>8/4/2017</a:t>
             </a:fld>
             <a:endParaRPr lang="en-US"/>
           </a:p>
@@ -1991,7 +2008,7 @@
           <a:p>
             <a:fld id="{54379204-0DE5-4A8F-A5DB-A53F02487498}" type="datetimeFigureOut">
               <a:rPr lang="en-US" smtClean="0"/>
-              <a:t>4/2/2013</a:t>
+              <a:t>8/4/2017</a:t>
             </a:fld>
             <a:endParaRPr lang="en-US"/>
           </a:p>
@@ -2268,7 +2285,7 @@
           <a:p>
             <a:fld id="{54379204-0DE5-4A8F-A5DB-A53F02487498}" type="datetimeFigureOut">
               <a:rPr lang="en-US" smtClean="0"/>
-              <a:t>4/2/2013</a:t>
+              <a:t>8/4/2017</a:t>
             </a:fld>
             <a:endParaRPr lang="en-US"/>
           </a:p>
@@ -2521,7 +2538,7 @@
           <a:p>
             <a:fld id="{54379204-0DE5-4A8F-A5DB-A53F02487498}" type="datetimeFigureOut">
               <a:rPr lang="en-US" smtClean="0"/>
-              <a:t>4/2/2013</a:t>
+              <a:t>8/4/2017</a:t>
             </a:fld>
             <a:endParaRPr lang="en-US"/>
           </a:p>
@@ -2734,7 +2751,7 @@
           <a:p>
             <a:fld id="{54379204-0DE5-4A8F-A5DB-A53F02487498}" type="datetimeFigureOut">
               <a:rPr lang="en-US" smtClean="0"/>
-              <a:t>4/2/2013</a:t>
+              <a:t>8/4/2017</a:t>
             </a:fld>
             <a:endParaRPr lang="en-US"/>
           </a:p>
@@ -3627,12 +3644,8 @@
           <a:lstStyle/>
           <a:p>
             <a:r>
-              <a:rPr lang="fi-FI" dirty="0" err="1" smtClean="0"/>
-              <a:t>Address</a:t>
-            </a:r>
-            <a:r>
               <a:rPr lang="fi-FI" dirty="0" smtClean="0"/>
-              <a:t> </a:t>
+              <a:t>Address </a:t>
             </a:r>
             <a:r>
               <a:rPr lang="fi-FI" dirty="0" err="1" smtClean="0"/>
@@ -3855,7 +3868,7 @@
             <a:avLst/>
           </a:prstGeom>
           <a:solidFill>
-            <a:srgbClr val="00B050"/>
+            <a:srgbClr val="32CBCB"/>
           </a:solidFill>
           <a:ln>
             <a:solidFill>
@@ -3911,7 +3924,7 @@
           <a:lstStyle/>
           <a:p>
             <a:r>
-              <a:rPr lang="fi-FI" sz="1200" i="1" dirty="0" err="1" smtClean="0"/>
+              <a:rPr lang="fi-FI" sz="1200" i="1" dirty="0" smtClean="0"/>
               <a:t>master</a:t>
             </a:r>
             <a:r>
@@ -3989,12 +4002,8 @@
           <a:lstStyle/>
           <a:p>
             <a:r>
-              <a:rPr lang="fi-FI" sz="1200" i="1" dirty="0" err="1" smtClean="0"/>
-              <a:t>addr</a:t>
-            </a:r>
-            <a:r>
               <a:rPr lang="fi-FI" sz="1200" i="1" dirty="0" smtClean="0"/>
-              <a:t> </a:t>
+              <a:t>addr </a:t>
             </a:r>
             <a:r>
               <a:rPr lang="fi-FI" sz="1200" i="1" dirty="0" err="1" smtClean="0"/>
@@ -6115,20 +6124,12 @@
           <a:p>
             <a:pPr algn="ctr"/>
             <a:r>
-              <a:rPr lang="fi-FI" sz="1100" i="1" dirty="0" err="1" smtClean="0">
+              <a:rPr lang="fi-FI" sz="1100" i="1" dirty="0" smtClean="0">
                 <a:solidFill>
                   <a:schemeClr val="tx1"/>
                 </a:solidFill>
               </a:rPr>
-              <a:t>Addr</a:t>
-            </a:r>
-            <a:r>
-              <a:rPr lang="fi-FI" sz="1100" i="1" dirty="0" smtClean="0">
-                <a:solidFill>
-                  <a:schemeClr val="tx1"/>
-                </a:solidFill>
-              </a:rPr>
-              <a:t> </a:t>
+              <a:t>Addr </a:t>
             </a:r>
             <a:r>
               <a:rPr lang="fi-FI" sz="1100" i="1" dirty="0" err="1" smtClean="0">
@@ -6660,12 +6661,36 @@
           <a:p>
             <a:pPr algn="ctr"/>
             <a:r>
+              <a:rPr lang="fi-FI" sz="1100" i="1" dirty="0" smtClean="0">
+                <a:solidFill>
+                  <a:schemeClr val="tx1"/>
+                </a:solidFill>
+              </a:rPr>
+              <a:t>Addr </a:t>
+            </a:r>
+            <a:r>
               <a:rPr lang="fi-FI" sz="1100" i="1" dirty="0" err="1" smtClean="0">
                 <a:solidFill>
                   <a:schemeClr val="tx1"/>
                 </a:solidFill>
               </a:rPr>
-              <a:t>Addr</a:t>
+              <a:t>space</a:t>
+            </a:r>
+            <a:r>
+              <a:rPr lang="fi-FI" sz="1100" i="1" dirty="0" smtClean="0">
+                <a:solidFill>
+                  <a:schemeClr val="tx1"/>
+                </a:solidFill>
+              </a:rPr>
+              <a:t> w/ </a:t>
+            </a:r>
+            <a:r>
+              <a:rPr lang="fi-FI" sz="1100" i="1" dirty="0" err="1" smtClean="0">
+                <a:solidFill>
+                  <a:schemeClr val="tx1"/>
+                </a:solidFill>
+              </a:rPr>
+              <a:t>local</a:t>
             </a:r>
             <a:r>
               <a:rPr lang="fi-FI" sz="1100" i="1" dirty="0" smtClean="0">
@@ -6681,7 +6706,7 @@
                   <a:schemeClr val="tx1"/>
                 </a:solidFill>
               </a:rPr>
-              <a:t>space</a:t>
+              <a:t>mem</a:t>
             </a:r>
             <a:r>
               <a:rPr lang="fi-FI" sz="1100" i="1" dirty="0" smtClean="0">
@@ -6689,55 +6714,7 @@
                   <a:schemeClr val="tx1"/>
                 </a:solidFill>
               </a:rPr>
-              <a:t> w/ </a:t>
-            </a:r>
-            <a:r>
-              <a:rPr lang="fi-FI" sz="1100" i="1" dirty="0" err="1" smtClean="0">
-                <a:solidFill>
-                  <a:schemeClr val="tx1"/>
-                </a:solidFill>
-              </a:rPr>
-              <a:t>local</a:t>
-            </a:r>
-            <a:r>
-              <a:rPr lang="fi-FI" sz="1100" i="1" dirty="0" smtClean="0">
-                <a:solidFill>
-                  <a:schemeClr val="tx1"/>
-                </a:solidFill>
-              </a:rPr>
-              <a:t> </a:t>
-            </a:r>
-            <a:r>
-              <a:rPr lang="fi-FI" sz="1100" i="1" dirty="0" err="1" smtClean="0">
-                <a:solidFill>
-                  <a:schemeClr val="tx1"/>
-                </a:solidFill>
-              </a:rPr>
-              <a:t>mem</a:t>
-            </a:r>
-            <a:r>
-              <a:rPr lang="fi-FI" sz="1100" i="1" dirty="0" smtClean="0">
-                <a:solidFill>
-                  <a:schemeClr val="tx1"/>
-                </a:solidFill>
-              </a:rPr>
-              <a:t> </a:t>
-            </a:r>
-            <a:r>
-              <a:rPr lang="fi-FI" sz="1100" i="1" dirty="0" err="1" smtClean="0">
-                <a:solidFill>
-                  <a:schemeClr val="tx1"/>
-                </a:solidFill>
-              </a:rPr>
-              <a:t>map</a:t>
-            </a:r>
-            <a:r>
-              <a:rPr lang="fi-FI" sz="1100" i="1" dirty="0" smtClean="0">
-                <a:solidFill>
-                  <a:schemeClr val="tx1"/>
-                </a:solidFill>
-              </a:rPr>
-              <a:t> AS1</a:t>
+              <a:t> map AS1</a:t>
             </a:r>
             <a:endParaRPr lang="en-US" sz="1100" i="1" dirty="0">
               <a:solidFill>
@@ -6986,15 +6963,7 @@
             </a:r>
             <a:r>
               <a:rPr lang="fi-FI" dirty="0" smtClean="0"/>
-              <a:t> </a:t>
-            </a:r>
-            <a:r>
-              <a:rPr lang="fi-FI" dirty="0" err="1" smtClean="0"/>
-              <a:t>interface</a:t>
-            </a:r>
-            <a:r>
-              <a:rPr lang="fi-FI" dirty="0" smtClean="0"/>
-              <a:t> and </a:t>
+              <a:t> interface and </a:t>
             </a:r>
             <a:r>
               <a:rPr lang="fi-FI" dirty="0" err="1" smtClean="0"/>
@@ -7238,12 +7207,8 @@
           <a:lstStyle/>
           <a:p>
             <a:r>
-              <a:rPr lang="fi-FI" sz="1200" i="1" dirty="0" err="1" smtClean="0"/>
-              <a:t>master</a:t>
-            </a:r>
-            <a:r>
               <a:rPr lang="fi-FI" sz="1200" i="1" dirty="0" smtClean="0"/>
-              <a:t>  </a:t>
+              <a:t>master  </a:t>
             </a:r>
             <a:r>
               <a:rPr lang="fi-FI" sz="1200" i="1" dirty="0" err="1" smtClean="0"/>
@@ -7251,11 +7216,7 @@
             </a:r>
             <a:r>
               <a:rPr lang="fi-FI" sz="1200" i="1" dirty="0" smtClean="0"/>
-              <a:t> </a:t>
-            </a:r>
-            <a:r>
-              <a:rPr lang="fi-FI" sz="1200" i="1" dirty="0" err="1" smtClean="0"/>
-              <a:t>interface</a:t>
+              <a:t> interface</a:t>
             </a:r>
             <a:r>
               <a:rPr lang="fi-FI" sz="1200" dirty="0" smtClean="0"/>
@@ -8613,6 +8574,1998 @@
           <a:lstStyle/>
           <a:p>
             <a:r>
+              <a:rPr lang="fi-FI" dirty="0" smtClean="0"/>
+              <a:t>Indirect </a:t>
+            </a:r>
+            <a:r>
+              <a:rPr lang="fi-FI" dirty="0" err="1" smtClean="0"/>
+              <a:t>interfaces</a:t>
+            </a:r>
+            <a:endParaRPr lang="en-US" dirty="0"/>
+          </a:p>
+        </p:txBody>
+      </p:sp>
+      <p:sp>
+        <p:nvSpPr>
+          <p:cNvPr id="47" name="Rectangle 46"/>
+          <p:cNvSpPr/>
+          <p:nvPr/>
+        </p:nvSpPr>
+        <p:spPr>
+          <a:xfrm>
+            <a:off x="1043609" y="1988840"/>
+            <a:ext cx="2012534" cy="2412268"/>
+          </a:xfrm>
+          <a:prstGeom prst="rect">
+            <a:avLst/>
+          </a:prstGeom>
+          <a:solidFill>
+            <a:srgbClr val="C3D0F0"/>
+          </a:solidFill>
+          <a:ln w="12700">
+            <a:solidFill>
+              <a:schemeClr val="tx1"/>
+            </a:solidFill>
+            <a:tailEnd type="none"/>
+          </a:ln>
+          <a:effectLst/>
+        </p:spPr>
+        <p:style>
+          <a:lnRef idx="1">
+            <a:schemeClr val="accent4"/>
+          </a:lnRef>
+          <a:fillRef idx="2">
+            <a:schemeClr val="accent4"/>
+          </a:fillRef>
+          <a:effectRef idx="1">
+            <a:schemeClr val="accent4"/>
+          </a:effectRef>
+          <a:fontRef idx="minor">
+            <a:schemeClr val="dk1"/>
+          </a:fontRef>
+        </p:style>
+        <p:txBody>
+          <a:bodyPr tIns="0" bIns="0" anchor="t" anchorCtr="0">
+            <a:noAutofit/>
+          </a:bodyPr>
+          <a:lstStyle>
+            <a:defPPr>
+              <a:defRPr lang="en-US"/>
+            </a:defPPr>
+            <a:lvl1pPr marL="0" algn="l" defTabSz="914400" rtl="0" eaLnBrk="1" latinLnBrk="0" hangingPunct="1">
+              <a:defRPr sz="1800" kern="1200">
+                <a:solidFill>
+                  <a:schemeClr val="dk1"/>
+                </a:solidFill>
+                <a:latin typeface="+mn-lt"/>
+                <a:ea typeface="+mn-ea"/>
+                <a:cs typeface="+mn-cs"/>
+              </a:defRPr>
+            </a:lvl1pPr>
+            <a:lvl2pPr marL="457200" algn="l" defTabSz="914400" rtl="0" eaLnBrk="1" latinLnBrk="0" hangingPunct="1">
+              <a:defRPr sz="1800" kern="1200">
+                <a:solidFill>
+                  <a:schemeClr val="dk1"/>
+                </a:solidFill>
+                <a:latin typeface="+mn-lt"/>
+                <a:ea typeface="+mn-ea"/>
+                <a:cs typeface="+mn-cs"/>
+              </a:defRPr>
+            </a:lvl2pPr>
+            <a:lvl3pPr marL="914400" algn="l" defTabSz="914400" rtl="0" eaLnBrk="1" latinLnBrk="0" hangingPunct="1">
+              <a:defRPr sz="1800" kern="1200">
+                <a:solidFill>
+                  <a:schemeClr val="dk1"/>
+                </a:solidFill>
+                <a:latin typeface="+mn-lt"/>
+                <a:ea typeface="+mn-ea"/>
+                <a:cs typeface="+mn-cs"/>
+              </a:defRPr>
+            </a:lvl3pPr>
+            <a:lvl4pPr marL="1371600" algn="l" defTabSz="914400" rtl="0" eaLnBrk="1" latinLnBrk="0" hangingPunct="1">
+              <a:defRPr sz="1800" kern="1200">
+                <a:solidFill>
+                  <a:schemeClr val="dk1"/>
+                </a:solidFill>
+                <a:latin typeface="+mn-lt"/>
+                <a:ea typeface="+mn-ea"/>
+                <a:cs typeface="+mn-cs"/>
+              </a:defRPr>
+            </a:lvl4pPr>
+            <a:lvl5pPr marL="1828800" algn="l" defTabSz="914400" rtl="0" eaLnBrk="1" latinLnBrk="0" hangingPunct="1">
+              <a:defRPr sz="1800" kern="1200">
+                <a:solidFill>
+                  <a:schemeClr val="dk1"/>
+                </a:solidFill>
+                <a:latin typeface="+mn-lt"/>
+                <a:ea typeface="+mn-ea"/>
+                <a:cs typeface="+mn-cs"/>
+              </a:defRPr>
+            </a:lvl5pPr>
+            <a:lvl6pPr marL="2286000" algn="l" defTabSz="914400" rtl="0" eaLnBrk="1" latinLnBrk="0" hangingPunct="1">
+              <a:defRPr sz="1800" kern="1200">
+                <a:solidFill>
+                  <a:schemeClr val="dk1"/>
+                </a:solidFill>
+                <a:latin typeface="+mn-lt"/>
+                <a:ea typeface="+mn-ea"/>
+                <a:cs typeface="+mn-cs"/>
+              </a:defRPr>
+            </a:lvl6pPr>
+            <a:lvl7pPr marL="2743200" algn="l" defTabSz="914400" rtl="0" eaLnBrk="1" latinLnBrk="0" hangingPunct="1">
+              <a:defRPr sz="1800" kern="1200">
+                <a:solidFill>
+                  <a:schemeClr val="dk1"/>
+                </a:solidFill>
+                <a:latin typeface="+mn-lt"/>
+                <a:ea typeface="+mn-ea"/>
+                <a:cs typeface="+mn-cs"/>
+              </a:defRPr>
+            </a:lvl7pPr>
+            <a:lvl8pPr marL="3200400" algn="l" defTabSz="914400" rtl="0" eaLnBrk="1" latinLnBrk="0" hangingPunct="1">
+              <a:defRPr sz="1800" kern="1200">
+                <a:solidFill>
+                  <a:schemeClr val="dk1"/>
+                </a:solidFill>
+                <a:latin typeface="+mn-lt"/>
+                <a:ea typeface="+mn-ea"/>
+                <a:cs typeface="+mn-cs"/>
+              </a:defRPr>
+            </a:lvl8pPr>
+            <a:lvl9pPr marL="3657600" algn="l" defTabSz="914400" rtl="0" eaLnBrk="1" latinLnBrk="0" hangingPunct="1">
+              <a:defRPr sz="1800" kern="1200">
+                <a:solidFill>
+                  <a:schemeClr val="dk1"/>
+                </a:solidFill>
+                <a:latin typeface="+mn-lt"/>
+                <a:ea typeface="+mn-ea"/>
+                <a:cs typeface="+mn-cs"/>
+              </a:defRPr>
+            </a:lvl9pPr>
+          </a:lstStyle>
+          <a:p>
+            <a:pPr algn="ctr" fontAlgn="base">
+              <a:spcBef>
+                <a:spcPct val="0"/>
+              </a:spcBef>
+              <a:spcAft>
+                <a:spcPct val="0"/>
+              </a:spcAft>
+            </a:pPr>
+            <a:r>
+              <a:rPr lang="fi-FI" sz="1200" b="1" i="1" dirty="0" smtClean="0">
+                <a:solidFill>
+                  <a:prstClr val="black"/>
+                </a:solidFill>
+                <a:latin typeface="Calibri" pitchFamily="34" charset="0"/>
+                <a:cs typeface="Calibri" pitchFamily="34" charset="0"/>
+              </a:rPr>
+              <a:t>component</a:t>
+            </a:r>
+            <a:r>
+              <a:rPr lang="fi-FI" sz="1200" b="1" dirty="0" smtClean="0">
+                <a:solidFill>
+                  <a:prstClr val="black"/>
+                </a:solidFill>
+                <a:latin typeface="Calibri" pitchFamily="34" charset="0"/>
+                <a:cs typeface="Calibri" pitchFamily="34" charset="0"/>
+              </a:rPr>
+              <a:t> </a:t>
+            </a:r>
+            <a:r>
+              <a:rPr lang="fi-FI" sz="1200" b="1" dirty="0" smtClean="0">
+                <a:solidFill>
+                  <a:prstClr val="black"/>
+                </a:solidFill>
+                <a:latin typeface="Calibri" pitchFamily="34" charset="0"/>
+                <a:cs typeface="Calibri" pitchFamily="34" charset="0"/>
+              </a:rPr>
+              <a:t>Accelerator</a:t>
+            </a:r>
+            <a:endParaRPr lang="fi-FI" sz="1200" b="1" dirty="0" smtClean="0">
+              <a:solidFill>
+                <a:prstClr val="black"/>
+              </a:solidFill>
+              <a:latin typeface="Calibri" pitchFamily="34" charset="0"/>
+              <a:cs typeface="Calibri" pitchFamily="34" charset="0"/>
+            </a:endParaRPr>
+          </a:p>
+        </p:txBody>
+      </p:sp>
+      <p:sp>
+        <p:nvSpPr>
+          <p:cNvPr id="48" name="Flowchart: Off-page Connector 47"/>
+          <p:cNvSpPr/>
+          <p:nvPr/>
+        </p:nvSpPr>
+        <p:spPr>
+          <a:xfrm rot="16200000">
+            <a:off x="894390" y="2488749"/>
+            <a:ext cx="360040" cy="360000"/>
+          </a:xfrm>
+          <a:prstGeom prst="flowChartOffpageConnector">
+            <a:avLst/>
+          </a:prstGeom>
+          <a:solidFill>
+            <a:srgbClr val="329964"/>
+          </a:solidFill>
+          <a:ln>
+            <a:solidFill>
+              <a:schemeClr val="tx1"/>
+            </a:solidFill>
+          </a:ln>
+        </p:spPr>
+        <p:style>
+          <a:lnRef idx="2">
+            <a:schemeClr val="accent1">
+              <a:shade val="50000"/>
+            </a:schemeClr>
+          </a:lnRef>
+          <a:fillRef idx="1">
+            <a:schemeClr val="accent1"/>
+          </a:fillRef>
+          <a:effectRef idx="0">
+            <a:schemeClr val="accent1"/>
+          </a:effectRef>
+          <a:fontRef idx="minor">
+            <a:schemeClr val="lt1"/>
+          </a:fontRef>
+        </p:style>
+        <p:txBody>
+          <a:bodyPr rtlCol="0" anchor="ctr"/>
+          <a:lstStyle/>
+          <a:p>
+            <a:pPr algn="ctr"/>
+            <a:endParaRPr lang="en-US" sz="1200"/>
+          </a:p>
+        </p:txBody>
+      </p:sp>
+      <p:sp>
+        <p:nvSpPr>
+          <p:cNvPr id="49" name="TextBox 48"/>
+          <p:cNvSpPr txBox="1"/>
+          <p:nvPr/>
+        </p:nvSpPr>
+        <p:spPr>
+          <a:xfrm>
+            <a:off x="1962752" y="2114736"/>
+            <a:ext cx="1012119" cy="461665"/>
+          </a:xfrm>
+          <a:prstGeom prst="rect">
+            <a:avLst/>
+          </a:prstGeom>
+          <a:noFill/>
+        </p:spPr>
+        <p:txBody>
+          <a:bodyPr wrap="square" rtlCol="0">
+            <a:spAutoFit/>
+          </a:bodyPr>
+          <a:lstStyle/>
+          <a:p>
+            <a:r>
+              <a:rPr lang="fi-FI" sz="1200" i="1" dirty="0" smtClean="0"/>
+              <a:t>memory map</a:t>
+            </a:r>
+            <a:r>
+              <a:rPr lang="fi-FI" sz="1200" dirty="0" smtClean="0"/>
+              <a:t> </a:t>
+            </a:r>
+            <a:r>
+              <a:rPr lang="fi-FI" sz="1200" dirty="0" smtClean="0"/>
+              <a:t>MM0</a:t>
+            </a:r>
+            <a:endParaRPr lang="en-US" sz="1200" dirty="0"/>
+          </a:p>
+        </p:txBody>
+      </p:sp>
+      <p:sp>
+        <p:nvSpPr>
+          <p:cNvPr id="51" name="Flowchart: Process 50"/>
+          <p:cNvSpPr/>
+          <p:nvPr/>
+        </p:nvSpPr>
+        <p:spPr>
+          <a:xfrm>
+            <a:off x="2059547" y="2527360"/>
+            <a:ext cx="720000" cy="144000"/>
+          </a:xfrm>
+          <a:prstGeom prst="flowChartProcess">
+            <a:avLst/>
+          </a:prstGeom>
+          <a:solidFill>
+            <a:schemeClr val="bg1"/>
+          </a:solidFill>
+        </p:spPr>
+        <p:style>
+          <a:lnRef idx="2">
+            <a:schemeClr val="accent1">
+              <a:shade val="50000"/>
+            </a:schemeClr>
+          </a:lnRef>
+          <a:fillRef idx="1">
+            <a:schemeClr val="accent1"/>
+          </a:fillRef>
+          <a:effectRef idx="0">
+            <a:schemeClr val="accent1"/>
+          </a:effectRef>
+          <a:fontRef idx="minor">
+            <a:schemeClr val="lt1"/>
+          </a:fontRef>
+        </p:style>
+        <p:txBody>
+          <a:bodyPr rtlCol="0" anchor="ctr"/>
+          <a:lstStyle/>
+          <a:p>
+            <a:pPr algn="ctr"/>
+            <a:endParaRPr lang="en-US" sz="1200" dirty="0"/>
+          </a:p>
+        </p:txBody>
+      </p:sp>
+      <p:sp>
+        <p:nvSpPr>
+          <p:cNvPr id="53" name="Flowchart: Process 52"/>
+          <p:cNvSpPr/>
+          <p:nvPr/>
+        </p:nvSpPr>
+        <p:spPr>
+          <a:xfrm>
+            <a:off x="2059547" y="2671392"/>
+            <a:ext cx="720000" cy="144000"/>
+          </a:xfrm>
+          <a:prstGeom prst="flowChartProcess">
+            <a:avLst/>
+          </a:prstGeom>
+          <a:solidFill>
+            <a:schemeClr val="bg1"/>
+          </a:solidFill>
+        </p:spPr>
+        <p:style>
+          <a:lnRef idx="2">
+            <a:schemeClr val="accent1">
+              <a:shade val="50000"/>
+            </a:schemeClr>
+          </a:lnRef>
+          <a:fillRef idx="1">
+            <a:schemeClr val="accent1"/>
+          </a:fillRef>
+          <a:effectRef idx="0">
+            <a:schemeClr val="accent1"/>
+          </a:effectRef>
+          <a:fontRef idx="minor">
+            <a:schemeClr val="lt1"/>
+          </a:fontRef>
+        </p:style>
+        <p:txBody>
+          <a:bodyPr rtlCol="0" anchor="ctr"/>
+          <a:lstStyle/>
+          <a:p>
+            <a:pPr algn="ctr"/>
+            <a:endParaRPr lang="en-US" sz="1200" dirty="0"/>
+          </a:p>
+        </p:txBody>
+      </p:sp>
+      <p:sp>
+        <p:nvSpPr>
+          <p:cNvPr id="54" name="TextBox 53"/>
+          <p:cNvSpPr txBox="1"/>
+          <p:nvPr/>
+        </p:nvSpPr>
+        <p:spPr>
+          <a:xfrm>
+            <a:off x="2271925" y="2470685"/>
+            <a:ext cx="295274" cy="246221"/>
+          </a:xfrm>
+          <a:prstGeom prst="rect">
+            <a:avLst/>
+          </a:prstGeom>
+          <a:noFill/>
+        </p:spPr>
+        <p:txBody>
+          <a:bodyPr wrap="none" rtlCol="0">
+            <a:spAutoFit/>
+          </a:bodyPr>
+          <a:lstStyle/>
+          <a:p>
+            <a:r>
+              <a:rPr lang="fi-FI" sz="1000" dirty="0" smtClean="0"/>
+              <a:t>r0</a:t>
+            </a:r>
+            <a:endParaRPr lang="en-US" sz="1000" dirty="0"/>
+          </a:p>
+        </p:txBody>
+      </p:sp>
+      <p:sp>
+        <p:nvSpPr>
+          <p:cNvPr id="55" name="TextBox 54"/>
+          <p:cNvSpPr txBox="1"/>
+          <p:nvPr/>
+        </p:nvSpPr>
+        <p:spPr>
+          <a:xfrm>
+            <a:off x="2271925" y="2618322"/>
+            <a:ext cx="295274" cy="246221"/>
+          </a:xfrm>
+          <a:prstGeom prst="rect">
+            <a:avLst/>
+          </a:prstGeom>
+          <a:noFill/>
+        </p:spPr>
+        <p:txBody>
+          <a:bodyPr wrap="none" rtlCol="0">
+            <a:spAutoFit/>
+          </a:bodyPr>
+          <a:lstStyle/>
+          <a:p>
+            <a:r>
+              <a:rPr lang="fi-FI" sz="1000" dirty="0" smtClean="0"/>
+              <a:t>r1</a:t>
+            </a:r>
+            <a:endParaRPr lang="en-US" sz="1000" dirty="0"/>
+          </a:p>
+        </p:txBody>
+      </p:sp>
+      <p:sp>
+        <p:nvSpPr>
+          <p:cNvPr id="58" name="Left-Right Arrow 57"/>
+          <p:cNvSpPr/>
+          <p:nvPr/>
+        </p:nvSpPr>
+        <p:spPr>
+          <a:xfrm>
+            <a:off x="1301629" y="2557032"/>
+            <a:ext cx="696503" cy="215804"/>
+          </a:xfrm>
+          <a:prstGeom prst="leftRightArrow">
+            <a:avLst/>
+          </a:prstGeom>
+          <a:solidFill>
+            <a:schemeClr val="bg1"/>
+          </a:solidFill>
+        </p:spPr>
+        <p:style>
+          <a:lnRef idx="2">
+            <a:schemeClr val="accent1">
+              <a:shade val="50000"/>
+            </a:schemeClr>
+          </a:lnRef>
+          <a:fillRef idx="1">
+            <a:schemeClr val="accent1"/>
+          </a:fillRef>
+          <a:effectRef idx="0">
+            <a:schemeClr val="accent1"/>
+          </a:effectRef>
+          <a:fontRef idx="minor">
+            <a:schemeClr val="lt1"/>
+          </a:fontRef>
+        </p:style>
+        <p:txBody>
+          <a:bodyPr rtlCol="0" anchor="ctr"/>
+          <a:lstStyle/>
+          <a:p>
+            <a:pPr algn="ctr"/>
+            <a:endParaRPr lang="en-US" sz="1200" dirty="0"/>
+          </a:p>
+        </p:txBody>
+      </p:sp>
+      <p:sp>
+        <p:nvSpPr>
+          <p:cNvPr id="69" name="TextBox 68"/>
+          <p:cNvSpPr txBox="1"/>
+          <p:nvPr/>
+        </p:nvSpPr>
+        <p:spPr>
+          <a:xfrm>
+            <a:off x="1962752" y="3346374"/>
+            <a:ext cx="1102218" cy="461665"/>
+          </a:xfrm>
+          <a:prstGeom prst="rect">
+            <a:avLst/>
+          </a:prstGeom>
+          <a:noFill/>
+        </p:spPr>
+        <p:txBody>
+          <a:bodyPr wrap="square" rtlCol="0">
+            <a:spAutoFit/>
+          </a:bodyPr>
+          <a:lstStyle/>
+          <a:p>
+            <a:r>
+              <a:rPr lang="fi-FI" sz="1200" i="1" dirty="0" smtClean="0"/>
+              <a:t>memory </a:t>
+            </a:r>
+            <a:r>
+              <a:rPr lang="fi-FI" sz="1200" i="1" dirty="0" smtClean="0"/>
+              <a:t>map</a:t>
+            </a:r>
+            <a:r>
+              <a:rPr lang="fi-FI" sz="1200" dirty="0" smtClean="0"/>
+              <a:t> </a:t>
+            </a:r>
+            <a:r>
+              <a:rPr lang="fi-FI" sz="1200" dirty="0" smtClean="0"/>
+              <a:t>MM1</a:t>
+            </a:r>
+            <a:endParaRPr lang="en-US" sz="1200" dirty="0"/>
+          </a:p>
+        </p:txBody>
+      </p:sp>
+      <p:sp>
+        <p:nvSpPr>
+          <p:cNvPr id="73" name="Flowchart: Off-page Connector 72"/>
+          <p:cNvSpPr/>
+          <p:nvPr/>
+        </p:nvSpPr>
+        <p:spPr>
+          <a:xfrm rot="16200000" flipH="1">
+            <a:off x="1283122" y="3885231"/>
+            <a:ext cx="360040" cy="360000"/>
+          </a:xfrm>
+          <a:prstGeom prst="flowChartOffpageConnector">
+            <a:avLst/>
+          </a:prstGeom>
+          <a:solidFill>
+            <a:schemeClr val="bg1">
+              <a:lumMod val="65000"/>
+            </a:schemeClr>
+          </a:solidFill>
+          <a:ln>
+            <a:solidFill>
+              <a:schemeClr val="tx1"/>
+            </a:solidFill>
+          </a:ln>
+        </p:spPr>
+        <p:style>
+          <a:lnRef idx="2">
+            <a:schemeClr val="accent1">
+              <a:shade val="50000"/>
+            </a:schemeClr>
+          </a:lnRef>
+          <a:fillRef idx="1">
+            <a:schemeClr val="accent1"/>
+          </a:fillRef>
+          <a:effectRef idx="0">
+            <a:schemeClr val="accent1"/>
+          </a:effectRef>
+          <a:fontRef idx="minor">
+            <a:schemeClr val="lt1"/>
+          </a:fontRef>
+        </p:style>
+        <p:txBody>
+          <a:bodyPr rtlCol="0" anchor="ctr"/>
+          <a:lstStyle/>
+          <a:p>
+            <a:pPr algn="ctr"/>
+            <a:endParaRPr lang="en-US" sz="1200" dirty="0"/>
+          </a:p>
+        </p:txBody>
+      </p:sp>
+      <p:sp>
+        <p:nvSpPr>
+          <p:cNvPr id="74" name="TextBox 73"/>
+          <p:cNvSpPr txBox="1"/>
+          <p:nvPr/>
+        </p:nvSpPr>
+        <p:spPr>
+          <a:xfrm>
+            <a:off x="1095198" y="3345151"/>
+            <a:ext cx="924099" cy="461665"/>
+          </a:xfrm>
+          <a:prstGeom prst="rect">
+            <a:avLst/>
+          </a:prstGeom>
+          <a:noFill/>
+        </p:spPr>
+        <p:txBody>
+          <a:bodyPr wrap="none" rtlCol="0">
+            <a:spAutoFit/>
+          </a:bodyPr>
+          <a:lstStyle/>
+          <a:p>
+            <a:r>
+              <a:rPr lang="fi-FI" sz="1200" i="1" dirty="0" smtClean="0"/>
+              <a:t>Indirect </a:t>
+            </a:r>
+          </a:p>
+          <a:p>
+            <a:r>
+              <a:rPr lang="fi-FI" sz="1200" i="1" dirty="0" smtClean="0"/>
+              <a:t>interface </a:t>
+            </a:r>
+            <a:r>
+              <a:rPr lang="fi-FI" sz="1200" dirty="0" smtClean="0"/>
+              <a:t>II0</a:t>
+            </a:r>
+            <a:endParaRPr lang="en-US" sz="1200" dirty="0"/>
+          </a:p>
+        </p:txBody>
+      </p:sp>
+      <p:cxnSp>
+        <p:nvCxnSpPr>
+          <p:cNvPr id="76" name="Elbow Connector 75"/>
+          <p:cNvCxnSpPr>
+            <a:stCxn id="51" idx="3"/>
+            <a:endCxn id="73" idx="0"/>
+          </p:cNvCxnSpPr>
+          <p:nvPr/>
+        </p:nvCxnSpPr>
+        <p:spPr>
+          <a:xfrm flipH="1">
+            <a:off x="1283142" y="2599359"/>
+            <a:ext cx="1496405" cy="1404000"/>
+          </a:xfrm>
+          <a:prstGeom prst="bentConnector5">
+            <a:avLst>
+              <a:gd name="adj1" fmla="val -14428"/>
+              <a:gd name="adj2" fmla="val 41162"/>
+              <a:gd name="adj3" fmla="val 109337"/>
+            </a:avLst>
+          </a:prstGeom>
+          <a:ln>
+            <a:solidFill>
+              <a:schemeClr val="tx1"/>
+            </a:solidFill>
+            <a:tailEnd type="triangle"/>
+          </a:ln>
+        </p:spPr>
+        <p:style>
+          <a:lnRef idx="1">
+            <a:schemeClr val="accent1"/>
+          </a:lnRef>
+          <a:fillRef idx="0">
+            <a:schemeClr val="accent1"/>
+          </a:fillRef>
+          <a:effectRef idx="0">
+            <a:schemeClr val="accent1"/>
+          </a:effectRef>
+          <a:fontRef idx="minor">
+            <a:schemeClr val="tx1"/>
+          </a:fontRef>
+        </p:style>
+      </p:cxnSp>
+      <p:cxnSp>
+        <p:nvCxnSpPr>
+          <p:cNvPr id="80" name="Elbow Connector 79"/>
+          <p:cNvCxnSpPr>
+            <a:stCxn id="53" idx="3"/>
+            <a:endCxn id="73" idx="0"/>
+          </p:cNvCxnSpPr>
+          <p:nvPr/>
+        </p:nvCxnSpPr>
+        <p:spPr>
+          <a:xfrm flipH="1">
+            <a:off x="1283142" y="2743392"/>
+            <a:ext cx="1496405" cy="1404000"/>
+          </a:xfrm>
+          <a:prstGeom prst="bentConnector5">
+            <a:avLst>
+              <a:gd name="adj1" fmla="val -10609"/>
+              <a:gd name="adj2" fmla="val 18326"/>
+              <a:gd name="adj3" fmla="val 112731"/>
+            </a:avLst>
+          </a:prstGeom>
+          <a:ln>
+            <a:solidFill>
+              <a:schemeClr val="tx1"/>
+            </a:solidFill>
+            <a:tailEnd type="triangle"/>
+          </a:ln>
+        </p:spPr>
+        <p:style>
+          <a:lnRef idx="1">
+            <a:schemeClr val="accent1"/>
+          </a:lnRef>
+          <a:fillRef idx="0">
+            <a:schemeClr val="accent1"/>
+          </a:fillRef>
+          <a:effectRef idx="0">
+            <a:schemeClr val="accent1"/>
+          </a:effectRef>
+          <a:fontRef idx="minor">
+            <a:schemeClr val="tx1"/>
+          </a:fontRef>
+        </p:style>
+      </p:cxnSp>
+      <p:sp>
+        <p:nvSpPr>
+          <p:cNvPr id="118" name="Left-Right Arrow 117"/>
+          <p:cNvSpPr/>
+          <p:nvPr/>
+        </p:nvSpPr>
+        <p:spPr>
+          <a:xfrm>
+            <a:off x="1691268" y="3962936"/>
+            <a:ext cx="324233" cy="215804"/>
+          </a:xfrm>
+          <a:prstGeom prst="leftRightArrow">
+            <a:avLst/>
+          </a:prstGeom>
+          <a:solidFill>
+            <a:schemeClr val="bg1"/>
+          </a:solidFill>
+        </p:spPr>
+        <p:style>
+          <a:lnRef idx="2">
+            <a:schemeClr val="accent1">
+              <a:shade val="50000"/>
+            </a:schemeClr>
+          </a:lnRef>
+          <a:fillRef idx="1">
+            <a:schemeClr val="accent1"/>
+          </a:fillRef>
+          <a:effectRef idx="0">
+            <a:schemeClr val="accent1"/>
+          </a:effectRef>
+          <a:fontRef idx="minor">
+            <a:schemeClr val="lt1"/>
+          </a:fontRef>
+        </p:style>
+        <p:txBody>
+          <a:bodyPr rtlCol="0" anchor="ctr"/>
+          <a:lstStyle/>
+          <a:p>
+            <a:pPr algn="ctr"/>
+            <a:endParaRPr lang="en-US" sz="1200" dirty="0"/>
+          </a:p>
+        </p:txBody>
+      </p:sp>
+      <p:sp>
+        <p:nvSpPr>
+          <p:cNvPr id="127" name="TextBox 126"/>
+          <p:cNvSpPr txBox="1"/>
+          <p:nvPr/>
+        </p:nvSpPr>
+        <p:spPr>
+          <a:xfrm>
+            <a:off x="1671324" y="2787315"/>
+            <a:ext cx="720040" cy="461665"/>
+          </a:xfrm>
+          <a:prstGeom prst="rect">
+            <a:avLst/>
+          </a:prstGeom>
+          <a:noFill/>
+        </p:spPr>
+        <p:txBody>
+          <a:bodyPr wrap="square" rtlCol="0">
+            <a:spAutoFit/>
+          </a:bodyPr>
+          <a:lstStyle/>
+          <a:p>
+            <a:pPr algn="ctr"/>
+            <a:r>
+              <a:rPr lang="fi-FI" sz="1200" i="1" dirty="0" smtClean="0"/>
+              <a:t>data</a:t>
+            </a:r>
+            <a:r>
+              <a:rPr lang="fi-FI" sz="1200" dirty="0" smtClean="0"/>
+              <a:t>  address</a:t>
+            </a:r>
+            <a:endParaRPr lang="en-US" sz="1200" dirty="0"/>
+          </a:p>
+        </p:txBody>
+      </p:sp>
+      <p:grpSp>
+        <p:nvGrpSpPr>
+          <p:cNvPr id="145" name="Group 144"/>
+          <p:cNvGrpSpPr/>
+          <p:nvPr/>
+        </p:nvGrpSpPr>
+        <p:grpSpPr>
+          <a:xfrm>
+            <a:off x="2059547" y="3713933"/>
+            <a:ext cx="720000" cy="536284"/>
+            <a:chOff x="2414587" y="6002470"/>
+            <a:chExt cx="720000" cy="536284"/>
+          </a:xfrm>
+        </p:grpSpPr>
+        <p:sp>
+          <p:nvSpPr>
+            <p:cNvPr id="132" name="Flowchart: Process 131"/>
+            <p:cNvSpPr/>
+            <p:nvPr/>
+          </p:nvSpPr>
+          <p:spPr>
+            <a:xfrm>
+              <a:off x="2414587" y="6206366"/>
+              <a:ext cx="720000" cy="144000"/>
+            </a:xfrm>
+            <a:prstGeom prst="flowChartProcess">
+              <a:avLst/>
+            </a:prstGeom>
+            <a:solidFill>
+              <a:schemeClr val="bg1"/>
+            </a:solidFill>
+          </p:spPr>
+          <p:style>
+            <a:lnRef idx="2">
+              <a:schemeClr val="accent1">
+                <a:shade val="50000"/>
+              </a:schemeClr>
+            </a:lnRef>
+            <a:fillRef idx="1">
+              <a:schemeClr val="accent1"/>
+            </a:fillRef>
+            <a:effectRef idx="0">
+              <a:schemeClr val="accent1"/>
+            </a:effectRef>
+            <a:fontRef idx="minor">
+              <a:schemeClr val="lt1"/>
+            </a:fontRef>
+          </p:style>
+          <p:txBody>
+            <a:bodyPr rtlCol="0" anchor="ctr"/>
+            <a:lstStyle/>
+            <a:p>
+              <a:pPr algn="ctr"/>
+              <a:endParaRPr lang="en-US" sz="1200" dirty="0"/>
+            </a:p>
+          </p:txBody>
+        </p:sp>
+        <p:sp>
+          <p:nvSpPr>
+            <p:cNvPr id="133" name="TextBox 132"/>
+            <p:cNvSpPr txBox="1"/>
+            <p:nvPr/>
+          </p:nvSpPr>
+          <p:spPr>
+            <a:xfrm>
+              <a:off x="2626965" y="6148533"/>
+              <a:ext cx="295274" cy="246221"/>
+            </a:xfrm>
+            <a:prstGeom prst="rect">
+              <a:avLst/>
+            </a:prstGeom>
+            <a:noFill/>
+          </p:spPr>
+          <p:txBody>
+            <a:bodyPr wrap="none" rtlCol="0">
+              <a:spAutoFit/>
+            </a:bodyPr>
+            <a:lstStyle/>
+            <a:p>
+              <a:r>
+                <a:rPr lang="fi-FI" sz="1000" dirty="0" smtClean="0"/>
+                <a:t>r7</a:t>
+              </a:r>
+              <a:endParaRPr lang="en-US" sz="1000" dirty="0"/>
+            </a:p>
+          </p:txBody>
+        </p:sp>
+        <p:sp>
+          <p:nvSpPr>
+            <p:cNvPr id="134" name="Flowchart: Process 133"/>
+            <p:cNvSpPr/>
+            <p:nvPr/>
+          </p:nvSpPr>
+          <p:spPr>
+            <a:xfrm>
+              <a:off x="2414587" y="6350366"/>
+              <a:ext cx="720000" cy="144000"/>
+            </a:xfrm>
+            <a:prstGeom prst="flowChartProcess">
+              <a:avLst/>
+            </a:prstGeom>
+            <a:solidFill>
+              <a:schemeClr val="bg1"/>
+            </a:solidFill>
+          </p:spPr>
+          <p:style>
+            <a:lnRef idx="2">
+              <a:schemeClr val="accent1">
+                <a:shade val="50000"/>
+              </a:schemeClr>
+            </a:lnRef>
+            <a:fillRef idx="1">
+              <a:schemeClr val="accent1"/>
+            </a:fillRef>
+            <a:effectRef idx="0">
+              <a:schemeClr val="accent1"/>
+            </a:effectRef>
+            <a:fontRef idx="minor">
+              <a:schemeClr val="lt1"/>
+            </a:fontRef>
+          </p:style>
+          <p:txBody>
+            <a:bodyPr rtlCol="0" anchor="ctr"/>
+            <a:lstStyle/>
+            <a:p>
+              <a:pPr algn="ctr"/>
+              <a:endParaRPr lang="en-US" sz="1200" dirty="0"/>
+            </a:p>
+          </p:txBody>
+        </p:sp>
+        <p:sp>
+          <p:nvSpPr>
+            <p:cNvPr id="135" name="TextBox 134"/>
+            <p:cNvSpPr txBox="1"/>
+            <p:nvPr/>
+          </p:nvSpPr>
+          <p:spPr>
+            <a:xfrm>
+              <a:off x="2626965" y="6292533"/>
+              <a:ext cx="280846" cy="246221"/>
+            </a:xfrm>
+            <a:prstGeom prst="rect">
+              <a:avLst/>
+            </a:prstGeom>
+            <a:noFill/>
+          </p:spPr>
+          <p:txBody>
+            <a:bodyPr wrap="none" rtlCol="0">
+              <a:spAutoFit/>
+            </a:bodyPr>
+            <a:lstStyle/>
+            <a:p>
+              <a:r>
+                <a:rPr lang="fi-FI" sz="1000" dirty="0" smtClean="0"/>
+                <a:t>…</a:t>
+              </a:r>
+              <a:endParaRPr lang="en-US" sz="1000" dirty="0"/>
+            </a:p>
+          </p:txBody>
+        </p:sp>
+        <p:sp>
+          <p:nvSpPr>
+            <p:cNvPr id="136" name="Flowchart: Process 135"/>
+            <p:cNvSpPr/>
+            <p:nvPr/>
+          </p:nvSpPr>
+          <p:spPr>
+            <a:xfrm>
+              <a:off x="2414587" y="6062334"/>
+              <a:ext cx="720000" cy="144000"/>
+            </a:xfrm>
+            <a:prstGeom prst="flowChartProcess">
+              <a:avLst/>
+            </a:prstGeom>
+            <a:solidFill>
+              <a:schemeClr val="bg1"/>
+            </a:solidFill>
+          </p:spPr>
+          <p:style>
+            <a:lnRef idx="2">
+              <a:schemeClr val="accent1">
+                <a:shade val="50000"/>
+              </a:schemeClr>
+            </a:lnRef>
+            <a:fillRef idx="1">
+              <a:schemeClr val="accent1"/>
+            </a:fillRef>
+            <a:effectRef idx="0">
+              <a:schemeClr val="accent1"/>
+            </a:effectRef>
+            <a:fontRef idx="minor">
+              <a:schemeClr val="lt1"/>
+            </a:fontRef>
+          </p:style>
+          <p:txBody>
+            <a:bodyPr rtlCol="0" anchor="ctr"/>
+            <a:lstStyle/>
+            <a:p>
+              <a:pPr algn="ctr"/>
+              <a:endParaRPr lang="en-US" sz="1200" dirty="0"/>
+            </a:p>
+          </p:txBody>
+        </p:sp>
+        <p:sp>
+          <p:nvSpPr>
+            <p:cNvPr id="137" name="TextBox 136"/>
+            <p:cNvSpPr txBox="1"/>
+            <p:nvPr/>
+          </p:nvSpPr>
+          <p:spPr>
+            <a:xfrm>
+              <a:off x="2436719" y="6002470"/>
+              <a:ext cx="667170" cy="246221"/>
+            </a:xfrm>
+            <a:prstGeom prst="rect">
+              <a:avLst/>
+            </a:prstGeom>
+            <a:noFill/>
+          </p:spPr>
+          <p:txBody>
+            <a:bodyPr wrap="none" rtlCol="0">
+              <a:spAutoFit/>
+            </a:bodyPr>
+            <a:lstStyle/>
+            <a:p>
+              <a:r>
+                <a:rPr lang="fi-FI" sz="1000" dirty="0" smtClean="0"/>
+                <a:t>r6: (data)</a:t>
+              </a:r>
+              <a:endParaRPr lang="en-US" sz="1000" dirty="0"/>
+            </a:p>
+          </p:txBody>
+        </p:sp>
+      </p:grpSp>
+      <p:sp>
+        <p:nvSpPr>
+          <p:cNvPr id="131" name="TextBox 130"/>
+          <p:cNvSpPr txBox="1"/>
+          <p:nvPr/>
+        </p:nvSpPr>
+        <p:spPr>
+          <a:xfrm>
+            <a:off x="1567503" y="3713778"/>
+            <a:ext cx="566181" cy="246221"/>
+          </a:xfrm>
+          <a:prstGeom prst="rect">
+            <a:avLst/>
+          </a:prstGeom>
+          <a:noFill/>
+        </p:spPr>
+        <p:txBody>
+          <a:bodyPr wrap="none" rtlCol="0">
+            <a:spAutoFit/>
+          </a:bodyPr>
+          <a:lstStyle/>
+          <a:p>
+            <a:r>
+              <a:rPr lang="fi-FI" sz="1000" dirty="0" smtClean="0"/>
+              <a:t>#(addr)</a:t>
+            </a:r>
+            <a:endParaRPr lang="en-US" sz="1000" dirty="0"/>
+          </a:p>
+        </p:txBody>
+      </p:sp>
+      <p:sp>
+        <p:nvSpPr>
+          <p:cNvPr id="215" name="Rectangle 214"/>
+          <p:cNvSpPr/>
+          <p:nvPr/>
+        </p:nvSpPr>
+        <p:spPr>
+          <a:xfrm>
+            <a:off x="6012160" y="1994718"/>
+            <a:ext cx="2012534" cy="2406390"/>
+          </a:xfrm>
+          <a:prstGeom prst="rect">
+            <a:avLst/>
+          </a:prstGeom>
+          <a:solidFill>
+            <a:srgbClr val="C3D0F0"/>
+          </a:solidFill>
+          <a:ln w="12700">
+            <a:solidFill>
+              <a:schemeClr val="tx1"/>
+            </a:solidFill>
+            <a:tailEnd type="none"/>
+          </a:ln>
+          <a:effectLst/>
+        </p:spPr>
+        <p:style>
+          <a:lnRef idx="1">
+            <a:schemeClr val="accent4"/>
+          </a:lnRef>
+          <a:fillRef idx="2">
+            <a:schemeClr val="accent4"/>
+          </a:fillRef>
+          <a:effectRef idx="1">
+            <a:schemeClr val="accent4"/>
+          </a:effectRef>
+          <a:fontRef idx="minor">
+            <a:schemeClr val="dk1"/>
+          </a:fontRef>
+        </p:style>
+        <p:txBody>
+          <a:bodyPr tIns="0" bIns="0" anchor="t" anchorCtr="0">
+            <a:noAutofit/>
+          </a:bodyPr>
+          <a:lstStyle>
+            <a:defPPr>
+              <a:defRPr lang="en-US"/>
+            </a:defPPr>
+            <a:lvl1pPr marL="0" algn="l" defTabSz="914400" rtl="0" eaLnBrk="1" latinLnBrk="0" hangingPunct="1">
+              <a:defRPr sz="1800" kern="1200">
+                <a:solidFill>
+                  <a:schemeClr val="dk1"/>
+                </a:solidFill>
+                <a:latin typeface="+mn-lt"/>
+                <a:ea typeface="+mn-ea"/>
+                <a:cs typeface="+mn-cs"/>
+              </a:defRPr>
+            </a:lvl1pPr>
+            <a:lvl2pPr marL="457200" algn="l" defTabSz="914400" rtl="0" eaLnBrk="1" latinLnBrk="0" hangingPunct="1">
+              <a:defRPr sz="1800" kern="1200">
+                <a:solidFill>
+                  <a:schemeClr val="dk1"/>
+                </a:solidFill>
+                <a:latin typeface="+mn-lt"/>
+                <a:ea typeface="+mn-ea"/>
+                <a:cs typeface="+mn-cs"/>
+              </a:defRPr>
+            </a:lvl2pPr>
+            <a:lvl3pPr marL="914400" algn="l" defTabSz="914400" rtl="0" eaLnBrk="1" latinLnBrk="0" hangingPunct="1">
+              <a:defRPr sz="1800" kern="1200">
+                <a:solidFill>
+                  <a:schemeClr val="dk1"/>
+                </a:solidFill>
+                <a:latin typeface="+mn-lt"/>
+                <a:ea typeface="+mn-ea"/>
+                <a:cs typeface="+mn-cs"/>
+              </a:defRPr>
+            </a:lvl3pPr>
+            <a:lvl4pPr marL="1371600" algn="l" defTabSz="914400" rtl="0" eaLnBrk="1" latinLnBrk="0" hangingPunct="1">
+              <a:defRPr sz="1800" kern="1200">
+                <a:solidFill>
+                  <a:schemeClr val="dk1"/>
+                </a:solidFill>
+                <a:latin typeface="+mn-lt"/>
+                <a:ea typeface="+mn-ea"/>
+                <a:cs typeface="+mn-cs"/>
+              </a:defRPr>
+            </a:lvl4pPr>
+            <a:lvl5pPr marL="1828800" algn="l" defTabSz="914400" rtl="0" eaLnBrk="1" latinLnBrk="0" hangingPunct="1">
+              <a:defRPr sz="1800" kern="1200">
+                <a:solidFill>
+                  <a:schemeClr val="dk1"/>
+                </a:solidFill>
+                <a:latin typeface="+mn-lt"/>
+                <a:ea typeface="+mn-ea"/>
+                <a:cs typeface="+mn-cs"/>
+              </a:defRPr>
+            </a:lvl5pPr>
+            <a:lvl6pPr marL="2286000" algn="l" defTabSz="914400" rtl="0" eaLnBrk="1" latinLnBrk="0" hangingPunct="1">
+              <a:defRPr sz="1800" kern="1200">
+                <a:solidFill>
+                  <a:schemeClr val="dk1"/>
+                </a:solidFill>
+                <a:latin typeface="+mn-lt"/>
+                <a:ea typeface="+mn-ea"/>
+                <a:cs typeface="+mn-cs"/>
+              </a:defRPr>
+            </a:lvl6pPr>
+            <a:lvl7pPr marL="2743200" algn="l" defTabSz="914400" rtl="0" eaLnBrk="1" latinLnBrk="0" hangingPunct="1">
+              <a:defRPr sz="1800" kern="1200">
+                <a:solidFill>
+                  <a:schemeClr val="dk1"/>
+                </a:solidFill>
+                <a:latin typeface="+mn-lt"/>
+                <a:ea typeface="+mn-ea"/>
+                <a:cs typeface="+mn-cs"/>
+              </a:defRPr>
+            </a:lvl7pPr>
+            <a:lvl8pPr marL="3200400" algn="l" defTabSz="914400" rtl="0" eaLnBrk="1" latinLnBrk="0" hangingPunct="1">
+              <a:defRPr sz="1800" kern="1200">
+                <a:solidFill>
+                  <a:schemeClr val="dk1"/>
+                </a:solidFill>
+                <a:latin typeface="+mn-lt"/>
+                <a:ea typeface="+mn-ea"/>
+                <a:cs typeface="+mn-cs"/>
+              </a:defRPr>
+            </a:lvl8pPr>
+            <a:lvl9pPr marL="3657600" algn="l" defTabSz="914400" rtl="0" eaLnBrk="1" latinLnBrk="0" hangingPunct="1">
+              <a:defRPr sz="1800" kern="1200">
+                <a:solidFill>
+                  <a:schemeClr val="dk1"/>
+                </a:solidFill>
+                <a:latin typeface="+mn-lt"/>
+                <a:ea typeface="+mn-ea"/>
+                <a:cs typeface="+mn-cs"/>
+              </a:defRPr>
+            </a:lvl9pPr>
+          </a:lstStyle>
+          <a:p>
+            <a:pPr algn="ctr" fontAlgn="base">
+              <a:spcBef>
+                <a:spcPct val="0"/>
+              </a:spcBef>
+              <a:spcAft>
+                <a:spcPct val="0"/>
+              </a:spcAft>
+            </a:pPr>
+            <a:r>
+              <a:rPr lang="fi-FI" sz="1200" b="1" i="1" dirty="0" smtClean="0">
+                <a:solidFill>
+                  <a:prstClr val="black"/>
+                </a:solidFill>
+                <a:latin typeface="Calibri" pitchFamily="34" charset="0"/>
+                <a:cs typeface="Calibri" pitchFamily="34" charset="0"/>
+              </a:rPr>
+              <a:t>component</a:t>
+            </a:r>
+            <a:r>
+              <a:rPr lang="fi-FI" sz="1200" b="1" dirty="0" smtClean="0">
+                <a:solidFill>
+                  <a:prstClr val="black"/>
+                </a:solidFill>
+                <a:latin typeface="Calibri" pitchFamily="34" charset="0"/>
+                <a:cs typeface="Calibri" pitchFamily="34" charset="0"/>
+              </a:rPr>
+              <a:t> </a:t>
+            </a:r>
+            <a:r>
+              <a:rPr lang="fi-FI" sz="1200" b="1" dirty="0" smtClean="0">
+                <a:solidFill>
+                  <a:prstClr val="black"/>
+                </a:solidFill>
+                <a:latin typeface="Calibri" pitchFamily="34" charset="0"/>
+                <a:cs typeface="Calibri" pitchFamily="34" charset="0"/>
+              </a:rPr>
+              <a:t>Bridge</a:t>
+            </a:r>
+            <a:endParaRPr lang="fi-FI" sz="1200" b="1" dirty="0" smtClean="0">
+              <a:solidFill>
+                <a:prstClr val="black"/>
+              </a:solidFill>
+              <a:latin typeface="Calibri" pitchFamily="34" charset="0"/>
+              <a:cs typeface="Calibri" pitchFamily="34" charset="0"/>
+            </a:endParaRPr>
+          </a:p>
+        </p:txBody>
+      </p:sp>
+      <p:sp>
+        <p:nvSpPr>
+          <p:cNvPr id="216" name="Flowchart: Off-page Connector 215"/>
+          <p:cNvSpPr/>
+          <p:nvPr/>
+        </p:nvSpPr>
+        <p:spPr>
+          <a:xfrm rot="16200000">
+            <a:off x="5862941" y="2494627"/>
+            <a:ext cx="360040" cy="360000"/>
+          </a:xfrm>
+          <a:prstGeom prst="flowChartOffpageConnector">
+            <a:avLst/>
+          </a:prstGeom>
+          <a:solidFill>
+            <a:srgbClr val="329964"/>
+          </a:solidFill>
+          <a:ln>
+            <a:solidFill>
+              <a:schemeClr val="tx1"/>
+            </a:solidFill>
+          </a:ln>
+        </p:spPr>
+        <p:style>
+          <a:lnRef idx="2">
+            <a:schemeClr val="accent1">
+              <a:shade val="50000"/>
+            </a:schemeClr>
+          </a:lnRef>
+          <a:fillRef idx="1">
+            <a:schemeClr val="accent1"/>
+          </a:fillRef>
+          <a:effectRef idx="0">
+            <a:schemeClr val="accent1"/>
+          </a:effectRef>
+          <a:fontRef idx="minor">
+            <a:schemeClr val="lt1"/>
+          </a:fontRef>
+        </p:style>
+        <p:txBody>
+          <a:bodyPr rtlCol="0" anchor="ctr"/>
+          <a:lstStyle/>
+          <a:p>
+            <a:pPr algn="ctr"/>
+            <a:endParaRPr lang="en-US" sz="1200" dirty="0"/>
+          </a:p>
+        </p:txBody>
+      </p:sp>
+      <p:sp>
+        <p:nvSpPr>
+          <p:cNvPr id="217" name="TextBox 216"/>
+          <p:cNvSpPr txBox="1"/>
+          <p:nvPr/>
+        </p:nvSpPr>
+        <p:spPr>
+          <a:xfrm>
+            <a:off x="6931303" y="2120614"/>
+            <a:ext cx="1012119" cy="461665"/>
+          </a:xfrm>
+          <a:prstGeom prst="rect">
+            <a:avLst/>
+          </a:prstGeom>
+          <a:noFill/>
+        </p:spPr>
+        <p:txBody>
+          <a:bodyPr wrap="square" rtlCol="0">
+            <a:spAutoFit/>
+          </a:bodyPr>
+          <a:lstStyle/>
+          <a:p>
+            <a:r>
+              <a:rPr lang="fi-FI" sz="1200" i="1" dirty="0" smtClean="0"/>
+              <a:t>memory map</a:t>
+            </a:r>
+            <a:r>
+              <a:rPr lang="fi-FI" sz="1200" dirty="0" smtClean="0"/>
+              <a:t> </a:t>
+            </a:r>
+            <a:r>
+              <a:rPr lang="fi-FI" sz="1200" dirty="0" smtClean="0"/>
+              <a:t>MM0</a:t>
+            </a:r>
+            <a:endParaRPr lang="en-US" sz="1200" dirty="0"/>
+          </a:p>
+        </p:txBody>
+      </p:sp>
+      <p:sp>
+        <p:nvSpPr>
+          <p:cNvPr id="218" name="Flowchart: Process 217"/>
+          <p:cNvSpPr/>
+          <p:nvPr/>
+        </p:nvSpPr>
+        <p:spPr>
+          <a:xfrm>
+            <a:off x="7028098" y="2533238"/>
+            <a:ext cx="720000" cy="144000"/>
+          </a:xfrm>
+          <a:prstGeom prst="flowChartProcess">
+            <a:avLst/>
+          </a:prstGeom>
+          <a:solidFill>
+            <a:schemeClr val="bg1"/>
+          </a:solidFill>
+        </p:spPr>
+        <p:style>
+          <a:lnRef idx="2">
+            <a:schemeClr val="accent1">
+              <a:shade val="50000"/>
+            </a:schemeClr>
+          </a:lnRef>
+          <a:fillRef idx="1">
+            <a:schemeClr val="accent1"/>
+          </a:fillRef>
+          <a:effectRef idx="0">
+            <a:schemeClr val="accent1"/>
+          </a:effectRef>
+          <a:fontRef idx="minor">
+            <a:schemeClr val="lt1"/>
+          </a:fontRef>
+        </p:style>
+        <p:txBody>
+          <a:bodyPr rtlCol="0" anchor="ctr"/>
+          <a:lstStyle/>
+          <a:p>
+            <a:pPr algn="ctr"/>
+            <a:endParaRPr lang="en-US" sz="1200" dirty="0"/>
+          </a:p>
+        </p:txBody>
+      </p:sp>
+      <p:sp>
+        <p:nvSpPr>
+          <p:cNvPr id="219" name="Flowchart: Process 218"/>
+          <p:cNvSpPr/>
+          <p:nvPr/>
+        </p:nvSpPr>
+        <p:spPr>
+          <a:xfrm>
+            <a:off x="7028098" y="2677270"/>
+            <a:ext cx="720000" cy="144000"/>
+          </a:xfrm>
+          <a:prstGeom prst="flowChartProcess">
+            <a:avLst/>
+          </a:prstGeom>
+          <a:solidFill>
+            <a:schemeClr val="bg1"/>
+          </a:solidFill>
+        </p:spPr>
+        <p:style>
+          <a:lnRef idx="2">
+            <a:schemeClr val="accent1">
+              <a:shade val="50000"/>
+            </a:schemeClr>
+          </a:lnRef>
+          <a:fillRef idx="1">
+            <a:schemeClr val="accent1"/>
+          </a:fillRef>
+          <a:effectRef idx="0">
+            <a:schemeClr val="accent1"/>
+          </a:effectRef>
+          <a:fontRef idx="minor">
+            <a:schemeClr val="lt1"/>
+          </a:fontRef>
+        </p:style>
+        <p:txBody>
+          <a:bodyPr rtlCol="0" anchor="ctr"/>
+          <a:lstStyle/>
+          <a:p>
+            <a:pPr algn="ctr"/>
+            <a:endParaRPr lang="en-US" sz="1200" dirty="0"/>
+          </a:p>
+        </p:txBody>
+      </p:sp>
+      <p:sp>
+        <p:nvSpPr>
+          <p:cNvPr id="220" name="TextBox 219"/>
+          <p:cNvSpPr txBox="1"/>
+          <p:nvPr/>
+        </p:nvSpPr>
+        <p:spPr>
+          <a:xfrm>
+            <a:off x="7240476" y="2476563"/>
+            <a:ext cx="295274" cy="246221"/>
+          </a:xfrm>
+          <a:prstGeom prst="rect">
+            <a:avLst/>
+          </a:prstGeom>
+          <a:noFill/>
+        </p:spPr>
+        <p:txBody>
+          <a:bodyPr wrap="none" rtlCol="0">
+            <a:spAutoFit/>
+          </a:bodyPr>
+          <a:lstStyle/>
+          <a:p>
+            <a:r>
+              <a:rPr lang="fi-FI" sz="1000" dirty="0" smtClean="0"/>
+              <a:t>r0</a:t>
+            </a:r>
+            <a:endParaRPr lang="en-US" sz="1000" dirty="0"/>
+          </a:p>
+        </p:txBody>
+      </p:sp>
+      <p:sp>
+        <p:nvSpPr>
+          <p:cNvPr id="221" name="TextBox 220"/>
+          <p:cNvSpPr txBox="1"/>
+          <p:nvPr/>
+        </p:nvSpPr>
+        <p:spPr>
+          <a:xfrm>
+            <a:off x="7240476" y="2624200"/>
+            <a:ext cx="295274" cy="246221"/>
+          </a:xfrm>
+          <a:prstGeom prst="rect">
+            <a:avLst/>
+          </a:prstGeom>
+          <a:noFill/>
+        </p:spPr>
+        <p:txBody>
+          <a:bodyPr wrap="none" rtlCol="0">
+            <a:spAutoFit/>
+          </a:bodyPr>
+          <a:lstStyle/>
+          <a:p>
+            <a:r>
+              <a:rPr lang="fi-FI" sz="1000" dirty="0" smtClean="0"/>
+              <a:t>r1</a:t>
+            </a:r>
+            <a:endParaRPr lang="en-US" sz="1000" dirty="0"/>
+          </a:p>
+        </p:txBody>
+      </p:sp>
+      <p:sp>
+        <p:nvSpPr>
+          <p:cNvPr id="222" name="Left-Right Arrow 221"/>
+          <p:cNvSpPr/>
+          <p:nvPr/>
+        </p:nvSpPr>
+        <p:spPr>
+          <a:xfrm>
+            <a:off x="6270180" y="2562910"/>
+            <a:ext cx="696503" cy="215804"/>
+          </a:xfrm>
+          <a:prstGeom prst="leftRightArrow">
+            <a:avLst/>
+          </a:prstGeom>
+          <a:solidFill>
+            <a:schemeClr val="bg1"/>
+          </a:solidFill>
+        </p:spPr>
+        <p:style>
+          <a:lnRef idx="2">
+            <a:schemeClr val="accent1">
+              <a:shade val="50000"/>
+            </a:schemeClr>
+          </a:lnRef>
+          <a:fillRef idx="1">
+            <a:schemeClr val="accent1"/>
+          </a:fillRef>
+          <a:effectRef idx="0">
+            <a:schemeClr val="accent1"/>
+          </a:effectRef>
+          <a:fontRef idx="minor">
+            <a:schemeClr val="lt1"/>
+          </a:fontRef>
+        </p:style>
+        <p:txBody>
+          <a:bodyPr rtlCol="0" anchor="ctr"/>
+          <a:lstStyle/>
+          <a:p>
+            <a:pPr algn="ctr"/>
+            <a:endParaRPr lang="en-US" sz="1200" dirty="0"/>
+          </a:p>
+        </p:txBody>
+      </p:sp>
+      <p:sp>
+        <p:nvSpPr>
+          <p:cNvPr id="224" name="Flowchart: Off-page Connector 223"/>
+          <p:cNvSpPr/>
+          <p:nvPr/>
+        </p:nvSpPr>
+        <p:spPr>
+          <a:xfrm rot="16200000" flipH="1">
+            <a:off x="6251673" y="3891109"/>
+            <a:ext cx="360040" cy="360000"/>
+          </a:xfrm>
+          <a:prstGeom prst="flowChartOffpageConnector">
+            <a:avLst/>
+          </a:prstGeom>
+          <a:solidFill>
+            <a:schemeClr val="bg1">
+              <a:lumMod val="65000"/>
+            </a:schemeClr>
+          </a:solidFill>
+          <a:ln>
+            <a:solidFill>
+              <a:schemeClr val="tx1"/>
+            </a:solidFill>
+          </a:ln>
+        </p:spPr>
+        <p:style>
+          <a:lnRef idx="2">
+            <a:schemeClr val="accent1">
+              <a:shade val="50000"/>
+            </a:schemeClr>
+          </a:lnRef>
+          <a:fillRef idx="1">
+            <a:schemeClr val="accent1"/>
+          </a:fillRef>
+          <a:effectRef idx="0">
+            <a:schemeClr val="accent1"/>
+          </a:effectRef>
+          <a:fontRef idx="minor">
+            <a:schemeClr val="lt1"/>
+          </a:fontRef>
+        </p:style>
+        <p:txBody>
+          <a:bodyPr rtlCol="0" anchor="ctr"/>
+          <a:lstStyle/>
+          <a:p>
+            <a:pPr algn="ctr"/>
+            <a:endParaRPr lang="en-US" sz="1200" dirty="0"/>
+          </a:p>
+        </p:txBody>
+      </p:sp>
+      <p:sp>
+        <p:nvSpPr>
+          <p:cNvPr id="225" name="TextBox 224"/>
+          <p:cNvSpPr txBox="1"/>
+          <p:nvPr/>
+        </p:nvSpPr>
+        <p:spPr>
+          <a:xfrm>
+            <a:off x="6063749" y="3351029"/>
+            <a:ext cx="924099" cy="461665"/>
+          </a:xfrm>
+          <a:prstGeom prst="rect">
+            <a:avLst/>
+          </a:prstGeom>
+          <a:noFill/>
+        </p:spPr>
+        <p:txBody>
+          <a:bodyPr wrap="none" rtlCol="0">
+            <a:spAutoFit/>
+          </a:bodyPr>
+          <a:lstStyle/>
+          <a:p>
+            <a:r>
+              <a:rPr lang="fi-FI" sz="1200" i="1" dirty="0" smtClean="0"/>
+              <a:t>Indirect </a:t>
+            </a:r>
+          </a:p>
+          <a:p>
+            <a:r>
+              <a:rPr lang="fi-FI" sz="1200" i="1" dirty="0" smtClean="0"/>
+              <a:t>interface </a:t>
+            </a:r>
+            <a:r>
+              <a:rPr lang="fi-FI" sz="1200" dirty="0" smtClean="0"/>
+              <a:t>II0</a:t>
+            </a:r>
+            <a:endParaRPr lang="en-US" sz="1200" dirty="0"/>
+          </a:p>
+        </p:txBody>
+      </p:sp>
+      <p:cxnSp>
+        <p:nvCxnSpPr>
+          <p:cNvPr id="226" name="Elbow Connector 225"/>
+          <p:cNvCxnSpPr>
+            <a:stCxn id="218" idx="3"/>
+            <a:endCxn id="224" idx="0"/>
+          </p:cNvCxnSpPr>
+          <p:nvPr/>
+        </p:nvCxnSpPr>
+        <p:spPr>
+          <a:xfrm flipH="1">
+            <a:off x="6251693" y="2605237"/>
+            <a:ext cx="1496405" cy="1404000"/>
+          </a:xfrm>
+          <a:prstGeom prst="bentConnector5">
+            <a:avLst>
+              <a:gd name="adj1" fmla="val -14428"/>
+              <a:gd name="adj2" fmla="val 41162"/>
+              <a:gd name="adj3" fmla="val 109337"/>
+            </a:avLst>
+          </a:prstGeom>
+          <a:ln>
+            <a:solidFill>
+              <a:schemeClr val="tx1"/>
+            </a:solidFill>
+            <a:tailEnd type="triangle"/>
+          </a:ln>
+        </p:spPr>
+        <p:style>
+          <a:lnRef idx="1">
+            <a:schemeClr val="accent1"/>
+          </a:lnRef>
+          <a:fillRef idx="0">
+            <a:schemeClr val="accent1"/>
+          </a:fillRef>
+          <a:effectRef idx="0">
+            <a:schemeClr val="accent1"/>
+          </a:effectRef>
+          <a:fontRef idx="minor">
+            <a:schemeClr val="tx1"/>
+          </a:fontRef>
+        </p:style>
+      </p:cxnSp>
+      <p:cxnSp>
+        <p:nvCxnSpPr>
+          <p:cNvPr id="227" name="Elbow Connector 226"/>
+          <p:cNvCxnSpPr>
+            <a:stCxn id="219" idx="3"/>
+            <a:endCxn id="224" idx="0"/>
+          </p:cNvCxnSpPr>
+          <p:nvPr/>
+        </p:nvCxnSpPr>
+        <p:spPr>
+          <a:xfrm flipH="1">
+            <a:off x="6251693" y="2749270"/>
+            <a:ext cx="1496405" cy="1404000"/>
+          </a:xfrm>
+          <a:prstGeom prst="bentConnector5">
+            <a:avLst>
+              <a:gd name="adj1" fmla="val -10609"/>
+              <a:gd name="adj2" fmla="val 18326"/>
+              <a:gd name="adj3" fmla="val 112731"/>
+            </a:avLst>
+          </a:prstGeom>
+          <a:ln>
+            <a:solidFill>
+              <a:schemeClr val="tx1"/>
+            </a:solidFill>
+            <a:tailEnd type="triangle"/>
+          </a:ln>
+        </p:spPr>
+        <p:style>
+          <a:lnRef idx="1">
+            <a:schemeClr val="accent1"/>
+          </a:lnRef>
+          <a:fillRef idx="0">
+            <a:schemeClr val="accent1"/>
+          </a:fillRef>
+          <a:effectRef idx="0">
+            <a:schemeClr val="accent1"/>
+          </a:effectRef>
+          <a:fontRef idx="minor">
+            <a:schemeClr val="tx1"/>
+          </a:fontRef>
+        </p:style>
+      </p:cxnSp>
+      <p:sp>
+        <p:nvSpPr>
+          <p:cNvPr id="228" name="Left-Right Arrow 227"/>
+          <p:cNvSpPr/>
+          <p:nvPr/>
+        </p:nvSpPr>
+        <p:spPr>
+          <a:xfrm>
+            <a:off x="6659819" y="3968814"/>
+            <a:ext cx="1189982" cy="215804"/>
+          </a:xfrm>
+          <a:prstGeom prst="leftRightArrow">
+            <a:avLst/>
+          </a:prstGeom>
+          <a:solidFill>
+            <a:schemeClr val="bg1"/>
+          </a:solidFill>
+        </p:spPr>
+        <p:style>
+          <a:lnRef idx="2">
+            <a:schemeClr val="accent1">
+              <a:shade val="50000"/>
+            </a:schemeClr>
+          </a:lnRef>
+          <a:fillRef idx="1">
+            <a:schemeClr val="accent1"/>
+          </a:fillRef>
+          <a:effectRef idx="0">
+            <a:schemeClr val="accent1"/>
+          </a:effectRef>
+          <a:fontRef idx="minor">
+            <a:schemeClr val="lt1"/>
+          </a:fontRef>
+        </p:style>
+        <p:txBody>
+          <a:bodyPr rtlCol="0" anchor="ctr"/>
+          <a:lstStyle/>
+          <a:p>
+            <a:pPr algn="ctr"/>
+            <a:endParaRPr lang="en-US" sz="1200" dirty="0"/>
+          </a:p>
+        </p:txBody>
+      </p:sp>
+      <p:sp>
+        <p:nvSpPr>
+          <p:cNvPr id="229" name="TextBox 228"/>
+          <p:cNvSpPr txBox="1"/>
+          <p:nvPr/>
+        </p:nvSpPr>
+        <p:spPr>
+          <a:xfrm>
+            <a:off x="6762372" y="2818744"/>
+            <a:ext cx="720040" cy="400110"/>
+          </a:xfrm>
+          <a:prstGeom prst="rect">
+            <a:avLst/>
+          </a:prstGeom>
+          <a:noFill/>
+        </p:spPr>
+        <p:txBody>
+          <a:bodyPr wrap="square" rtlCol="0">
+            <a:spAutoFit/>
+          </a:bodyPr>
+          <a:lstStyle/>
+          <a:p>
+            <a:pPr algn="ctr"/>
+            <a:r>
+              <a:rPr lang="fi-FI" sz="1000" i="1" dirty="0" smtClean="0"/>
+              <a:t>data</a:t>
+            </a:r>
+            <a:r>
+              <a:rPr lang="fi-FI" sz="1000" dirty="0" smtClean="0"/>
+              <a:t>  address</a:t>
+            </a:r>
+            <a:endParaRPr lang="en-US" sz="1000" dirty="0"/>
+          </a:p>
+        </p:txBody>
+      </p:sp>
+      <p:sp>
+        <p:nvSpPr>
+          <p:cNvPr id="238" name="Flowchart: Off-page Connector 237"/>
+          <p:cNvSpPr/>
+          <p:nvPr/>
+        </p:nvSpPr>
+        <p:spPr>
+          <a:xfrm rot="16200000">
+            <a:off x="7892800" y="3885231"/>
+            <a:ext cx="360040" cy="360000"/>
+          </a:xfrm>
+          <a:prstGeom prst="flowChartOffpageConnector">
+            <a:avLst/>
+          </a:prstGeom>
+          <a:solidFill>
+            <a:srgbClr val="32CBCB"/>
+          </a:solidFill>
+          <a:ln>
+            <a:solidFill>
+              <a:schemeClr val="tx1"/>
+            </a:solidFill>
+          </a:ln>
+        </p:spPr>
+        <p:style>
+          <a:lnRef idx="2">
+            <a:schemeClr val="accent1">
+              <a:shade val="50000"/>
+            </a:schemeClr>
+          </a:lnRef>
+          <a:fillRef idx="1">
+            <a:schemeClr val="accent1"/>
+          </a:fillRef>
+          <a:effectRef idx="0">
+            <a:schemeClr val="accent1"/>
+          </a:effectRef>
+          <a:fontRef idx="minor">
+            <a:schemeClr val="lt1"/>
+          </a:fontRef>
+        </p:style>
+        <p:txBody>
+          <a:bodyPr rtlCol="0" anchor="ctr"/>
+          <a:lstStyle/>
+          <a:p>
+            <a:pPr algn="ctr"/>
+            <a:endParaRPr lang="en-US" sz="1200" dirty="0"/>
+          </a:p>
+        </p:txBody>
+      </p:sp>
+      <p:sp>
+        <p:nvSpPr>
+          <p:cNvPr id="239" name="TextBox 238"/>
+          <p:cNvSpPr txBox="1"/>
+          <p:nvPr/>
+        </p:nvSpPr>
+        <p:spPr>
+          <a:xfrm>
+            <a:off x="7729048" y="3398350"/>
+            <a:ext cx="720040" cy="461665"/>
+          </a:xfrm>
+          <a:prstGeom prst="rect">
+            <a:avLst/>
+          </a:prstGeom>
+          <a:noFill/>
+        </p:spPr>
+        <p:txBody>
+          <a:bodyPr wrap="square" rtlCol="0">
+            <a:spAutoFit/>
+          </a:bodyPr>
+          <a:lstStyle/>
+          <a:p>
+            <a:r>
+              <a:rPr lang="fi-FI" sz="1200" i="1" dirty="0" smtClean="0"/>
+              <a:t>master</a:t>
+            </a:r>
+            <a:r>
+              <a:rPr lang="fi-FI" sz="1200" dirty="0" smtClean="0"/>
+              <a:t>  outIF</a:t>
+            </a:r>
+            <a:endParaRPr lang="en-US" sz="1200" dirty="0"/>
+          </a:p>
+        </p:txBody>
+      </p:sp>
+      <p:sp>
+        <p:nvSpPr>
+          <p:cNvPr id="240" name="TextBox 239"/>
+          <p:cNvSpPr txBox="1"/>
+          <p:nvPr/>
+        </p:nvSpPr>
+        <p:spPr>
+          <a:xfrm>
+            <a:off x="6647399" y="3761057"/>
+            <a:ext cx="1216846" cy="246221"/>
+          </a:xfrm>
+          <a:prstGeom prst="rect">
+            <a:avLst/>
+          </a:prstGeom>
+          <a:noFill/>
+        </p:spPr>
+        <p:txBody>
+          <a:bodyPr wrap="square" rtlCol="0">
+            <a:spAutoFit/>
+          </a:bodyPr>
+          <a:lstStyle/>
+          <a:p>
+            <a:pPr algn="ctr"/>
+            <a:r>
+              <a:rPr lang="fi-FI" sz="1000" i="1" dirty="0" smtClean="0"/>
+              <a:t>transparent bridge</a:t>
+            </a:r>
+            <a:endParaRPr lang="en-US" sz="1000" dirty="0"/>
+          </a:p>
+        </p:txBody>
+      </p:sp>
+      <p:sp>
+        <p:nvSpPr>
+          <p:cNvPr id="34" name="TextBox 33"/>
+          <p:cNvSpPr txBox="1"/>
+          <p:nvPr/>
+        </p:nvSpPr>
+        <p:spPr>
+          <a:xfrm>
+            <a:off x="719612" y="2036778"/>
+            <a:ext cx="720040" cy="461665"/>
+          </a:xfrm>
+          <a:prstGeom prst="rect">
+            <a:avLst/>
+          </a:prstGeom>
+          <a:noFill/>
+        </p:spPr>
+        <p:txBody>
+          <a:bodyPr wrap="square" rtlCol="0">
+            <a:spAutoFit/>
+          </a:bodyPr>
+          <a:lstStyle/>
+          <a:p>
+            <a:r>
+              <a:rPr lang="fi-FI" sz="1200" i="1" dirty="0" smtClean="0"/>
+              <a:t>slave</a:t>
+            </a:r>
+            <a:r>
+              <a:rPr lang="fi-FI" sz="1200" dirty="0" smtClean="0"/>
+              <a:t>  </a:t>
+            </a:r>
+            <a:r>
+              <a:rPr lang="fi-FI" sz="1200" dirty="0" smtClean="0"/>
+              <a:t>accessI</a:t>
+            </a:r>
+            <a:r>
+              <a:rPr lang="fi-FI" sz="1200" dirty="0" smtClean="0"/>
+              <a:t>F</a:t>
+            </a:r>
+            <a:endParaRPr lang="en-US" sz="1200" dirty="0"/>
+          </a:p>
+        </p:txBody>
+      </p:sp>
+      <p:sp>
+        <p:nvSpPr>
+          <p:cNvPr id="214" name="TextBox 213"/>
+          <p:cNvSpPr txBox="1"/>
+          <p:nvPr/>
+        </p:nvSpPr>
+        <p:spPr>
+          <a:xfrm>
+            <a:off x="5688164" y="2036777"/>
+            <a:ext cx="720040" cy="461665"/>
+          </a:xfrm>
+          <a:prstGeom prst="rect">
+            <a:avLst/>
+          </a:prstGeom>
+          <a:noFill/>
+        </p:spPr>
+        <p:txBody>
+          <a:bodyPr wrap="square" rtlCol="0">
+            <a:spAutoFit/>
+          </a:bodyPr>
+          <a:lstStyle/>
+          <a:p>
+            <a:r>
+              <a:rPr lang="fi-FI" sz="1200" i="1" dirty="0" smtClean="0"/>
+              <a:t>slave</a:t>
+            </a:r>
+            <a:r>
+              <a:rPr lang="fi-FI" sz="1200" dirty="0" smtClean="0"/>
+              <a:t>  </a:t>
+            </a:r>
+            <a:r>
+              <a:rPr lang="fi-FI" sz="1200" dirty="0" smtClean="0"/>
+              <a:t>accessI</a:t>
+            </a:r>
+            <a:r>
+              <a:rPr lang="fi-FI" sz="1200" dirty="0" smtClean="0"/>
+              <a:t>F</a:t>
+            </a:r>
+            <a:endParaRPr lang="en-US" sz="1200" dirty="0"/>
+          </a:p>
+        </p:txBody>
+      </p:sp>
+    </p:spTree>
+    <p:extLst>
+      <p:ext uri="{BB962C8B-B14F-4D97-AF65-F5344CB8AC3E}">
+        <p14:creationId xmlns:p14="http://schemas.microsoft.com/office/powerpoint/2010/main" val="1897561119"/>
+      </p:ext>
+    </p:extLst>
+  </p:cSld>
+  <p:clrMapOvr>
+    <a:masterClrMapping/>
+  </p:clrMapOvr>
+</p:sld>
+</file>
+
+<file path=ppt/slides/slide14.xml><?xml version="1.0" encoding="utf-8"?>
+<p:sld xmlns:a="http://schemas.openxmlformats.org/drawingml/2006/main" xmlns:r="http://schemas.openxmlformats.org/officeDocument/2006/relationships" xmlns:p="http://schemas.openxmlformats.org/presentationml/2006/main">
+  <p:cSld>
+    <p:spTree>
+      <p:nvGrpSpPr>
+        <p:cNvPr id="1" name=""/>
+        <p:cNvGrpSpPr/>
+        <p:nvPr/>
+      </p:nvGrpSpPr>
+      <p:grpSpPr>
+        <a:xfrm>
+          <a:off x="0" y="0"/>
+          <a:ext cx="0" cy="0"/>
+          <a:chOff x="0" y="0"/>
+          <a:chExt cx="0" cy="0"/>
+        </a:xfrm>
+      </p:grpSpPr>
+      <p:sp>
+        <p:nvSpPr>
+          <p:cNvPr id="2" name="Title 1"/>
+          <p:cNvSpPr>
+            <a:spLocks noGrp="1"/>
+          </p:cNvSpPr>
+          <p:nvPr>
+            <p:ph type="title"/>
+          </p:nvPr>
+        </p:nvSpPr>
+        <p:spPr/>
+        <p:txBody>
+          <a:bodyPr/>
+          <a:lstStyle/>
+          <a:p>
+            <a:r>
               <a:rPr lang="fi-FI" dirty="0" err="1" smtClean="0"/>
               <a:t>Other</a:t>
             </a:r>
@@ -10235,7 +12188,7 @@
 </p:sld>
 </file>
 
-<file path=ppt/slides/slide14.xml><?xml version="1.0" encoding="utf-8"?>
+<file path=ppt/slides/slide15.xml><?xml version="1.0" encoding="utf-8"?>
 <p:sld xmlns:a="http://schemas.openxmlformats.org/drawingml/2006/main" xmlns:r="http://schemas.openxmlformats.org/officeDocument/2006/relationships" xmlns:p="http://schemas.openxmlformats.org/presentationml/2006/main">
   <p:cSld>
     <p:spTree>
@@ -10453,7 +12406,7 @@
 </p:sld>
 </file>
 
-<file path=ppt/slides/slide15.xml><?xml version="1.0" encoding="utf-8"?>
+<file path=ppt/slides/slide16.xml><?xml version="1.0" encoding="utf-8"?>
 <p:sld xmlns:a="http://schemas.openxmlformats.org/drawingml/2006/main" xmlns:r="http://schemas.openxmlformats.org/officeDocument/2006/relationships" xmlns:p="http://schemas.openxmlformats.org/presentationml/2006/main">
   <p:cSld>
     <p:spTree>
@@ -12180,7 +14133,6 @@
               <a:rPr lang="fi-FI" sz="1000" dirty="0" smtClean="0"/>
               <a:t> SV0 </a:t>
             </a:r>
-            <a:endParaRPr lang="fi-FI" sz="1000" dirty="0" smtClean="0"/>
           </a:p>
         </p:txBody>
       </p:sp>
@@ -12711,7 +14663,6 @@
               <a:rPr lang="fi-FI" sz="1000" dirty="0" smtClean="0"/>
               <a:t> SyV0 </a:t>
             </a:r>
-            <a:endParaRPr lang="fi-FI" sz="1000" dirty="0" smtClean="0"/>
           </a:p>
         </p:txBody>
       </p:sp>
@@ -14199,11 +16150,7 @@
           <a:p>
             <a:r>
               <a:rPr lang="fi-FI" dirty="0" smtClean="0"/>
-              <a:t>Memory </a:t>
-            </a:r>
-            <a:r>
-              <a:rPr lang="fi-FI" dirty="0" err="1" smtClean="0"/>
-              <a:t>map</a:t>
+              <a:t>Memory map</a:t>
             </a:r>
             <a:endParaRPr lang="en-US" dirty="0"/>
           </a:p>
@@ -14439,7 +16386,7 @@
             <a:avLst/>
           </a:prstGeom>
           <a:solidFill>
-            <a:srgbClr val="00B050"/>
+            <a:srgbClr val="329964"/>
           </a:solidFill>
           <a:ln>
             <a:solidFill>
@@ -14495,7 +16442,7 @@
           <a:lstStyle/>
           <a:p>
             <a:r>
-              <a:rPr lang="fi-FI" sz="1200" i="1" dirty="0" err="1" smtClean="0"/>
+              <a:rPr lang="fi-FI" sz="1200" i="1" dirty="0" smtClean="0"/>
               <a:t>slave</a:t>
             </a:r>
             <a:r>
@@ -14570,16 +16517,8 @@
           <a:lstStyle/>
           <a:p>
             <a:r>
-              <a:rPr lang="fi-FI" sz="1200" i="1" dirty="0" err="1" smtClean="0"/>
-              <a:t>memory</a:t>
-            </a:r>
-            <a:r>
               <a:rPr lang="fi-FI" sz="1200" i="1" dirty="0" smtClean="0"/>
-              <a:t> </a:t>
-            </a:r>
-            <a:r>
-              <a:rPr lang="fi-FI" sz="1200" i="1" dirty="0" err="1" smtClean="0"/>
-              <a:t>map</a:t>
+              <a:t>memory map</a:t>
             </a:r>
             <a:r>
               <a:rPr lang="fi-FI" sz="1200" dirty="0" smtClean="0"/>
@@ -14874,16 +16813,8 @@
           <a:lstStyle/>
           <a:p>
             <a:r>
-              <a:rPr lang="fi-FI" sz="1200" i="1" dirty="0" err="1" smtClean="0"/>
-              <a:t>memory</a:t>
-            </a:r>
-            <a:r>
               <a:rPr lang="fi-FI" sz="1200" i="1" dirty="0" smtClean="0"/>
-              <a:t> </a:t>
-            </a:r>
-            <a:r>
-              <a:rPr lang="fi-FI" sz="1200" i="1" dirty="0" err="1" smtClean="0"/>
-              <a:t>map</a:t>
+              <a:t>memory map</a:t>
             </a:r>
             <a:r>
               <a:rPr lang="fi-FI" sz="1200" dirty="0" smtClean="0"/>

</xml_diff>

<commit_message>
[PERFECTIVE] Updated port and bus interface help.
</commit_message>
<xml_diff>
--- a/Help/images/img_sources.pptx
+++ b/Help/images/img_sources.pptx
@@ -319,7 +319,7 @@
           <a:p>
             <a:fld id="{54379204-0DE5-4A8F-A5DB-A53F02487498}" type="datetimeFigureOut">
               <a:rPr lang="en-US" smtClean="0"/>
-              <a:t>8/4/2017</a:t>
+              <a:t>6/12/2018</a:t>
             </a:fld>
             <a:endParaRPr lang="en-US"/>
           </a:p>
@@ -489,7 +489,7 @@
           <a:p>
             <a:fld id="{54379204-0DE5-4A8F-A5DB-A53F02487498}" type="datetimeFigureOut">
               <a:rPr lang="en-US" smtClean="0"/>
-              <a:t>8/4/2017</a:t>
+              <a:t>6/12/2018</a:t>
             </a:fld>
             <a:endParaRPr lang="en-US"/>
           </a:p>
@@ -669,7 +669,7 @@
           <a:p>
             <a:fld id="{54379204-0DE5-4A8F-A5DB-A53F02487498}" type="datetimeFigureOut">
               <a:rPr lang="en-US" smtClean="0"/>
-              <a:t>8/4/2017</a:t>
+              <a:t>6/12/2018</a:t>
             </a:fld>
             <a:endParaRPr lang="en-US"/>
           </a:p>
@@ -839,7 +839,7 @@
           <a:p>
             <a:fld id="{54379204-0DE5-4A8F-A5DB-A53F02487498}" type="datetimeFigureOut">
               <a:rPr lang="en-US" smtClean="0"/>
-              <a:t>8/4/2017</a:t>
+              <a:t>6/12/2018</a:t>
             </a:fld>
             <a:endParaRPr lang="en-US"/>
           </a:p>
@@ -1085,7 +1085,7 @@
           <a:p>
             <a:fld id="{54379204-0DE5-4A8F-A5DB-A53F02487498}" type="datetimeFigureOut">
               <a:rPr lang="en-US" smtClean="0"/>
-              <a:t>8/4/2017</a:t>
+              <a:t>6/12/2018</a:t>
             </a:fld>
             <a:endParaRPr lang="en-US"/>
           </a:p>
@@ -1373,7 +1373,7 @@
           <a:p>
             <a:fld id="{54379204-0DE5-4A8F-A5DB-A53F02487498}" type="datetimeFigureOut">
               <a:rPr lang="en-US" smtClean="0"/>
-              <a:t>8/4/2017</a:t>
+              <a:t>6/12/2018</a:t>
             </a:fld>
             <a:endParaRPr lang="en-US"/>
           </a:p>
@@ -1795,7 +1795,7 @@
           <a:p>
             <a:fld id="{54379204-0DE5-4A8F-A5DB-A53F02487498}" type="datetimeFigureOut">
               <a:rPr lang="en-US" smtClean="0"/>
-              <a:t>8/4/2017</a:t>
+              <a:t>6/12/2018</a:t>
             </a:fld>
             <a:endParaRPr lang="en-US"/>
           </a:p>
@@ -1913,7 +1913,7 @@
           <a:p>
             <a:fld id="{54379204-0DE5-4A8F-A5DB-A53F02487498}" type="datetimeFigureOut">
               <a:rPr lang="en-US" smtClean="0"/>
-              <a:t>8/4/2017</a:t>
+              <a:t>6/12/2018</a:t>
             </a:fld>
             <a:endParaRPr lang="en-US"/>
           </a:p>
@@ -2008,7 +2008,7 @@
           <a:p>
             <a:fld id="{54379204-0DE5-4A8F-A5DB-A53F02487498}" type="datetimeFigureOut">
               <a:rPr lang="en-US" smtClean="0"/>
-              <a:t>8/4/2017</a:t>
+              <a:t>6/12/2018</a:t>
             </a:fld>
             <a:endParaRPr lang="en-US"/>
           </a:p>
@@ -2285,7 +2285,7 @@
           <a:p>
             <a:fld id="{54379204-0DE5-4A8F-A5DB-A53F02487498}" type="datetimeFigureOut">
               <a:rPr lang="en-US" smtClean="0"/>
-              <a:t>8/4/2017</a:t>
+              <a:t>6/12/2018</a:t>
             </a:fld>
             <a:endParaRPr lang="en-US"/>
           </a:p>
@@ -2538,7 +2538,7 @@
           <a:p>
             <a:fld id="{54379204-0DE5-4A8F-A5DB-A53F02487498}" type="datetimeFigureOut">
               <a:rPr lang="en-US" smtClean="0"/>
-              <a:t>8/4/2017</a:t>
+              <a:t>6/12/2018</a:t>
             </a:fld>
             <a:endParaRPr lang="en-US"/>
           </a:p>
@@ -2751,7 +2751,7 @@
           <a:p>
             <a:fld id="{54379204-0DE5-4A8F-A5DB-A53F02487498}" type="datetimeFigureOut">
               <a:rPr lang="en-US" smtClean="0"/>
-              <a:t>8/4/2017</a:t>
+              <a:t>6/12/2018</a:t>
             </a:fld>
             <a:endParaRPr lang="en-US"/>
           </a:p>
@@ -8750,25 +8750,8 @@
                 <a:latin typeface="Calibri" pitchFamily="34" charset="0"/>
                 <a:cs typeface="Calibri" pitchFamily="34" charset="0"/>
               </a:rPr>
-              <a:t> </a:t>
-            </a:r>
-            <a:r>
-              <a:rPr lang="fi-FI" sz="1200" b="1" dirty="0" smtClean="0">
-                <a:solidFill>
-                  <a:prstClr val="black"/>
-                </a:solidFill>
-                <a:latin typeface="Calibri" pitchFamily="34" charset="0"/>
-                <a:cs typeface="Calibri" pitchFamily="34" charset="0"/>
-              </a:rPr>
-              <a:t>Accelerator</a:t>
-            </a:r>
-            <a:endParaRPr lang="fi-FI" sz="1200" b="1" dirty="0" smtClean="0">
-              <a:solidFill>
-                <a:prstClr val="black"/>
-              </a:solidFill>
-              <a:latin typeface="Calibri" pitchFamily="34" charset="0"/>
-              <a:cs typeface="Calibri" pitchFamily="34" charset="0"/>
-            </a:endParaRPr>
+              <a:t> Accelerator</a:t>
+            </a:r>
           </a:p>
         </p:txBody>
       </p:sp>
@@ -8848,11 +8831,7 @@
             </a:r>
             <a:r>
               <a:rPr lang="fi-FI" sz="1200" dirty="0" smtClean="0"/>
-              <a:t> </a:t>
-            </a:r>
-            <a:r>
-              <a:rPr lang="fi-FI" sz="1200" dirty="0" smtClean="0"/>
-              <a:t>MM0</a:t>
+              <a:t> MM0</a:t>
             </a:r>
             <a:endParaRPr lang="en-US" sz="1200" dirty="0"/>
           </a:p>
@@ -9071,19 +9050,11 @@
           <a:p>
             <a:r>
               <a:rPr lang="fi-FI" sz="1200" i="1" dirty="0" smtClean="0"/>
-              <a:t>memory </a:t>
-            </a:r>
-            <a:r>
-              <a:rPr lang="fi-FI" sz="1200" i="1" dirty="0" smtClean="0"/>
-              <a:t>map</a:t>
+              <a:t>memory map</a:t>
             </a:r>
             <a:r>
               <a:rPr lang="fi-FI" sz="1200" dirty="0" smtClean="0"/>
-              <a:t> </a:t>
-            </a:r>
-            <a:r>
-              <a:rPr lang="fi-FI" sz="1200" dirty="0" smtClean="0"/>
-              <a:t>MM1</a:t>
+              <a:t> MM1</a:t>
             </a:r>
             <a:endParaRPr lang="en-US" sz="1200" dirty="0"/>
           </a:p>
@@ -9772,25 +9743,8 @@
                 <a:latin typeface="Calibri" pitchFamily="34" charset="0"/>
                 <a:cs typeface="Calibri" pitchFamily="34" charset="0"/>
               </a:rPr>
-              <a:t> </a:t>
-            </a:r>
-            <a:r>
-              <a:rPr lang="fi-FI" sz="1200" b="1" dirty="0" smtClean="0">
-                <a:solidFill>
-                  <a:prstClr val="black"/>
-                </a:solidFill>
-                <a:latin typeface="Calibri" pitchFamily="34" charset="0"/>
-                <a:cs typeface="Calibri" pitchFamily="34" charset="0"/>
-              </a:rPr>
-              <a:t>Bridge</a:t>
-            </a:r>
-            <a:endParaRPr lang="fi-FI" sz="1200" b="1" dirty="0" smtClean="0">
-              <a:solidFill>
-                <a:prstClr val="black"/>
-              </a:solidFill>
-              <a:latin typeface="Calibri" pitchFamily="34" charset="0"/>
-              <a:cs typeface="Calibri" pitchFamily="34" charset="0"/>
-            </a:endParaRPr>
+              <a:t> Bridge</a:t>
+            </a:r>
           </a:p>
         </p:txBody>
       </p:sp>
@@ -9870,11 +9824,7 @@
             </a:r>
             <a:r>
               <a:rPr lang="fi-FI" sz="1200" dirty="0" smtClean="0"/>
-              <a:t> </a:t>
-            </a:r>
-            <a:r>
-              <a:rPr lang="fi-FI" sz="1200" dirty="0" smtClean="0"/>
-              <a:t>MM0</a:t>
+              <a:t> MM0</a:t>
             </a:r>
             <a:endParaRPr lang="en-US" sz="1200" dirty="0"/>
           </a:p>
@@ -10464,15 +10414,7 @@
             </a:r>
             <a:r>
               <a:rPr lang="fi-FI" sz="1200" dirty="0" smtClean="0"/>
-              <a:t>  </a:t>
-            </a:r>
-            <a:r>
-              <a:rPr lang="fi-FI" sz="1200" dirty="0" smtClean="0"/>
-              <a:t>accessI</a:t>
-            </a:r>
-            <a:r>
-              <a:rPr lang="fi-FI" sz="1200" dirty="0" smtClean="0"/>
-              <a:t>F</a:t>
+              <a:t>  accessIF</a:t>
             </a:r>
             <a:endParaRPr lang="en-US" sz="1200" dirty="0"/>
           </a:p>
@@ -10506,15 +10448,7 @@
             </a:r>
             <a:r>
               <a:rPr lang="fi-FI" sz="1200" dirty="0" smtClean="0"/>
-              <a:t>  </a:t>
-            </a:r>
-            <a:r>
-              <a:rPr lang="fi-FI" sz="1200" dirty="0" smtClean="0"/>
-              <a:t>accessI</a:t>
-            </a:r>
-            <a:r>
-              <a:rPr lang="fi-FI" sz="1200" dirty="0" smtClean="0"/>
-              <a:t>F</a:t>
+              <a:t>  accessIF</a:t>
             </a:r>
             <a:endParaRPr lang="en-US" sz="1200" dirty="0"/>
           </a:p>
@@ -15817,70 +15751,6 @@
           </a:p>
         </p:txBody>
       </p:sp>
-      <p:pic>
-        <p:nvPicPr>
-          <p:cNvPr id="1027" name="Picture 3"/>
-          <p:cNvPicPr>
-            <a:picLocks noChangeAspect="1" noChangeArrowheads="1"/>
-          </p:cNvPicPr>
-          <p:nvPr/>
-        </p:nvPicPr>
-        <p:blipFill>
-          <a:blip r:embed="rId2">
-            <a:extLst>
-              <a:ext uri="{28A0092B-C50C-407E-A947-70E740481C1C}">
-                <a14:useLocalDpi xmlns:a14="http://schemas.microsoft.com/office/drawing/2010/main" val="0"/>
-              </a:ext>
-            </a:extLst>
-          </a:blip>
-          <a:srcRect/>
-          <a:stretch>
-            <a:fillRect/>
-          </a:stretch>
-        </p:blipFill>
-        <p:spPr bwMode="auto">
-          <a:xfrm>
-            <a:off x="3491880" y="2132856"/>
-            <a:ext cx="5179304" cy="1140098"/>
-          </a:xfrm>
-          <a:prstGeom prst="rect">
-            <a:avLst/>
-          </a:prstGeom>
-          <a:noFill/>
-          <a:ln>
-            <a:noFill/>
-          </a:ln>
-          <a:effectLst/>
-          <a:extLst>
-            <a:ext uri="{909E8E84-426E-40DD-AFC4-6F175D3DCCD1}">
-              <a14:hiddenFill xmlns:a14="http://schemas.microsoft.com/office/drawing/2010/main">
-                <a:solidFill>
-                  <a:schemeClr val="accent1"/>
-                </a:solidFill>
-              </a14:hiddenFill>
-            </a:ext>
-            <a:ext uri="{91240B29-F687-4F45-9708-019B960494DF}">
-              <a14:hiddenLine xmlns:a14="http://schemas.microsoft.com/office/drawing/2010/main" w="9525">
-                <a:solidFill>
-                  <a:schemeClr val="tx1"/>
-                </a:solidFill>
-                <a:miter lim="800000"/>
-                <a:headEnd/>
-                <a:tailEnd/>
-              </a14:hiddenLine>
-            </a:ext>
-            <a:ext uri="{AF507438-7753-43E0-B8FC-AC1667EBCBE1}">
-              <a14:hiddenEffects xmlns:a14="http://schemas.microsoft.com/office/drawing/2010/main">
-                <a:effectLst>
-                  <a:outerShdw dist="35921" dir="2700000" algn="ctr" rotWithShape="0">
-                    <a:schemeClr val="bg2"/>
-                  </a:outerShdw>
-                </a:effectLst>
-              </a14:hiddenEffects>
-            </a:ext>
-          </a:extLst>
-        </p:spPr>
-      </p:pic>
       <p:sp>
         <p:nvSpPr>
           <p:cNvPr id="6" name="Content Placeholder 2"/>
@@ -16096,6 +15966,30 @@
           </a:p>
         </p:txBody>
       </p:sp>
+      <p:pic>
+        <p:nvPicPr>
+          <p:cNvPr id="4" name="Picture 3"/>
+          <p:cNvPicPr>
+            <a:picLocks noChangeAspect="1"/>
+          </p:cNvPicPr>
+          <p:nvPr/>
+        </p:nvPicPr>
+        <p:blipFill>
+          <a:blip r:embed="rId2"/>
+          <a:stretch>
+            <a:fillRect/>
+          </a:stretch>
+        </p:blipFill>
+        <p:spPr>
+          <a:xfrm>
+            <a:off x="3383868" y="1561573"/>
+            <a:ext cx="5625971" cy="2119200"/>
+          </a:xfrm>
+          <a:prstGeom prst="rect">
+            <a:avLst/>
+          </a:prstGeom>
+        </p:spPr>
+      </p:pic>
     </p:spTree>
     <p:extLst>
       <p:ext uri="{BB962C8B-B14F-4D97-AF65-F5344CB8AC3E}">

</xml_diff>

<commit_message>
[ADDITIVE] Added help page for subspace maps and added missing images for indirect interfaces help page.
</commit_message>
<xml_diff>
--- a/Help/images/img_sources.pptx
+++ b/Help/images/img_sources.pptx
@@ -15,12 +15,13 @@
     <p:sldId id="257" r:id="rId9"/>
     <p:sldId id="258" r:id="rId10"/>
     <p:sldId id="260" r:id="rId11"/>
-    <p:sldId id="270" r:id="rId12"/>
-    <p:sldId id="264" r:id="rId13"/>
-    <p:sldId id="271" r:id="rId14"/>
-    <p:sldId id="265" r:id="rId15"/>
-    <p:sldId id="266" r:id="rId16"/>
-    <p:sldId id="267" r:id="rId17"/>
+    <p:sldId id="272" r:id="rId12"/>
+    <p:sldId id="270" r:id="rId13"/>
+    <p:sldId id="264" r:id="rId14"/>
+    <p:sldId id="271" r:id="rId15"/>
+    <p:sldId id="265" r:id="rId16"/>
+    <p:sldId id="266" r:id="rId17"/>
+    <p:sldId id="267" r:id="rId18"/>
   </p:sldIdLst>
   <p:sldSz cx="9144000" cy="6858000" type="screen4x3"/>
   <p:notesSz cx="6858000" cy="9144000"/>
@@ -176,10 +177,9 @@
           <a:lstStyle/>
           <a:p>
             <a:r>
-              <a:rPr lang="en-US" smtClean="0"/>
+              <a:rPr lang="en-US"/>
               <a:t>Click to edit Master title style</a:t>
             </a:r>
-            <a:endParaRPr lang="en-US"/>
           </a:p>
         </p:txBody>
       </p:sp>
@@ -295,10 +295,9 @@
           </a:lstStyle>
           <a:p>
             <a:r>
-              <a:rPr lang="en-US" smtClean="0"/>
+              <a:rPr lang="en-US"/>
               <a:t>Click to edit Master subtitle style</a:t>
             </a:r>
-            <a:endParaRPr lang="en-US"/>
           </a:p>
         </p:txBody>
       </p:sp>
@@ -319,7 +318,7 @@
           <a:p>
             <a:fld id="{54379204-0DE5-4A8F-A5DB-A53F02487498}" type="datetimeFigureOut">
               <a:rPr lang="en-US" smtClean="0"/>
-              <a:t>6/12/2018</a:t>
+              <a:t>3/9/2022</a:t>
             </a:fld>
             <a:endParaRPr lang="en-US"/>
           </a:p>
@@ -413,10 +412,9 @@
           <a:lstStyle/>
           <a:p>
             <a:r>
-              <a:rPr lang="en-US" smtClean="0"/>
+              <a:rPr lang="en-US"/>
               <a:t>Click to edit Master title style</a:t>
             </a:r>
-            <a:endParaRPr lang="en-US"/>
           </a:p>
         </p:txBody>
       </p:sp>
@@ -437,38 +435,37 @@
           <a:p>
             <a:pPr lvl="0"/>
             <a:r>
-              <a:rPr lang="en-US" smtClean="0"/>
+              <a:rPr lang="en-US"/>
               <a:t>Click to edit Master text styles</a:t>
             </a:r>
           </a:p>
           <a:p>
             <a:pPr lvl="1"/>
             <a:r>
-              <a:rPr lang="en-US" smtClean="0"/>
+              <a:rPr lang="en-US"/>
               <a:t>Second level</a:t>
             </a:r>
           </a:p>
           <a:p>
             <a:pPr lvl="2"/>
             <a:r>
-              <a:rPr lang="en-US" smtClean="0"/>
+              <a:rPr lang="en-US"/>
               <a:t>Third level</a:t>
             </a:r>
           </a:p>
           <a:p>
             <a:pPr lvl="3"/>
             <a:r>
-              <a:rPr lang="en-US" smtClean="0"/>
+              <a:rPr lang="en-US"/>
               <a:t>Fourth level</a:t>
             </a:r>
           </a:p>
           <a:p>
             <a:pPr lvl="4"/>
             <a:r>
-              <a:rPr lang="en-US" smtClean="0"/>
+              <a:rPr lang="en-US"/>
               <a:t>Fifth level</a:t>
             </a:r>
-            <a:endParaRPr lang="en-US"/>
           </a:p>
         </p:txBody>
       </p:sp>
@@ -489,7 +486,7 @@
           <a:p>
             <a:fld id="{54379204-0DE5-4A8F-A5DB-A53F02487498}" type="datetimeFigureOut">
               <a:rPr lang="en-US" smtClean="0"/>
-              <a:t>6/12/2018</a:t>
+              <a:t>3/9/2022</a:t>
             </a:fld>
             <a:endParaRPr lang="en-US"/>
           </a:p>
@@ -588,10 +585,9 @@
           <a:lstStyle/>
           <a:p>
             <a:r>
-              <a:rPr lang="en-US" smtClean="0"/>
+              <a:rPr lang="en-US"/>
               <a:t>Click to edit Master title style</a:t>
             </a:r>
-            <a:endParaRPr lang="en-US"/>
           </a:p>
         </p:txBody>
       </p:sp>
@@ -617,38 +613,37 @@
           <a:p>
             <a:pPr lvl="0"/>
             <a:r>
-              <a:rPr lang="en-US" smtClean="0"/>
+              <a:rPr lang="en-US"/>
               <a:t>Click to edit Master text styles</a:t>
             </a:r>
           </a:p>
           <a:p>
             <a:pPr lvl="1"/>
             <a:r>
-              <a:rPr lang="en-US" smtClean="0"/>
+              <a:rPr lang="en-US"/>
               <a:t>Second level</a:t>
             </a:r>
           </a:p>
           <a:p>
             <a:pPr lvl="2"/>
             <a:r>
-              <a:rPr lang="en-US" smtClean="0"/>
+              <a:rPr lang="en-US"/>
               <a:t>Third level</a:t>
             </a:r>
           </a:p>
           <a:p>
             <a:pPr lvl="3"/>
             <a:r>
-              <a:rPr lang="en-US" smtClean="0"/>
+              <a:rPr lang="en-US"/>
               <a:t>Fourth level</a:t>
             </a:r>
           </a:p>
           <a:p>
             <a:pPr lvl="4"/>
             <a:r>
-              <a:rPr lang="en-US" smtClean="0"/>
+              <a:rPr lang="en-US"/>
               <a:t>Fifth level</a:t>
             </a:r>
-            <a:endParaRPr lang="en-US"/>
           </a:p>
         </p:txBody>
       </p:sp>
@@ -669,7 +664,7 @@
           <a:p>
             <a:fld id="{54379204-0DE5-4A8F-A5DB-A53F02487498}" type="datetimeFigureOut">
               <a:rPr lang="en-US" smtClean="0"/>
-              <a:t>6/12/2018</a:t>
+              <a:t>3/9/2022</a:t>
             </a:fld>
             <a:endParaRPr lang="en-US"/>
           </a:p>
@@ -763,10 +758,9 @@
           <a:lstStyle/>
           <a:p>
             <a:r>
-              <a:rPr lang="en-US" smtClean="0"/>
+              <a:rPr lang="en-US"/>
               <a:t>Click to edit Master title style</a:t>
             </a:r>
-            <a:endParaRPr lang="en-US"/>
           </a:p>
         </p:txBody>
       </p:sp>
@@ -787,38 +781,37 @@
           <a:p>
             <a:pPr lvl="0"/>
             <a:r>
-              <a:rPr lang="en-US" smtClean="0"/>
+              <a:rPr lang="en-US"/>
               <a:t>Click to edit Master text styles</a:t>
             </a:r>
           </a:p>
           <a:p>
             <a:pPr lvl="1"/>
             <a:r>
-              <a:rPr lang="en-US" smtClean="0"/>
+              <a:rPr lang="en-US"/>
               <a:t>Second level</a:t>
             </a:r>
           </a:p>
           <a:p>
             <a:pPr lvl="2"/>
             <a:r>
-              <a:rPr lang="en-US" smtClean="0"/>
+              <a:rPr lang="en-US"/>
               <a:t>Third level</a:t>
             </a:r>
           </a:p>
           <a:p>
             <a:pPr lvl="3"/>
             <a:r>
-              <a:rPr lang="en-US" smtClean="0"/>
+              <a:rPr lang="en-US"/>
               <a:t>Fourth level</a:t>
             </a:r>
           </a:p>
           <a:p>
             <a:pPr lvl="4"/>
             <a:r>
-              <a:rPr lang="en-US" smtClean="0"/>
+              <a:rPr lang="en-US"/>
               <a:t>Fifth level</a:t>
             </a:r>
-            <a:endParaRPr lang="en-US"/>
           </a:p>
         </p:txBody>
       </p:sp>
@@ -839,7 +832,7 @@
           <a:p>
             <a:fld id="{54379204-0DE5-4A8F-A5DB-A53F02487498}" type="datetimeFigureOut">
               <a:rPr lang="en-US" smtClean="0"/>
-              <a:t>6/12/2018</a:t>
+              <a:t>3/9/2022</a:t>
             </a:fld>
             <a:endParaRPr lang="en-US"/>
           </a:p>
@@ -942,10 +935,9 @@
           </a:lstStyle>
           <a:p>
             <a:r>
-              <a:rPr lang="en-US" smtClean="0"/>
+              <a:rPr lang="en-US"/>
               <a:t>Click to edit Master title style</a:t>
             </a:r>
-            <a:endParaRPr lang="en-US"/>
           </a:p>
         </p:txBody>
       </p:sp>
@@ -1062,7 +1054,7 @@
           <a:p>
             <a:pPr lvl="0"/>
             <a:r>
-              <a:rPr lang="en-US" smtClean="0"/>
+              <a:rPr lang="en-US"/>
               <a:t>Click to edit Master text styles</a:t>
             </a:r>
           </a:p>
@@ -1085,7 +1077,7 @@
           <a:p>
             <a:fld id="{54379204-0DE5-4A8F-A5DB-A53F02487498}" type="datetimeFigureOut">
               <a:rPr lang="en-US" smtClean="0"/>
-              <a:t>6/12/2018</a:t>
+              <a:t>3/9/2022</a:t>
             </a:fld>
             <a:endParaRPr lang="en-US"/>
           </a:p>
@@ -1179,10 +1171,9 @@
           <a:lstStyle/>
           <a:p>
             <a:r>
-              <a:rPr lang="en-US" smtClean="0"/>
+              <a:rPr lang="en-US"/>
               <a:t>Click to edit Master title style</a:t>
             </a:r>
-            <a:endParaRPr lang="en-US"/>
           </a:p>
         </p:txBody>
       </p:sp>
@@ -1236,38 +1227,37 @@
           <a:p>
             <a:pPr lvl="0"/>
             <a:r>
-              <a:rPr lang="en-US" smtClean="0"/>
+              <a:rPr lang="en-US"/>
               <a:t>Click to edit Master text styles</a:t>
             </a:r>
           </a:p>
           <a:p>
             <a:pPr lvl="1"/>
             <a:r>
-              <a:rPr lang="en-US" smtClean="0"/>
+              <a:rPr lang="en-US"/>
               <a:t>Second level</a:t>
             </a:r>
           </a:p>
           <a:p>
             <a:pPr lvl="2"/>
             <a:r>
-              <a:rPr lang="en-US" smtClean="0"/>
+              <a:rPr lang="en-US"/>
               <a:t>Third level</a:t>
             </a:r>
           </a:p>
           <a:p>
             <a:pPr lvl="3"/>
             <a:r>
-              <a:rPr lang="en-US" smtClean="0"/>
+              <a:rPr lang="en-US"/>
               <a:t>Fourth level</a:t>
             </a:r>
           </a:p>
           <a:p>
             <a:pPr lvl="4"/>
             <a:r>
-              <a:rPr lang="en-US" smtClean="0"/>
+              <a:rPr lang="en-US"/>
               <a:t>Fifth level</a:t>
             </a:r>
-            <a:endParaRPr lang="en-US"/>
           </a:p>
         </p:txBody>
       </p:sp>
@@ -1321,38 +1311,37 @@
           <a:p>
             <a:pPr lvl="0"/>
             <a:r>
-              <a:rPr lang="en-US" smtClean="0"/>
+              <a:rPr lang="en-US"/>
               <a:t>Click to edit Master text styles</a:t>
             </a:r>
           </a:p>
           <a:p>
             <a:pPr lvl="1"/>
             <a:r>
-              <a:rPr lang="en-US" smtClean="0"/>
+              <a:rPr lang="en-US"/>
               <a:t>Second level</a:t>
             </a:r>
           </a:p>
           <a:p>
             <a:pPr lvl="2"/>
             <a:r>
-              <a:rPr lang="en-US" smtClean="0"/>
+              <a:rPr lang="en-US"/>
               <a:t>Third level</a:t>
             </a:r>
           </a:p>
           <a:p>
             <a:pPr lvl="3"/>
             <a:r>
-              <a:rPr lang="en-US" smtClean="0"/>
+              <a:rPr lang="en-US"/>
               <a:t>Fourth level</a:t>
             </a:r>
           </a:p>
           <a:p>
             <a:pPr lvl="4"/>
             <a:r>
-              <a:rPr lang="en-US" smtClean="0"/>
+              <a:rPr lang="en-US"/>
               <a:t>Fifth level</a:t>
             </a:r>
-            <a:endParaRPr lang="en-US"/>
           </a:p>
         </p:txBody>
       </p:sp>
@@ -1373,7 +1362,7 @@
           <a:p>
             <a:fld id="{54379204-0DE5-4A8F-A5DB-A53F02487498}" type="datetimeFigureOut">
               <a:rPr lang="en-US" smtClean="0"/>
-              <a:t>6/12/2018</a:t>
+              <a:t>3/9/2022</a:t>
             </a:fld>
             <a:endParaRPr lang="en-US"/>
           </a:p>
@@ -1471,10 +1460,9 @@
           </a:lstStyle>
           <a:p>
             <a:r>
-              <a:rPr lang="en-US" smtClean="0"/>
+              <a:rPr lang="en-US"/>
               <a:t>Click to edit Master title style</a:t>
             </a:r>
-            <a:endParaRPr lang="en-US"/>
           </a:p>
         </p:txBody>
       </p:sp>
@@ -1537,7 +1525,7 @@
           <a:p>
             <a:pPr lvl="0"/>
             <a:r>
-              <a:rPr lang="en-US" smtClean="0"/>
+              <a:rPr lang="en-US"/>
               <a:t>Click to edit Master text styles</a:t>
             </a:r>
           </a:p>
@@ -1593,38 +1581,37 @@
           <a:p>
             <a:pPr lvl="0"/>
             <a:r>
-              <a:rPr lang="en-US" smtClean="0"/>
+              <a:rPr lang="en-US"/>
               <a:t>Click to edit Master text styles</a:t>
             </a:r>
           </a:p>
           <a:p>
             <a:pPr lvl="1"/>
             <a:r>
-              <a:rPr lang="en-US" smtClean="0"/>
+              <a:rPr lang="en-US"/>
               <a:t>Second level</a:t>
             </a:r>
           </a:p>
           <a:p>
             <a:pPr lvl="2"/>
             <a:r>
-              <a:rPr lang="en-US" smtClean="0"/>
+              <a:rPr lang="en-US"/>
               <a:t>Third level</a:t>
             </a:r>
           </a:p>
           <a:p>
             <a:pPr lvl="3"/>
             <a:r>
-              <a:rPr lang="en-US" smtClean="0"/>
+              <a:rPr lang="en-US"/>
               <a:t>Fourth level</a:t>
             </a:r>
           </a:p>
           <a:p>
             <a:pPr lvl="4"/>
             <a:r>
-              <a:rPr lang="en-US" smtClean="0"/>
+              <a:rPr lang="en-US"/>
               <a:t>Fifth level</a:t>
             </a:r>
-            <a:endParaRPr lang="en-US"/>
           </a:p>
         </p:txBody>
       </p:sp>
@@ -1687,7 +1674,7 @@
           <a:p>
             <a:pPr lvl="0"/>
             <a:r>
-              <a:rPr lang="en-US" smtClean="0"/>
+              <a:rPr lang="en-US"/>
               <a:t>Click to edit Master text styles</a:t>
             </a:r>
           </a:p>
@@ -1743,38 +1730,37 @@
           <a:p>
             <a:pPr lvl="0"/>
             <a:r>
-              <a:rPr lang="en-US" smtClean="0"/>
+              <a:rPr lang="en-US"/>
               <a:t>Click to edit Master text styles</a:t>
             </a:r>
           </a:p>
           <a:p>
             <a:pPr lvl="1"/>
             <a:r>
-              <a:rPr lang="en-US" smtClean="0"/>
+              <a:rPr lang="en-US"/>
               <a:t>Second level</a:t>
             </a:r>
           </a:p>
           <a:p>
             <a:pPr lvl="2"/>
             <a:r>
-              <a:rPr lang="en-US" smtClean="0"/>
+              <a:rPr lang="en-US"/>
               <a:t>Third level</a:t>
             </a:r>
           </a:p>
           <a:p>
             <a:pPr lvl="3"/>
             <a:r>
-              <a:rPr lang="en-US" smtClean="0"/>
+              <a:rPr lang="en-US"/>
               <a:t>Fourth level</a:t>
             </a:r>
           </a:p>
           <a:p>
             <a:pPr lvl="4"/>
             <a:r>
-              <a:rPr lang="en-US" smtClean="0"/>
+              <a:rPr lang="en-US"/>
               <a:t>Fifth level</a:t>
             </a:r>
-            <a:endParaRPr lang="en-US"/>
           </a:p>
         </p:txBody>
       </p:sp>
@@ -1795,7 +1781,7 @@
           <a:p>
             <a:fld id="{54379204-0DE5-4A8F-A5DB-A53F02487498}" type="datetimeFigureOut">
               <a:rPr lang="en-US" smtClean="0"/>
-              <a:t>6/12/2018</a:t>
+              <a:t>3/9/2022</a:t>
             </a:fld>
             <a:endParaRPr lang="en-US"/>
           </a:p>
@@ -1889,10 +1875,9 @@
           <a:lstStyle/>
           <a:p>
             <a:r>
-              <a:rPr lang="en-US" smtClean="0"/>
+              <a:rPr lang="en-US"/>
               <a:t>Click to edit Master title style</a:t>
             </a:r>
-            <a:endParaRPr lang="en-US"/>
           </a:p>
         </p:txBody>
       </p:sp>
@@ -1913,7 +1898,7 @@
           <a:p>
             <a:fld id="{54379204-0DE5-4A8F-A5DB-A53F02487498}" type="datetimeFigureOut">
               <a:rPr lang="en-US" smtClean="0"/>
-              <a:t>6/12/2018</a:t>
+              <a:t>3/9/2022</a:t>
             </a:fld>
             <a:endParaRPr lang="en-US"/>
           </a:p>
@@ -2008,7 +1993,7 @@
           <a:p>
             <a:fld id="{54379204-0DE5-4A8F-A5DB-A53F02487498}" type="datetimeFigureOut">
               <a:rPr lang="en-US" smtClean="0"/>
-              <a:t>6/12/2018</a:t>
+              <a:t>3/9/2022</a:t>
             </a:fld>
             <a:endParaRPr lang="en-US"/>
           </a:p>
@@ -2111,10 +2096,9 @@
           </a:lstStyle>
           <a:p>
             <a:r>
-              <a:rPr lang="en-US" smtClean="0"/>
+              <a:rPr lang="en-US"/>
               <a:t>Click to edit Master title style</a:t>
             </a:r>
-            <a:endParaRPr lang="en-US"/>
           </a:p>
         </p:txBody>
       </p:sp>
@@ -2168,38 +2152,37 @@
           <a:p>
             <a:pPr lvl="0"/>
             <a:r>
-              <a:rPr lang="en-US" smtClean="0"/>
+              <a:rPr lang="en-US"/>
               <a:t>Click to edit Master text styles</a:t>
             </a:r>
           </a:p>
           <a:p>
             <a:pPr lvl="1"/>
             <a:r>
-              <a:rPr lang="en-US" smtClean="0"/>
+              <a:rPr lang="en-US"/>
               <a:t>Second level</a:t>
             </a:r>
           </a:p>
           <a:p>
             <a:pPr lvl="2"/>
             <a:r>
-              <a:rPr lang="en-US" smtClean="0"/>
+              <a:rPr lang="en-US"/>
               <a:t>Third level</a:t>
             </a:r>
           </a:p>
           <a:p>
             <a:pPr lvl="3"/>
             <a:r>
-              <a:rPr lang="en-US" smtClean="0"/>
+              <a:rPr lang="en-US"/>
               <a:t>Fourth level</a:t>
             </a:r>
           </a:p>
           <a:p>
             <a:pPr lvl="4"/>
             <a:r>
-              <a:rPr lang="en-US" smtClean="0"/>
+              <a:rPr lang="en-US"/>
               <a:t>Fifth level</a:t>
             </a:r>
-            <a:endParaRPr lang="en-US"/>
           </a:p>
         </p:txBody>
       </p:sp>
@@ -2262,7 +2245,7 @@
           <a:p>
             <a:pPr lvl="0"/>
             <a:r>
-              <a:rPr lang="en-US" smtClean="0"/>
+              <a:rPr lang="en-US"/>
               <a:t>Click to edit Master text styles</a:t>
             </a:r>
           </a:p>
@@ -2285,7 +2268,7 @@
           <a:p>
             <a:fld id="{54379204-0DE5-4A8F-A5DB-A53F02487498}" type="datetimeFigureOut">
               <a:rPr lang="en-US" smtClean="0"/>
-              <a:t>6/12/2018</a:t>
+              <a:t>3/9/2022</a:t>
             </a:fld>
             <a:endParaRPr lang="en-US"/>
           </a:p>
@@ -2388,10 +2371,9 @@
           </a:lstStyle>
           <a:p>
             <a:r>
-              <a:rPr lang="en-US" smtClean="0"/>
+              <a:rPr lang="en-US"/>
               <a:t>Click to edit Master title style</a:t>
             </a:r>
-            <a:endParaRPr lang="en-US"/>
           </a:p>
         </p:txBody>
       </p:sp>
@@ -2515,7 +2497,7 @@
           <a:p>
             <a:pPr lvl="0"/>
             <a:r>
-              <a:rPr lang="en-US" smtClean="0"/>
+              <a:rPr lang="en-US"/>
               <a:t>Click to edit Master text styles</a:t>
             </a:r>
           </a:p>
@@ -2538,7 +2520,7 @@
           <a:p>
             <a:fld id="{54379204-0DE5-4A8F-A5DB-A53F02487498}" type="datetimeFigureOut">
               <a:rPr lang="en-US" smtClean="0"/>
-              <a:t>6/12/2018</a:t>
+              <a:t>3/9/2022</a:t>
             </a:fld>
             <a:endParaRPr lang="en-US"/>
           </a:p>
@@ -2647,10 +2629,9 @@
           <a:lstStyle/>
           <a:p>
             <a:r>
-              <a:rPr lang="en-US" smtClean="0"/>
+              <a:rPr lang="en-US"/>
               <a:t>Click to edit Master title style</a:t>
             </a:r>
-            <a:endParaRPr lang="en-US"/>
           </a:p>
         </p:txBody>
       </p:sp>
@@ -2681,38 +2662,37 @@
           <a:p>
             <a:pPr lvl="0"/>
             <a:r>
-              <a:rPr lang="en-US" smtClean="0"/>
+              <a:rPr lang="en-US"/>
               <a:t>Click to edit Master text styles</a:t>
             </a:r>
           </a:p>
           <a:p>
             <a:pPr lvl="1"/>
             <a:r>
-              <a:rPr lang="en-US" smtClean="0"/>
+              <a:rPr lang="en-US"/>
               <a:t>Second level</a:t>
             </a:r>
           </a:p>
           <a:p>
             <a:pPr lvl="2"/>
             <a:r>
-              <a:rPr lang="en-US" smtClean="0"/>
+              <a:rPr lang="en-US"/>
               <a:t>Third level</a:t>
             </a:r>
           </a:p>
           <a:p>
             <a:pPr lvl="3"/>
             <a:r>
-              <a:rPr lang="en-US" smtClean="0"/>
+              <a:rPr lang="en-US"/>
               <a:t>Fourth level</a:t>
             </a:r>
           </a:p>
           <a:p>
             <a:pPr lvl="4"/>
             <a:r>
-              <a:rPr lang="en-US" smtClean="0"/>
+              <a:rPr lang="en-US"/>
               <a:t>Fifth level</a:t>
             </a:r>
-            <a:endParaRPr lang="en-US"/>
           </a:p>
         </p:txBody>
       </p:sp>
@@ -2751,7 +2731,7 @@
           <a:p>
             <a:fld id="{54379204-0DE5-4A8F-A5DB-A53F02487498}" type="datetimeFigureOut">
               <a:rPr lang="en-US" smtClean="0"/>
-              <a:t>6/12/2018</a:t>
+              <a:t>3/9/2022</a:t>
             </a:fld>
             <a:endParaRPr lang="en-US"/>
           </a:p>
@@ -3142,31 +3122,31 @@
           <a:lstStyle/>
           <a:p>
             <a:r>
-              <a:rPr lang="fi-FI" dirty="0" err="1" smtClean="0"/>
+              <a:rPr lang="fi-FI" dirty="0" err="1"/>
               <a:t>Images</a:t>
             </a:r>
             <a:r>
-              <a:rPr lang="fi-FI" dirty="0" smtClean="0"/>
+              <a:rPr lang="fi-FI" dirty="0"/>
               <a:t> for </a:t>
             </a:r>
             <a:r>
-              <a:rPr lang="fi-FI" dirty="0" err="1" smtClean="0"/>
+              <a:rPr lang="fi-FI" dirty="0" err="1"/>
               <a:t>Kactus</a:t>
             </a:r>
             <a:r>
-              <a:rPr lang="fi-FI" dirty="0" smtClean="0"/>
+              <a:rPr lang="fi-FI" dirty="0"/>
               <a:t> </a:t>
             </a:r>
             <a:r>
-              <a:rPr lang="fi-FI" dirty="0" err="1" smtClean="0"/>
+              <a:rPr lang="fi-FI" dirty="0" err="1"/>
               <a:t>context</a:t>
             </a:r>
             <a:r>
-              <a:rPr lang="fi-FI" dirty="0" smtClean="0"/>
+              <a:rPr lang="fi-FI" dirty="0"/>
               <a:t> </a:t>
             </a:r>
             <a:r>
-              <a:rPr lang="fi-FI" dirty="0" err="1" smtClean="0"/>
+              <a:rPr lang="fi-FI" dirty="0" err="1"/>
               <a:t>helps</a:t>
             </a:r>
             <a:endParaRPr lang="en-US" dirty="0"/>
@@ -3189,29 +3169,29 @@
           <a:lstStyle/>
           <a:p>
             <a:r>
-              <a:rPr lang="fi-FI" dirty="0" err="1" smtClean="0"/>
+              <a:rPr lang="fi-FI" dirty="0" err="1"/>
               <a:t>March</a:t>
             </a:r>
             <a:r>
-              <a:rPr lang="fi-FI" dirty="0" smtClean="0"/>
+              <a:rPr lang="fi-FI" dirty="0"/>
               <a:t> 2013</a:t>
             </a:r>
           </a:p>
           <a:p>
             <a:r>
-              <a:rPr lang="fi-FI" dirty="0" err="1" smtClean="0"/>
+              <a:rPr lang="fi-FI" dirty="0" err="1"/>
               <a:t>Created</a:t>
             </a:r>
             <a:r>
-              <a:rPr lang="fi-FI" dirty="0" smtClean="0"/>
+              <a:rPr lang="fi-FI" dirty="0"/>
               <a:t> </a:t>
             </a:r>
             <a:r>
-              <a:rPr lang="fi-FI" dirty="0" err="1" smtClean="0"/>
+              <a:rPr lang="fi-FI" dirty="0" err="1"/>
               <a:t>by</a:t>
             </a:r>
             <a:r>
-              <a:rPr lang="fi-FI" dirty="0" smtClean="0"/>
+              <a:rPr lang="fi-FI" dirty="0"/>
               <a:t> Erno Salminen</a:t>
             </a:r>
             <a:endParaRPr lang="en-US" dirty="0"/>
@@ -3228,13 +3208,6 @@
   <p:clrMapOvr>
     <a:masterClrMapping/>
   </p:clrMapOvr>
-  <p:timing>
-    <p:tnLst>
-      <p:par>
-        <p:cTn id="1" dur="indefinite" restart="never" nodeType="tmRoot"/>
-      </p:par>
-    </p:tnLst>
-  </p:timing>
 </p:sld>
 </file>
 
@@ -3405,7 +3378,7 @@
               </a:spcAft>
             </a:pPr>
             <a:r>
-              <a:rPr lang="fi-FI" sz="1200" b="1" i="1" dirty="0" smtClean="0">
+              <a:rPr lang="fi-FI" sz="1200" b="1" i="1" dirty="0">
                 <a:solidFill>
                   <a:schemeClr val="bg1">
                     <a:lumMod val="50000"/>
@@ -3417,7 +3390,7 @@
               <a:t>component</a:t>
             </a:r>
             <a:r>
-              <a:rPr lang="fi-FI" sz="1200" b="1" dirty="0" smtClean="0">
+              <a:rPr lang="fi-FI" sz="1200" b="1" dirty="0">
                 <a:solidFill>
                   <a:schemeClr val="bg1">
                     <a:lumMod val="50000"/>
@@ -3581,7 +3554,7 @@
               </a:spcAft>
             </a:pPr>
             <a:r>
-              <a:rPr lang="fi-FI" sz="1200" b="1" i="1" dirty="0" smtClean="0">
+              <a:rPr lang="fi-FI" sz="1200" b="1" i="1" dirty="0">
                 <a:solidFill>
                   <a:schemeClr val="bg1">
                     <a:lumMod val="50000"/>
@@ -3593,7 +3566,7 @@
               <a:t>component</a:t>
             </a:r>
             <a:r>
-              <a:rPr lang="fi-FI" sz="1200" b="1" dirty="0" smtClean="0">
+              <a:rPr lang="fi-FI" sz="1200" b="1" dirty="0">
                 <a:solidFill>
                   <a:schemeClr val="bg1">
                     <a:lumMod val="50000"/>
@@ -3602,29 +3575,8 @@
                 <a:latin typeface="Calibri" pitchFamily="34" charset="0"/>
                 <a:cs typeface="Calibri" pitchFamily="34" charset="0"/>
               </a:rPr>
-              <a:t> Acc</a:t>
-            </a:r>
-            <a:r>
-              <a:rPr lang="fi-FI" sz="1200" b="1" dirty="0">
-                <a:solidFill>
-                  <a:schemeClr val="bg1">
-                    <a:lumMod val="50000"/>
-                  </a:schemeClr>
-                </a:solidFill>
-                <a:latin typeface="Calibri" pitchFamily="34" charset="0"/>
-                <a:cs typeface="Calibri" pitchFamily="34" charset="0"/>
-              </a:rPr>
-              <a:t>0</a:t>
-            </a:r>
-            <a:endParaRPr lang="fi-FI" sz="1200" b="1" dirty="0" smtClean="0">
-              <a:solidFill>
-                <a:schemeClr val="bg1">
-                  <a:lumMod val="50000"/>
-                </a:schemeClr>
-              </a:solidFill>
-              <a:latin typeface="Calibri" pitchFamily="34" charset="0"/>
-              <a:cs typeface="Calibri" pitchFamily="34" charset="0"/>
-            </a:endParaRPr>
+              <a:t> Acc0</a:t>
+            </a:r>
           </a:p>
         </p:txBody>
       </p:sp>
@@ -3644,11 +3596,11 @@
           <a:lstStyle/>
           <a:p>
             <a:r>
-              <a:rPr lang="fi-FI" dirty="0" smtClean="0"/>
+              <a:rPr lang="fi-FI" dirty="0"/>
               <a:t>Address </a:t>
             </a:r>
             <a:r>
-              <a:rPr lang="fi-FI" dirty="0" err="1" smtClean="0"/>
+              <a:rPr lang="fi-FI" dirty="0" err="1"/>
               <a:t>space</a:t>
             </a:r>
             <a:endParaRPr lang="en-US" dirty="0"/>
@@ -3676,7 +3628,7 @@
           <a:lstStyle/>
           <a:p>
             <a:r>
-              <a:rPr lang="fi-FI" dirty="0" smtClean="0"/>
+              <a:rPr lang="fi-FI" dirty="0"/>
               <a:t>a</a:t>
             </a:r>
             <a:endParaRPr lang="en-US" dirty="0"/>
@@ -3831,7 +3783,7 @@
               </a:spcAft>
             </a:pPr>
             <a:r>
-              <a:rPr lang="fi-FI" sz="1200" b="1" i="1" dirty="0" smtClean="0">
+              <a:rPr lang="fi-FI" sz="1200" b="1" i="1" dirty="0">
                 <a:solidFill>
                   <a:prstClr val="black"/>
                 </a:solidFill>
@@ -3841,7 +3793,7 @@
               <a:t>component</a:t>
             </a:r>
             <a:r>
-              <a:rPr lang="fi-FI" sz="1200" b="1" dirty="0" smtClean="0">
+              <a:rPr lang="fi-FI" sz="1200" b="1" dirty="0">
                 <a:solidFill>
                   <a:prstClr val="black"/>
                 </a:solidFill>
@@ -3924,15 +3876,15 @@
           <a:lstStyle/>
           <a:p>
             <a:r>
-              <a:rPr lang="fi-FI" sz="1200" i="1" dirty="0" smtClean="0"/>
+              <a:rPr lang="fi-FI" sz="1200" i="1" dirty="0"/>
               <a:t>master</a:t>
             </a:r>
             <a:r>
-              <a:rPr lang="fi-FI" sz="1200" dirty="0" smtClean="0"/>
+              <a:rPr lang="fi-FI" sz="1200" dirty="0"/>
               <a:t>  </a:t>
             </a:r>
             <a:r>
-              <a:rPr lang="fi-FI" sz="1200" dirty="0" err="1" smtClean="0"/>
+              <a:rPr lang="fi-FI" sz="1200" dirty="0" err="1"/>
               <a:t>MainIF</a:t>
             </a:r>
             <a:endParaRPr lang="en-US" sz="1200" dirty="0"/>
@@ -4002,15 +3954,15 @@
           <a:lstStyle/>
           <a:p>
             <a:r>
-              <a:rPr lang="fi-FI" sz="1200" i="1" dirty="0" smtClean="0"/>
+              <a:rPr lang="fi-FI" sz="1200" i="1" dirty="0"/>
               <a:t>addr </a:t>
             </a:r>
             <a:r>
-              <a:rPr lang="fi-FI" sz="1200" i="1" dirty="0" err="1" smtClean="0"/>
+              <a:rPr lang="fi-FI" sz="1200" i="1" dirty="0" err="1"/>
               <a:t>space</a:t>
             </a:r>
             <a:r>
-              <a:rPr lang="fi-FI" sz="1200" dirty="0" smtClean="0"/>
+              <a:rPr lang="fi-FI" sz="1200" dirty="0"/>
               <a:t> AS0</a:t>
             </a:r>
             <a:endParaRPr lang="en-US" sz="1200" dirty="0"/>
@@ -4100,7 +4052,7 @@
           <a:p>
             <a:pPr algn="ctr"/>
             <a:r>
-              <a:rPr lang="fi-FI" sz="1100" i="1" dirty="0" smtClean="0">
+              <a:rPr lang="fi-FI" sz="1100" i="1" dirty="0">
                 <a:solidFill>
                   <a:schemeClr val="tx1"/>
                 </a:solidFill>
@@ -4155,7 +4107,7 @@
           <a:p>
             <a:pPr algn="ctr"/>
             <a:r>
-              <a:rPr lang="fi-FI" sz="1100" i="1" dirty="0" smtClean="0">
+              <a:rPr lang="fi-FI" sz="1100" i="1" dirty="0">
                 <a:solidFill>
                   <a:schemeClr val="tx1"/>
                 </a:solidFill>
@@ -4320,7 +4272,7 @@
               </a:spcAft>
             </a:pPr>
             <a:r>
-              <a:rPr lang="fi-FI" sz="1200" b="1" i="1" dirty="0" smtClean="0">
+              <a:rPr lang="fi-FI" sz="1200" b="1" i="1" dirty="0">
                 <a:solidFill>
                   <a:schemeClr val="bg1">
                     <a:lumMod val="50000"/>
@@ -4332,7 +4284,7 @@
               <a:t>component</a:t>
             </a:r>
             <a:r>
-              <a:rPr lang="fi-FI" sz="1200" b="1" dirty="0" smtClean="0">
+              <a:rPr lang="fi-FI" sz="1200" b="1" dirty="0">
                 <a:solidFill>
                   <a:schemeClr val="bg1">
                     <a:lumMod val="50000"/>
@@ -4344,7 +4296,7 @@
               <a:t> </a:t>
             </a:r>
             <a:r>
-              <a:rPr lang="fi-FI" sz="1200" b="1" dirty="0" err="1" smtClean="0">
+              <a:rPr lang="fi-FI" sz="1200" b="1" dirty="0" err="1">
                 <a:solidFill>
                   <a:schemeClr val="bg1">
                     <a:lumMod val="50000"/>
@@ -4355,7 +4307,7 @@
               </a:rPr>
               <a:t>NetN</a:t>
             </a:r>
-            <a:endParaRPr lang="fi-FI" sz="1200" b="1" dirty="0" smtClean="0">
+            <a:endParaRPr lang="fi-FI" sz="1200" b="1" dirty="0">
               <a:solidFill>
                 <a:schemeClr val="bg1">
                   <a:lumMod val="50000"/>
@@ -4774,7 +4726,7 @@
           <a:p>
             <a:pPr algn="ctr"/>
             <a:r>
-              <a:rPr lang="fi-FI" sz="1100" i="1" dirty="0" err="1" smtClean="0">
+              <a:rPr lang="fi-FI" sz="1100" i="1" dirty="0" err="1">
                 <a:solidFill>
                   <a:schemeClr val="bg1">
                     <a:lumMod val="50000"/>
@@ -4840,7 +4792,7 @@
           <a:p>
             <a:pPr algn="ctr"/>
             <a:r>
-              <a:rPr lang="fi-FI" sz="1100" i="1" dirty="0" err="1" smtClean="0">
+              <a:rPr lang="fi-FI" sz="1100" i="1" dirty="0" err="1">
                 <a:solidFill>
                   <a:schemeClr val="bg1">
                     <a:lumMod val="50000"/>
@@ -5691,13 +5643,6 @@
   <p:clrMapOvr>
     <a:masterClrMapping/>
   </p:clrMapOvr>
-  <p:timing>
-    <p:tnLst>
-      <p:par>
-        <p:cTn id="1" dur="indefinite" restart="never" nodeType="tmRoot"/>
-      </p:par>
-    </p:tnLst>
-  </p:timing>
 </p:sld>
 </file>
 
@@ -5734,8 +5679,16 @@
           <a:lstStyle/>
           <a:p>
             <a:r>
-              <a:rPr lang="fi-FI" dirty="0" err="1" smtClean="0"/>
-              <a:t>CPUs</a:t>
+              <a:rPr lang="fi-FI" dirty="0" err="1"/>
+              <a:t>Subspace</a:t>
+            </a:r>
+            <a:r>
+              <a:rPr lang="fi-FI" dirty="0"/>
+              <a:t> </a:t>
+            </a:r>
+            <a:r>
+              <a:rPr lang="fi-FI" dirty="0" err="1"/>
+              <a:t>map</a:t>
             </a:r>
             <a:endParaRPr lang="en-US" dirty="0"/>
           </a:p>
@@ -5761,24 +5714,26 @@
           <a:bodyPr/>
           <a:lstStyle/>
           <a:p>
-            <a:r>
-              <a:rPr lang="fi-FI" dirty="0" smtClean="0"/>
-              <a:t>a</a:t>
-            </a:r>
             <a:endParaRPr lang="en-US" dirty="0"/>
           </a:p>
         </p:txBody>
       </p:sp>
       <p:sp>
         <p:nvSpPr>
-          <p:cNvPr id="4" name="Rectangle 3"/>
+          <p:cNvPr id="40" name="Rectangle 39">
+            <a:extLst>
+              <a:ext uri="{FF2B5EF4-FFF2-40B4-BE49-F238E27FC236}">
+                <a16:creationId xmlns:a16="http://schemas.microsoft.com/office/drawing/2014/main" id="{30CD9D5F-D864-4D01-B6EE-047521A5A9DB}"/>
+              </a:ext>
+            </a:extLst>
+          </p:cNvPr>
           <p:cNvSpPr/>
           <p:nvPr/>
         </p:nvSpPr>
         <p:spPr>
           <a:xfrm>
-            <a:off x="1655676" y="1988840"/>
-            <a:ext cx="2428843" cy="1332148"/>
+            <a:off x="6012160" y="1994718"/>
+            <a:ext cx="2012534" cy="2406390"/>
           </a:xfrm>
           <a:prstGeom prst="rect">
             <a:avLst/>
@@ -5917,7 +5872,7 @@
               </a:spcAft>
             </a:pPr>
             <a:r>
-              <a:rPr lang="fi-FI" sz="1200" b="1" i="1" dirty="0" smtClean="0">
+              <a:rPr lang="fi-FI" sz="1200" b="1" i="1" dirty="0" err="1">
                 <a:solidFill>
                   <a:prstClr val="black"/>
                 </a:solidFill>
@@ -5927,7 +5882,7 @@
               <a:t>component</a:t>
             </a:r>
             <a:r>
-              <a:rPr lang="fi-FI" sz="1200" b="1" dirty="0" smtClean="0">
+              <a:rPr lang="fi-FI" sz="1200" b="1" dirty="0">
                 <a:solidFill>
                   <a:prstClr val="black"/>
                 </a:solidFill>
@@ -5937,7 +5892,983 @@
               <a:t> </a:t>
             </a:r>
             <a:r>
-              <a:rPr lang="fi-FI" sz="1200" b="1" dirty="0" err="1" smtClean="0">
+              <a:rPr lang="fi-FI" sz="1200" b="1" dirty="0" err="1">
+                <a:solidFill>
+                  <a:prstClr val="black"/>
+                </a:solidFill>
+                <a:latin typeface="Calibri" pitchFamily="34" charset="0"/>
+                <a:cs typeface="Calibri" pitchFamily="34" charset="0"/>
+              </a:rPr>
+              <a:t>OpaqueBridge</a:t>
+            </a:r>
+            <a:endParaRPr lang="fi-FI" sz="1200" b="1" dirty="0">
+              <a:solidFill>
+                <a:prstClr val="black"/>
+              </a:solidFill>
+              <a:latin typeface="Calibri" pitchFamily="34" charset="0"/>
+              <a:cs typeface="Calibri" pitchFamily="34" charset="0"/>
+            </a:endParaRPr>
+          </a:p>
+        </p:txBody>
+      </p:sp>
+      <p:sp>
+        <p:nvSpPr>
+          <p:cNvPr id="46" name="Flowchart: Off-page Connector 45">
+            <a:extLst>
+              <a:ext uri="{FF2B5EF4-FFF2-40B4-BE49-F238E27FC236}">
+                <a16:creationId xmlns:a16="http://schemas.microsoft.com/office/drawing/2014/main" id="{8F3A154C-30EF-4A26-BCA6-BE999DC7BF00}"/>
+              </a:ext>
+            </a:extLst>
+          </p:cNvPr>
+          <p:cNvSpPr/>
+          <p:nvPr/>
+        </p:nvSpPr>
+        <p:spPr>
+          <a:xfrm rot="16200000">
+            <a:off x="5862941" y="2494627"/>
+            <a:ext cx="360040" cy="360000"/>
+          </a:xfrm>
+          <a:prstGeom prst="flowChartOffpageConnector">
+            <a:avLst/>
+          </a:prstGeom>
+          <a:solidFill>
+            <a:srgbClr val="329964"/>
+          </a:solidFill>
+          <a:ln>
+            <a:solidFill>
+              <a:schemeClr val="tx1"/>
+            </a:solidFill>
+          </a:ln>
+        </p:spPr>
+        <p:style>
+          <a:lnRef idx="2">
+            <a:schemeClr val="accent1">
+              <a:shade val="50000"/>
+            </a:schemeClr>
+          </a:lnRef>
+          <a:fillRef idx="1">
+            <a:schemeClr val="accent1"/>
+          </a:fillRef>
+          <a:effectRef idx="0">
+            <a:schemeClr val="accent1"/>
+          </a:effectRef>
+          <a:fontRef idx="minor">
+            <a:schemeClr val="lt1"/>
+          </a:fontRef>
+        </p:style>
+        <p:txBody>
+          <a:bodyPr rtlCol="0" anchor="ctr"/>
+          <a:lstStyle/>
+          <a:p>
+            <a:pPr algn="ctr"/>
+            <a:endParaRPr lang="en-US" sz="1200" dirty="0"/>
+          </a:p>
+        </p:txBody>
+      </p:sp>
+      <p:sp>
+        <p:nvSpPr>
+          <p:cNvPr id="47" name="TextBox 46">
+            <a:extLst>
+              <a:ext uri="{FF2B5EF4-FFF2-40B4-BE49-F238E27FC236}">
+                <a16:creationId xmlns:a16="http://schemas.microsoft.com/office/drawing/2014/main" id="{8DF5FFE1-3739-4723-8BE0-19F7ABEB38F3}"/>
+              </a:ext>
+            </a:extLst>
+          </p:cNvPr>
+          <p:cNvSpPr txBox="1"/>
+          <p:nvPr/>
+        </p:nvSpPr>
+        <p:spPr>
+          <a:xfrm>
+            <a:off x="6931303" y="2120614"/>
+            <a:ext cx="1012119" cy="461665"/>
+          </a:xfrm>
+          <a:prstGeom prst="rect">
+            <a:avLst/>
+          </a:prstGeom>
+          <a:noFill/>
+        </p:spPr>
+        <p:txBody>
+          <a:bodyPr wrap="square" rtlCol="0">
+            <a:spAutoFit/>
+          </a:bodyPr>
+          <a:lstStyle/>
+          <a:p>
+            <a:r>
+              <a:rPr lang="fi-FI" sz="1200" i="1" dirty="0"/>
+              <a:t>memory map</a:t>
+            </a:r>
+            <a:r>
+              <a:rPr lang="fi-FI" sz="1200" dirty="0"/>
+              <a:t> MM0</a:t>
+            </a:r>
+            <a:endParaRPr lang="en-US" sz="1200" dirty="0"/>
+          </a:p>
+        </p:txBody>
+      </p:sp>
+      <p:sp>
+        <p:nvSpPr>
+          <p:cNvPr id="48" name="Flowchart: Process 47">
+            <a:extLst>
+              <a:ext uri="{FF2B5EF4-FFF2-40B4-BE49-F238E27FC236}">
+                <a16:creationId xmlns:a16="http://schemas.microsoft.com/office/drawing/2014/main" id="{81CF2052-D7F8-4F36-AF09-B418080D3F02}"/>
+              </a:ext>
+            </a:extLst>
+          </p:cNvPr>
+          <p:cNvSpPr/>
+          <p:nvPr/>
+        </p:nvSpPr>
+        <p:spPr>
+          <a:xfrm>
+            <a:off x="7028098" y="2533238"/>
+            <a:ext cx="720000" cy="144000"/>
+          </a:xfrm>
+          <a:prstGeom prst="flowChartProcess">
+            <a:avLst/>
+          </a:prstGeom>
+          <a:solidFill>
+            <a:schemeClr val="bg1"/>
+          </a:solidFill>
+        </p:spPr>
+        <p:style>
+          <a:lnRef idx="2">
+            <a:schemeClr val="accent1">
+              <a:shade val="50000"/>
+            </a:schemeClr>
+          </a:lnRef>
+          <a:fillRef idx="1">
+            <a:schemeClr val="accent1"/>
+          </a:fillRef>
+          <a:effectRef idx="0">
+            <a:schemeClr val="accent1"/>
+          </a:effectRef>
+          <a:fontRef idx="minor">
+            <a:schemeClr val="lt1"/>
+          </a:fontRef>
+        </p:style>
+        <p:txBody>
+          <a:bodyPr rtlCol="0" anchor="ctr"/>
+          <a:lstStyle/>
+          <a:p>
+            <a:pPr algn="ctr"/>
+            <a:r>
+              <a:rPr lang="en-US" sz="1200" i="1" dirty="0">
+                <a:solidFill>
+                  <a:schemeClr val="tx1"/>
+                </a:solidFill>
+              </a:rPr>
+              <a:t>ab0</a:t>
+            </a:r>
+          </a:p>
+        </p:txBody>
+      </p:sp>
+      <p:sp>
+        <p:nvSpPr>
+          <p:cNvPr id="55" name="Left-Right Arrow 221">
+            <a:extLst>
+              <a:ext uri="{FF2B5EF4-FFF2-40B4-BE49-F238E27FC236}">
+                <a16:creationId xmlns:a16="http://schemas.microsoft.com/office/drawing/2014/main" id="{8072339A-75F1-4767-91D9-25FAF630E7A1}"/>
+              </a:ext>
+            </a:extLst>
+          </p:cNvPr>
+          <p:cNvSpPr/>
+          <p:nvPr/>
+        </p:nvSpPr>
+        <p:spPr>
+          <a:xfrm>
+            <a:off x="6270180" y="2562910"/>
+            <a:ext cx="696503" cy="215804"/>
+          </a:xfrm>
+          <a:prstGeom prst="leftRightArrow">
+            <a:avLst/>
+          </a:prstGeom>
+          <a:solidFill>
+            <a:schemeClr val="bg1"/>
+          </a:solidFill>
+        </p:spPr>
+        <p:style>
+          <a:lnRef idx="2">
+            <a:schemeClr val="accent1">
+              <a:shade val="50000"/>
+            </a:schemeClr>
+          </a:lnRef>
+          <a:fillRef idx="1">
+            <a:schemeClr val="accent1"/>
+          </a:fillRef>
+          <a:effectRef idx="0">
+            <a:schemeClr val="accent1"/>
+          </a:effectRef>
+          <a:fontRef idx="minor">
+            <a:schemeClr val="lt1"/>
+          </a:fontRef>
+        </p:style>
+        <p:txBody>
+          <a:bodyPr rtlCol="0" anchor="ctr"/>
+          <a:lstStyle/>
+          <a:p>
+            <a:pPr algn="ctr"/>
+            <a:endParaRPr lang="en-US" sz="1200" dirty="0"/>
+          </a:p>
+        </p:txBody>
+      </p:sp>
+      <p:sp>
+        <p:nvSpPr>
+          <p:cNvPr id="57" name="TextBox 56">
+            <a:extLst>
+              <a:ext uri="{FF2B5EF4-FFF2-40B4-BE49-F238E27FC236}">
+                <a16:creationId xmlns:a16="http://schemas.microsoft.com/office/drawing/2014/main" id="{9FDB8FE1-DB9D-4697-97EC-22FAE62C97CC}"/>
+              </a:ext>
+            </a:extLst>
+          </p:cNvPr>
+          <p:cNvSpPr txBox="1"/>
+          <p:nvPr/>
+        </p:nvSpPr>
+        <p:spPr>
+          <a:xfrm>
+            <a:off x="6063749" y="3351029"/>
+            <a:ext cx="1100622" cy="461665"/>
+          </a:xfrm>
+          <a:prstGeom prst="rect">
+            <a:avLst/>
+          </a:prstGeom>
+          <a:noFill/>
+        </p:spPr>
+        <p:txBody>
+          <a:bodyPr wrap="none" rtlCol="0">
+            <a:spAutoFit/>
+          </a:bodyPr>
+          <a:lstStyle/>
+          <a:p>
+            <a:r>
+              <a:rPr lang="fi-FI" sz="1200" i="1" dirty="0" err="1"/>
+              <a:t>Address</a:t>
+            </a:r>
+            <a:r>
+              <a:rPr lang="fi-FI" sz="1200" i="1" dirty="0"/>
+              <a:t> </a:t>
+            </a:r>
+            <a:r>
+              <a:rPr lang="fi-FI" sz="1200" i="1" dirty="0" err="1"/>
+              <a:t>space</a:t>
+            </a:r>
+            <a:r>
+              <a:rPr lang="fi-FI" sz="1200" i="1" dirty="0"/>
+              <a:t> </a:t>
+            </a:r>
+          </a:p>
+          <a:p>
+            <a:r>
+              <a:rPr lang="fi-FI" sz="1200" dirty="0"/>
+              <a:t>AS0</a:t>
+            </a:r>
+            <a:endParaRPr lang="en-US" sz="1200" dirty="0"/>
+          </a:p>
+        </p:txBody>
+      </p:sp>
+      <p:cxnSp>
+        <p:nvCxnSpPr>
+          <p:cNvPr id="58" name="Elbow Connector 225">
+            <a:extLst>
+              <a:ext uri="{FF2B5EF4-FFF2-40B4-BE49-F238E27FC236}">
+                <a16:creationId xmlns:a16="http://schemas.microsoft.com/office/drawing/2014/main" id="{D93C1344-186E-4C66-BA21-5A1FF992758A}"/>
+              </a:ext>
+            </a:extLst>
+          </p:cNvPr>
+          <p:cNvCxnSpPr>
+            <a:cxnSpLocks/>
+            <a:stCxn id="82" idx="3"/>
+            <a:endCxn id="67" idx="0"/>
+          </p:cNvCxnSpPr>
+          <p:nvPr/>
+        </p:nvCxnSpPr>
+        <p:spPr>
+          <a:xfrm>
+            <a:off x="7748098" y="2857128"/>
+            <a:ext cx="144722" cy="1208103"/>
+          </a:xfrm>
+          <a:prstGeom prst="bentConnector3">
+            <a:avLst>
+              <a:gd name="adj1" fmla="val 32449"/>
+            </a:avLst>
+          </a:prstGeom>
+          <a:ln>
+            <a:solidFill>
+              <a:schemeClr val="tx1"/>
+            </a:solidFill>
+            <a:tailEnd type="triangle"/>
+          </a:ln>
+        </p:spPr>
+        <p:style>
+          <a:lnRef idx="1">
+            <a:schemeClr val="accent1"/>
+          </a:lnRef>
+          <a:fillRef idx="0">
+            <a:schemeClr val="accent1"/>
+          </a:fillRef>
+          <a:effectRef idx="0">
+            <a:schemeClr val="accent1"/>
+          </a:effectRef>
+          <a:fontRef idx="minor">
+            <a:schemeClr val="tx1"/>
+          </a:fontRef>
+        </p:style>
+      </p:cxnSp>
+      <p:sp>
+        <p:nvSpPr>
+          <p:cNvPr id="67" name="Flowchart: Off-page Connector 66">
+            <a:extLst>
+              <a:ext uri="{FF2B5EF4-FFF2-40B4-BE49-F238E27FC236}">
+                <a16:creationId xmlns:a16="http://schemas.microsoft.com/office/drawing/2014/main" id="{3999F296-D088-43A2-9122-87C9230C7D20}"/>
+              </a:ext>
+            </a:extLst>
+          </p:cNvPr>
+          <p:cNvSpPr/>
+          <p:nvPr/>
+        </p:nvSpPr>
+        <p:spPr>
+          <a:xfrm rot="16200000">
+            <a:off x="7892800" y="3885231"/>
+            <a:ext cx="360040" cy="360000"/>
+          </a:xfrm>
+          <a:prstGeom prst="flowChartOffpageConnector">
+            <a:avLst/>
+          </a:prstGeom>
+          <a:solidFill>
+            <a:srgbClr val="32CBCB"/>
+          </a:solidFill>
+          <a:ln>
+            <a:solidFill>
+              <a:schemeClr val="tx1"/>
+            </a:solidFill>
+          </a:ln>
+        </p:spPr>
+        <p:style>
+          <a:lnRef idx="2">
+            <a:schemeClr val="accent1">
+              <a:shade val="50000"/>
+            </a:schemeClr>
+          </a:lnRef>
+          <a:fillRef idx="1">
+            <a:schemeClr val="accent1"/>
+          </a:fillRef>
+          <a:effectRef idx="0">
+            <a:schemeClr val="accent1"/>
+          </a:effectRef>
+          <a:fontRef idx="minor">
+            <a:schemeClr val="lt1"/>
+          </a:fontRef>
+        </p:style>
+        <p:txBody>
+          <a:bodyPr rtlCol="0" anchor="ctr"/>
+          <a:lstStyle/>
+          <a:p>
+            <a:pPr algn="ctr"/>
+            <a:endParaRPr lang="en-US" sz="1200" dirty="0"/>
+          </a:p>
+        </p:txBody>
+      </p:sp>
+      <p:sp>
+        <p:nvSpPr>
+          <p:cNvPr id="77" name="TextBox 76">
+            <a:extLst>
+              <a:ext uri="{FF2B5EF4-FFF2-40B4-BE49-F238E27FC236}">
+                <a16:creationId xmlns:a16="http://schemas.microsoft.com/office/drawing/2014/main" id="{455A683E-18C8-4DA2-8140-C89F7F52497F}"/>
+              </a:ext>
+            </a:extLst>
+          </p:cNvPr>
+          <p:cNvSpPr txBox="1"/>
+          <p:nvPr/>
+        </p:nvSpPr>
+        <p:spPr>
+          <a:xfrm>
+            <a:off x="7729048" y="3398350"/>
+            <a:ext cx="720040" cy="461665"/>
+          </a:xfrm>
+          <a:prstGeom prst="rect">
+            <a:avLst/>
+          </a:prstGeom>
+          <a:noFill/>
+        </p:spPr>
+        <p:txBody>
+          <a:bodyPr wrap="square" rtlCol="0">
+            <a:spAutoFit/>
+          </a:bodyPr>
+          <a:lstStyle/>
+          <a:p>
+            <a:r>
+              <a:rPr lang="fi-FI" sz="1200" i="1" dirty="0"/>
+              <a:t>master</a:t>
+            </a:r>
+            <a:r>
+              <a:rPr lang="fi-FI" sz="1200" dirty="0"/>
+              <a:t>  outIF</a:t>
+            </a:r>
+            <a:endParaRPr lang="en-US" sz="1200" dirty="0"/>
+          </a:p>
+        </p:txBody>
+      </p:sp>
+      <p:sp>
+        <p:nvSpPr>
+          <p:cNvPr id="78" name="TextBox 77">
+            <a:extLst>
+              <a:ext uri="{FF2B5EF4-FFF2-40B4-BE49-F238E27FC236}">
+                <a16:creationId xmlns:a16="http://schemas.microsoft.com/office/drawing/2014/main" id="{D6B36E5B-9A99-44E0-993E-94A93C5CCB95}"/>
+              </a:ext>
+            </a:extLst>
+          </p:cNvPr>
+          <p:cNvSpPr txBox="1"/>
+          <p:nvPr/>
+        </p:nvSpPr>
+        <p:spPr>
+          <a:xfrm>
+            <a:off x="6855974" y="3220263"/>
+            <a:ext cx="1216846" cy="246221"/>
+          </a:xfrm>
+          <a:prstGeom prst="rect">
+            <a:avLst/>
+          </a:prstGeom>
+          <a:noFill/>
+        </p:spPr>
+        <p:txBody>
+          <a:bodyPr wrap="square" rtlCol="0">
+            <a:spAutoFit/>
+          </a:bodyPr>
+          <a:lstStyle/>
+          <a:p>
+            <a:pPr algn="ctr"/>
+            <a:r>
+              <a:rPr lang="fi-FI" sz="1000" i="1" dirty="0"/>
+              <a:t>Master </a:t>
+            </a:r>
+            <a:r>
+              <a:rPr lang="fi-FI" sz="1000" i="1" dirty="0" err="1"/>
+              <a:t>ref</a:t>
+            </a:r>
+            <a:endParaRPr lang="en-US" sz="1000" dirty="0"/>
+          </a:p>
+        </p:txBody>
+      </p:sp>
+      <p:sp>
+        <p:nvSpPr>
+          <p:cNvPr id="79" name="TextBox 78">
+            <a:extLst>
+              <a:ext uri="{FF2B5EF4-FFF2-40B4-BE49-F238E27FC236}">
+                <a16:creationId xmlns:a16="http://schemas.microsoft.com/office/drawing/2014/main" id="{2A6FE078-1669-4166-B66C-3EE7D6AEADC9}"/>
+              </a:ext>
+            </a:extLst>
+          </p:cNvPr>
+          <p:cNvSpPr txBox="1"/>
+          <p:nvPr/>
+        </p:nvSpPr>
+        <p:spPr>
+          <a:xfrm>
+            <a:off x="5688164" y="2036777"/>
+            <a:ext cx="720040" cy="461665"/>
+          </a:xfrm>
+          <a:prstGeom prst="rect">
+            <a:avLst/>
+          </a:prstGeom>
+          <a:noFill/>
+        </p:spPr>
+        <p:txBody>
+          <a:bodyPr wrap="square" rtlCol="0">
+            <a:spAutoFit/>
+          </a:bodyPr>
+          <a:lstStyle/>
+          <a:p>
+            <a:r>
+              <a:rPr lang="fi-FI" sz="1200" i="1" dirty="0"/>
+              <a:t>slave</a:t>
+            </a:r>
+            <a:r>
+              <a:rPr lang="fi-FI" sz="1200" dirty="0"/>
+              <a:t>  accessIF</a:t>
+            </a:r>
+            <a:endParaRPr lang="en-US" sz="1200" dirty="0"/>
+          </a:p>
+        </p:txBody>
+      </p:sp>
+      <p:sp>
+        <p:nvSpPr>
+          <p:cNvPr id="80" name="Flowchart: Process 79">
+            <a:extLst>
+              <a:ext uri="{FF2B5EF4-FFF2-40B4-BE49-F238E27FC236}">
+                <a16:creationId xmlns:a16="http://schemas.microsoft.com/office/drawing/2014/main" id="{24ADF33C-7CA1-4C40-AB60-702FBDFFCF40}"/>
+              </a:ext>
+            </a:extLst>
+          </p:cNvPr>
+          <p:cNvSpPr/>
+          <p:nvPr/>
+        </p:nvSpPr>
+        <p:spPr>
+          <a:xfrm>
+            <a:off x="6246683" y="3826942"/>
+            <a:ext cx="720000" cy="368424"/>
+          </a:xfrm>
+          <a:prstGeom prst="flowChartProcess">
+            <a:avLst/>
+          </a:prstGeom>
+          <a:solidFill>
+            <a:schemeClr val="bg1"/>
+          </a:solidFill>
+        </p:spPr>
+        <p:style>
+          <a:lnRef idx="2">
+            <a:schemeClr val="accent1">
+              <a:shade val="50000"/>
+            </a:schemeClr>
+          </a:lnRef>
+          <a:fillRef idx="1">
+            <a:schemeClr val="accent1"/>
+          </a:fillRef>
+          <a:effectRef idx="0">
+            <a:schemeClr val="accent1"/>
+          </a:effectRef>
+          <a:fontRef idx="minor">
+            <a:schemeClr val="lt1"/>
+          </a:fontRef>
+        </p:style>
+        <p:txBody>
+          <a:bodyPr rtlCol="0" anchor="ctr"/>
+          <a:lstStyle/>
+          <a:p>
+            <a:pPr algn="ctr"/>
+            <a:r>
+              <a:rPr lang="fi-FI" sz="1100" i="1" dirty="0">
+                <a:solidFill>
+                  <a:schemeClr val="tx1"/>
+                </a:solidFill>
+              </a:rPr>
+              <a:t>seg0</a:t>
+            </a:r>
+            <a:endParaRPr lang="en-US" sz="1100" i="1" dirty="0">
+              <a:solidFill>
+                <a:schemeClr val="tx1"/>
+              </a:solidFill>
+            </a:endParaRPr>
+          </a:p>
+        </p:txBody>
+      </p:sp>
+      <p:sp>
+        <p:nvSpPr>
+          <p:cNvPr id="81" name="Left-Right Arrow 13">
+            <a:extLst>
+              <a:ext uri="{FF2B5EF4-FFF2-40B4-BE49-F238E27FC236}">
+                <a16:creationId xmlns:a16="http://schemas.microsoft.com/office/drawing/2014/main" id="{44D4B2DA-1B3D-4CC3-B2FE-BB9967113534}"/>
+              </a:ext>
+            </a:extLst>
+          </p:cNvPr>
+          <p:cNvSpPr/>
+          <p:nvPr/>
+        </p:nvSpPr>
+        <p:spPr>
+          <a:xfrm>
+            <a:off x="7046039" y="3933670"/>
+            <a:ext cx="719999" cy="215804"/>
+          </a:xfrm>
+          <a:prstGeom prst="leftRightArrow">
+            <a:avLst/>
+          </a:prstGeom>
+          <a:solidFill>
+            <a:schemeClr val="bg1"/>
+          </a:solidFill>
+        </p:spPr>
+        <p:style>
+          <a:lnRef idx="2">
+            <a:schemeClr val="accent1">
+              <a:shade val="50000"/>
+            </a:schemeClr>
+          </a:lnRef>
+          <a:fillRef idx="1">
+            <a:schemeClr val="accent1"/>
+          </a:fillRef>
+          <a:effectRef idx="0">
+            <a:schemeClr val="accent1"/>
+          </a:effectRef>
+          <a:fontRef idx="minor">
+            <a:schemeClr val="lt1"/>
+          </a:fontRef>
+        </p:style>
+        <p:txBody>
+          <a:bodyPr rtlCol="0" anchor="ctr"/>
+          <a:lstStyle/>
+          <a:p>
+            <a:pPr algn="ctr"/>
+            <a:endParaRPr lang="en-US" sz="1200"/>
+          </a:p>
+        </p:txBody>
+      </p:sp>
+      <p:sp>
+        <p:nvSpPr>
+          <p:cNvPr id="82" name="Flowchart: Process 81">
+            <a:extLst>
+              <a:ext uri="{FF2B5EF4-FFF2-40B4-BE49-F238E27FC236}">
+                <a16:creationId xmlns:a16="http://schemas.microsoft.com/office/drawing/2014/main" id="{BC6BB1BB-388E-4DBD-8E65-AE9ADA585EEB}"/>
+              </a:ext>
+            </a:extLst>
+          </p:cNvPr>
+          <p:cNvSpPr/>
+          <p:nvPr/>
+        </p:nvSpPr>
+        <p:spPr>
+          <a:xfrm>
+            <a:off x="7030650" y="2672916"/>
+            <a:ext cx="717448" cy="368424"/>
+          </a:xfrm>
+          <a:prstGeom prst="flowChartProcess">
+            <a:avLst/>
+          </a:prstGeom>
+          <a:solidFill>
+            <a:schemeClr val="bg1"/>
+          </a:solidFill>
+        </p:spPr>
+        <p:style>
+          <a:lnRef idx="2">
+            <a:schemeClr val="accent1">
+              <a:shade val="50000"/>
+            </a:schemeClr>
+          </a:lnRef>
+          <a:fillRef idx="1">
+            <a:schemeClr val="accent1"/>
+          </a:fillRef>
+          <a:effectRef idx="0">
+            <a:schemeClr val="accent1"/>
+          </a:effectRef>
+          <a:fontRef idx="minor">
+            <a:schemeClr val="lt1"/>
+          </a:fontRef>
+        </p:style>
+        <p:txBody>
+          <a:bodyPr rtlCol="0" anchor="ctr"/>
+          <a:lstStyle/>
+          <a:p>
+            <a:pPr algn="ctr"/>
+            <a:r>
+              <a:rPr lang="fi-FI" sz="1100" i="1" dirty="0">
+                <a:solidFill>
+                  <a:schemeClr val="tx1"/>
+                </a:solidFill>
+              </a:rPr>
+              <a:t>ssm0</a:t>
+            </a:r>
+            <a:endParaRPr lang="en-US" sz="1100" i="1" dirty="0">
+              <a:solidFill>
+                <a:schemeClr val="tx1"/>
+              </a:solidFill>
+            </a:endParaRPr>
+          </a:p>
+        </p:txBody>
+      </p:sp>
+      <p:sp>
+        <p:nvSpPr>
+          <p:cNvPr id="83" name="Flowchart: Process 82">
+            <a:extLst>
+              <a:ext uri="{FF2B5EF4-FFF2-40B4-BE49-F238E27FC236}">
+                <a16:creationId xmlns:a16="http://schemas.microsoft.com/office/drawing/2014/main" id="{5E5749BA-5488-4CEA-A6AE-5EA88806D16D}"/>
+              </a:ext>
+            </a:extLst>
+          </p:cNvPr>
+          <p:cNvSpPr/>
+          <p:nvPr/>
+        </p:nvSpPr>
+        <p:spPr>
+          <a:xfrm>
+            <a:off x="6246683" y="4195051"/>
+            <a:ext cx="720000" cy="225351"/>
+          </a:xfrm>
+          <a:prstGeom prst="flowChartProcess">
+            <a:avLst/>
+          </a:prstGeom>
+          <a:solidFill>
+            <a:schemeClr val="bg1"/>
+          </a:solidFill>
+        </p:spPr>
+        <p:style>
+          <a:lnRef idx="2">
+            <a:schemeClr val="accent1">
+              <a:shade val="50000"/>
+            </a:schemeClr>
+          </a:lnRef>
+          <a:fillRef idx="1">
+            <a:schemeClr val="accent1"/>
+          </a:fillRef>
+          <a:effectRef idx="0">
+            <a:schemeClr val="accent1"/>
+          </a:effectRef>
+          <a:fontRef idx="minor">
+            <a:schemeClr val="lt1"/>
+          </a:fontRef>
+        </p:style>
+        <p:txBody>
+          <a:bodyPr rtlCol="0" anchor="ctr"/>
+          <a:lstStyle/>
+          <a:p>
+            <a:pPr algn="ctr"/>
+            <a:r>
+              <a:rPr lang="fi-FI" sz="1100" i="1" dirty="0">
+                <a:solidFill>
+                  <a:schemeClr val="tx1"/>
+                </a:solidFill>
+              </a:rPr>
+              <a:t>seg1</a:t>
+            </a:r>
+            <a:endParaRPr lang="en-US" sz="1100" i="1" dirty="0">
+              <a:solidFill>
+                <a:schemeClr val="tx1"/>
+              </a:solidFill>
+            </a:endParaRPr>
+          </a:p>
+        </p:txBody>
+      </p:sp>
+    </p:spTree>
+    <p:extLst>
+      <p:ext uri="{BB962C8B-B14F-4D97-AF65-F5344CB8AC3E}">
+        <p14:creationId xmlns:p14="http://schemas.microsoft.com/office/powerpoint/2010/main" val="85488648"/>
+      </p:ext>
+    </p:extLst>
+  </p:cSld>
+  <p:clrMapOvr>
+    <a:masterClrMapping/>
+  </p:clrMapOvr>
+</p:sld>
+</file>
+
+<file path=ppt/slides/slide12.xml><?xml version="1.0" encoding="utf-8"?>
+<p:sld xmlns:a="http://schemas.openxmlformats.org/drawingml/2006/main" xmlns:r="http://schemas.openxmlformats.org/officeDocument/2006/relationships" xmlns:p="http://schemas.openxmlformats.org/presentationml/2006/main">
+  <p:cSld>
+    <p:spTree>
+      <p:nvGrpSpPr>
+        <p:cNvPr id="1" name=""/>
+        <p:cNvGrpSpPr/>
+        <p:nvPr/>
+      </p:nvGrpSpPr>
+      <p:grpSpPr>
+        <a:xfrm>
+          <a:off x="0" y="0"/>
+          <a:ext cx="0" cy="0"/>
+          <a:chOff x="0" y="0"/>
+          <a:chExt cx="0" cy="0"/>
+        </a:xfrm>
+      </p:grpSpPr>
+      <p:sp>
+        <p:nvSpPr>
+          <p:cNvPr id="2" name="Title 1"/>
+          <p:cNvSpPr>
+            <a:spLocks noGrp="1"/>
+          </p:cNvSpPr>
+          <p:nvPr>
+            <p:ph type="title"/>
+          </p:nvPr>
+        </p:nvSpPr>
+        <p:spPr/>
+        <p:txBody>
+          <a:bodyPr/>
+          <a:lstStyle/>
+          <a:p>
+            <a:r>
+              <a:rPr lang="fi-FI" dirty="0" err="1"/>
+              <a:t>CPUs</a:t>
+            </a:r>
+            <a:endParaRPr lang="en-US" dirty="0"/>
+          </a:p>
+        </p:txBody>
+      </p:sp>
+      <p:sp>
+        <p:nvSpPr>
+          <p:cNvPr id="3" name="Content Placeholder 2"/>
+          <p:cNvSpPr>
+            <a:spLocks noGrp="1"/>
+          </p:cNvSpPr>
+          <p:nvPr>
+            <p:ph idx="1"/>
+          </p:nvPr>
+        </p:nvSpPr>
+        <p:spPr>
+          <a:xfrm>
+            <a:off x="457200" y="4581128"/>
+            <a:ext cx="8229600" cy="1545035"/>
+          </a:xfrm>
+        </p:spPr>
+        <p:txBody>
+          <a:bodyPr/>
+          <a:lstStyle/>
+          <a:p>
+            <a:r>
+              <a:rPr lang="fi-FI" dirty="0"/>
+              <a:t>a</a:t>
+            </a:r>
+            <a:endParaRPr lang="en-US" dirty="0"/>
+          </a:p>
+        </p:txBody>
+      </p:sp>
+      <p:sp>
+        <p:nvSpPr>
+          <p:cNvPr id="4" name="Rectangle 3"/>
+          <p:cNvSpPr/>
+          <p:nvPr/>
+        </p:nvSpPr>
+        <p:spPr>
+          <a:xfrm>
+            <a:off x="1655676" y="1988840"/>
+            <a:ext cx="2428843" cy="1332148"/>
+          </a:xfrm>
+          <a:prstGeom prst="rect">
+            <a:avLst/>
+          </a:prstGeom>
+          <a:solidFill>
+            <a:srgbClr val="C3D0F0"/>
+          </a:solidFill>
+          <a:ln w="12700">
+            <a:solidFill>
+              <a:schemeClr val="tx1"/>
+            </a:solidFill>
+            <a:tailEnd type="none"/>
+          </a:ln>
+          <a:effectLst/>
+        </p:spPr>
+        <p:style>
+          <a:lnRef idx="1">
+            <a:schemeClr val="accent4"/>
+          </a:lnRef>
+          <a:fillRef idx="2">
+            <a:schemeClr val="accent4"/>
+          </a:fillRef>
+          <a:effectRef idx="1">
+            <a:schemeClr val="accent4"/>
+          </a:effectRef>
+          <a:fontRef idx="minor">
+            <a:schemeClr val="dk1"/>
+          </a:fontRef>
+        </p:style>
+        <p:txBody>
+          <a:bodyPr tIns="0" bIns="0" anchor="t" anchorCtr="0">
+            <a:noAutofit/>
+          </a:bodyPr>
+          <a:lstStyle>
+            <a:defPPr>
+              <a:defRPr lang="en-US"/>
+            </a:defPPr>
+            <a:lvl1pPr marL="0" algn="l" defTabSz="914400" rtl="0" eaLnBrk="1" latinLnBrk="0" hangingPunct="1">
+              <a:defRPr sz="1800" kern="1200">
+                <a:solidFill>
+                  <a:schemeClr val="dk1"/>
+                </a:solidFill>
+                <a:latin typeface="+mn-lt"/>
+                <a:ea typeface="+mn-ea"/>
+                <a:cs typeface="+mn-cs"/>
+              </a:defRPr>
+            </a:lvl1pPr>
+            <a:lvl2pPr marL="457200" algn="l" defTabSz="914400" rtl="0" eaLnBrk="1" latinLnBrk="0" hangingPunct="1">
+              <a:defRPr sz="1800" kern="1200">
+                <a:solidFill>
+                  <a:schemeClr val="dk1"/>
+                </a:solidFill>
+                <a:latin typeface="+mn-lt"/>
+                <a:ea typeface="+mn-ea"/>
+                <a:cs typeface="+mn-cs"/>
+              </a:defRPr>
+            </a:lvl2pPr>
+            <a:lvl3pPr marL="914400" algn="l" defTabSz="914400" rtl="0" eaLnBrk="1" latinLnBrk="0" hangingPunct="1">
+              <a:defRPr sz="1800" kern="1200">
+                <a:solidFill>
+                  <a:schemeClr val="dk1"/>
+                </a:solidFill>
+                <a:latin typeface="+mn-lt"/>
+                <a:ea typeface="+mn-ea"/>
+                <a:cs typeface="+mn-cs"/>
+              </a:defRPr>
+            </a:lvl3pPr>
+            <a:lvl4pPr marL="1371600" algn="l" defTabSz="914400" rtl="0" eaLnBrk="1" latinLnBrk="0" hangingPunct="1">
+              <a:defRPr sz="1800" kern="1200">
+                <a:solidFill>
+                  <a:schemeClr val="dk1"/>
+                </a:solidFill>
+                <a:latin typeface="+mn-lt"/>
+                <a:ea typeface="+mn-ea"/>
+                <a:cs typeface="+mn-cs"/>
+              </a:defRPr>
+            </a:lvl4pPr>
+            <a:lvl5pPr marL="1828800" algn="l" defTabSz="914400" rtl="0" eaLnBrk="1" latinLnBrk="0" hangingPunct="1">
+              <a:defRPr sz="1800" kern="1200">
+                <a:solidFill>
+                  <a:schemeClr val="dk1"/>
+                </a:solidFill>
+                <a:latin typeface="+mn-lt"/>
+                <a:ea typeface="+mn-ea"/>
+                <a:cs typeface="+mn-cs"/>
+              </a:defRPr>
+            </a:lvl5pPr>
+            <a:lvl6pPr marL="2286000" algn="l" defTabSz="914400" rtl="0" eaLnBrk="1" latinLnBrk="0" hangingPunct="1">
+              <a:defRPr sz="1800" kern="1200">
+                <a:solidFill>
+                  <a:schemeClr val="dk1"/>
+                </a:solidFill>
+                <a:latin typeface="+mn-lt"/>
+                <a:ea typeface="+mn-ea"/>
+                <a:cs typeface="+mn-cs"/>
+              </a:defRPr>
+            </a:lvl6pPr>
+            <a:lvl7pPr marL="2743200" algn="l" defTabSz="914400" rtl="0" eaLnBrk="1" latinLnBrk="0" hangingPunct="1">
+              <a:defRPr sz="1800" kern="1200">
+                <a:solidFill>
+                  <a:schemeClr val="dk1"/>
+                </a:solidFill>
+                <a:latin typeface="+mn-lt"/>
+                <a:ea typeface="+mn-ea"/>
+                <a:cs typeface="+mn-cs"/>
+              </a:defRPr>
+            </a:lvl7pPr>
+            <a:lvl8pPr marL="3200400" algn="l" defTabSz="914400" rtl="0" eaLnBrk="1" latinLnBrk="0" hangingPunct="1">
+              <a:defRPr sz="1800" kern="1200">
+                <a:solidFill>
+                  <a:schemeClr val="dk1"/>
+                </a:solidFill>
+                <a:latin typeface="+mn-lt"/>
+                <a:ea typeface="+mn-ea"/>
+                <a:cs typeface="+mn-cs"/>
+              </a:defRPr>
+            </a:lvl8pPr>
+            <a:lvl9pPr marL="3657600" algn="l" defTabSz="914400" rtl="0" eaLnBrk="1" latinLnBrk="0" hangingPunct="1">
+              <a:defRPr sz="1800" kern="1200">
+                <a:solidFill>
+                  <a:schemeClr val="dk1"/>
+                </a:solidFill>
+                <a:latin typeface="+mn-lt"/>
+                <a:ea typeface="+mn-ea"/>
+                <a:cs typeface="+mn-cs"/>
+              </a:defRPr>
+            </a:lvl9pPr>
+          </a:lstStyle>
+          <a:p>
+            <a:pPr algn="ctr" fontAlgn="base">
+              <a:spcBef>
+                <a:spcPct val="0"/>
+              </a:spcBef>
+              <a:spcAft>
+                <a:spcPct val="0"/>
+              </a:spcAft>
+            </a:pPr>
+            <a:r>
+              <a:rPr lang="fi-FI" sz="1200" b="1" i="1" dirty="0">
+                <a:solidFill>
+                  <a:prstClr val="black"/>
+                </a:solidFill>
+                <a:latin typeface="Calibri" pitchFamily="34" charset="0"/>
+                <a:cs typeface="Calibri" pitchFamily="34" charset="0"/>
+              </a:rPr>
+              <a:t>component</a:t>
+            </a:r>
+            <a:r>
+              <a:rPr lang="fi-FI" sz="1200" b="1" dirty="0">
+                <a:solidFill>
+                  <a:prstClr val="black"/>
+                </a:solidFill>
+                <a:latin typeface="Calibri" pitchFamily="34" charset="0"/>
+                <a:cs typeface="Calibri" pitchFamily="34" charset="0"/>
+              </a:rPr>
+              <a:t> </a:t>
+            </a:r>
+            <a:r>
+              <a:rPr lang="fi-FI" sz="1200" b="1" dirty="0" err="1">
                 <a:solidFill>
                   <a:prstClr val="black"/>
                 </a:solidFill>
@@ -5946,7 +6877,7 @@
               </a:rPr>
               <a:t>DualCoreSoC</a:t>
             </a:r>
-            <a:endParaRPr lang="fi-FI" sz="1200" b="1" dirty="0" smtClean="0">
+            <a:endParaRPr lang="fi-FI" sz="1200" b="1" dirty="0">
               <a:solidFill>
                 <a:prstClr val="black"/>
               </a:solidFill>
@@ -6124,7 +7055,7 @@
           <a:p>
             <a:pPr algn="ctr"/>
             <a:r>
-              <a:rPr lang="fi-FI" sz="1100" i="1" dirty="0" smtClean="0">
+              <a:rPr lang="fi-FI" sz="1100" i="1" dirty="0">
                 <a:solidFill>
                   <a:schemeClr val="tx1"/>
                 </a:solidFill>
@@ -6132,7 +7063,7 @@
               <a:t>Addr </a:t>
             </a:r>
             <a:r>
-              <a:rPr lang="fi-FI" sz="1100" i="1" dirty="0" err="1" smtClean="0">
+              <a:rPr lang="fi-FI" sz="1100" i="1" dirty="0" err="1">
                 <a:solidFill>
                   <a:schemeClr val="tx1"/>
                 </a:solidFill>
@@ -6140,7 +7071,7 @@
               <a:t>space</a:t>
             </a:r>
             <a:r>
-              <a:rPr lang="fi-FI" sz="1100" i="1" dirty="0" smtClean="0">
+              <a:rPr lang="fi-FI" sz="1100" i="1" dirty="0">
                 <a:solidFill>
                   <a:schemeClr val="tx1"/>
                 </a:solidFill>
@@ -6606,7 +7537,7 @@
           <a:p>
             <a:pPr algn="ctr"/>
             <a:r>
-              <a:rPr lang="fi-FI" sz="1100" i="1" dirty="0" err="1" smtClean="0">
+              <a:rPr lang="fi-FI" sz="1100" i="1" dirty="0" err="1">
                 <a:solidFill>
                   <a:schemeClr val="tx1"/>
                 </a:solidFill>
@@ -6661,7 +7592,7 @@
           <a:p>
             <a:pPr algn="ctr"/>
             <a:r>
-              <a:rPr lang="fi-FI" sz="1100" i="1" dirty="0" smtClean="0">
+              <a:rPr lang="fi-FI" sz="1100" i="1" dirty="0">
                 <a:solidFill>
                   <a:schemeClr val="tx1"/>
                 </a:solidFill>
@@ -6669,7 +7600,7 @@
               <a:t>Addr </a:t>
             </a:r>
             <a:r>
-              <a:rPr lang="fi-FI" sz="1100" i="1" dirty="0" err="1" smtClean="0">
+              <a:rPr lang="fi-FI" sz="1100" i="1" dirty="0" err="1">
                 <a:solidFill>
                   <a:schemeClr val="tx1"/>
                 </a:solidFill>
@@ -6677,7 +7608,7 @@
               <a:t>space</a:t>
             </a:r>
             <a:r>
-              <a:rPr lang="fi-FI" sz="1100" i="1" dirty="0" smtClean="0">
+              <a:rPr lang="fi-FI" sz="1100" i="1" dirty="0">
                 <a:solidFill>
                   <a:schemeClr val="tx1"/>
                 </a:solidFill>
@@ -6685,7 +7616,7 @@
               <a:t> w/ </a:t>
             </a:r>
             <a:r>
-              <a:rPr lang="fi-FI" sz="1100" i="1" dirty="0" err="1" smtClean="0">
+              <a:rPr lang="fi-FI" sz="1100" i="1" dirty="0" err="1">
                 <a:solidFill>
                   <a:schemeClr val="tx1"/>
                 </a:solidFill>
@@ -6693,7 +7624,7 @@
               <a:t>local</a:t>
             </a:r>
             <a:r>
-              <a:rPr lang="fi-FI" sz="1100" i="1" dirty="0" smtClean="0">
+              <a:rPr lang="fi-FI" sz="1100" i="1" dirty="0">
                 <a:solidFill>
                   <a:schemeClr val="tx1"/>
                 </a:solidFill>
@@ -6701,7 +7632,7 @@
               <a:t> </a:t>
             </a:r>
             <a:r>
-              <a:rPr lang="fi-FI" sz="1100" i="1" dirty="0" err="1" smtClean="0">
+              <a:rPr lang="fi-FI" sz="1100" i="1" dirty="0" err="1">
                 <a:solidFill>
                   <a:schemeClr val="tx1"/>
                 </a:solidFill>
@@ -6709,7 +7640,7 @@
               <a:t>mem</a:t>
             </a:r>
             <a:r>
-              <a:rPr lang="fi-FI" sz="1100" i="1" dirty="0" smtClean="0">
+              <a:rPr lang="fi-FI" sz="1100" i="1" dirty="0">
                 <a:solidFill>
                   <a:schemeClr val="tx1"/>
                 </a:solidFill>
@@ -6803,7 +7734,7 @@
           <a:p>
             <a:pPr algn="ctr"/>
             <a:r>
-              <a:rPr lang="fi-FI" sz="1100" i="1" dirty="0" err="1" smtClean="0">
+              <a:rPr lang="fi-FI" sz="1100" i="1" dirty="0" err="1">
                 <a:solidFill>
                   <a:schemeClr val="tx1"/>
                 </a:solidFill>
@@ -6880,7 +7811,7 @@
           <a:lstStyle/>
           <a:p>
             <a:r>
-              <a:rPr lang="fi-FI" dirty="0" smtClean="0"/>
+              <a:rPr lang="fi-FI" dirty="0"/>
               <a:t>…</a:t>
             </a:r>
             <a:endParaRPr lang="en-US" dirty="0"/>
@@ -6897,17 +7828,10 @@
   <p:clrMapOvr>
     <a:masterClrMapping/>
   </p:clrMapOvr>
-  <p:timing>
-    <p:tnLst>
-      <p:par>
-        <p:cTn id="1" dur="indefinite" restart="never" nodeType="tmRoot"/>
-      </p:par>
-    </p:tnLst>
-  </p:timing>
 </p:sld>
 </file>
 
-<file path=ppt/slides/slide12.xml><?xml version="1.0" encoding="utf-8"?>
+<file path=ppt/slides/slide13.xml><?xml version="1.0" encoding="utf-8"?>
 <p:sld xmlns:a="http://schemas.openxmlformats.org/drawingml/2006/main" xmlns:r="http://schemas.openxmlformats.org/officeDocument/2006/relationships" xmlns:p="http://schemas.openxmlformats.org/presentationml/2006/main">
   <p:cSld>
     <p:spTree>
@@ -6942,31 +7866,31 @@
           <a:lstStyle/>
           <a:p>
             <a:r>
-              <a:rPr lang="fi-FI" dirty="0" err="1" smtClean="0"/>
+              <a:rPr lang="fi-FI" dirty="0" err="1"/>
               <a:t>Relation</a:t>
             </a:r>
             <a:r>
-              <a:rPr lang="fi-FI" dirty="0" smtClean="0"/>
+              <a:rPr lang="fi-FI" dirty="0"/>
               <a:t> </a:t>
             </a:r>
             <a:r>
-              <a:rPr lang="fi-FI" dirty="0" err="1" smtClean="0"/>
+              <a:rPr lang="fi-FI" dirty="0" err="1"/>
               <a:t>between</a:t>
             </a:r>
             <a:r>
-              <a:rPr lang="fi-FI" dirty="0" smtClean="0"/>
+              <a:rPr lang="fi-FI" dirty="0"/>
               <a:t> </a:t>
             </a:r>
             <a:r>
-              <a:rPr lang="fi-FI" dirty="0" err="1" smtClean="0"/>
+              <a:rPr lang="fi-FI" dirty="0" err="1"/>
               <a:t>bus</a:t>
             </a:r>
             <a:r>
-              <a:rPr lang="fi-FI" dirty="0" smtClean="0"/>
+              <a:rPr lang="fi-FI" dirty="0"/>
               <a:t> interface and </a:t>
             </a:r>
             <a:r>
-              <a:rPr lang="fi-FI" dirty="0" err="1" smtClean="0"/>
+              <a:rPr lang="fi-FI" dirty="0" err="1"/>
               <a:t>ports</a:t>
             </a:r>
             <a:endParaRPr lang="en-US" dirty="0"/>
@@ -7145,7 +8069,7 @@
               </a:spcAft>
             </a:pPr>
             <a:r>
-              <a:rPr lang="fi-FI" sz="1200" b="1" i="1" dirty="0" smtClean="0">
+              <a:rPr lang="fi-FI" sz="1200" b="1" i="1" dirty="0">
                 <a:solidFill>
                   <a:prstClr val="black"/>
                 </a:solidFill>
@@ -7155,7 +8079,7 @@
               <a:t>component</a:t>
             </a:r>
             <a:r>
-              <a:rPr lang="fi-FI" sz="1200" b="1" dirty="0" smtClean="0">
+              <a:rPr lang="fi-FI" sz="1200" b="1" dirty="0">
                 <a:solidFill>
                   <a:prstClr val="black"/>
                 </a:solidFill>
@@ -7165,7 +8089,7 @@
               <a:t> </a:t>
             </a:r>
             <a:r>
-              <a:rPr lang="fi-FI" sz="1200" b="1" dirty="0" err="1" smtClean="0">
+              <a:rPr lang="fi-FI" sz="1200" b="1" dirty="0" err="1">
                 <a:solidFill>
                   <a:prstClr val="black"/>
                 </a:solidFill>
@@ -7174,7 +8098,7 @@
               </a:rPr>
               <a:t>Foo</a:t>
             </a:r>
-            <a:endParaRPr lang="fi-FI" sz="1200" b="1" dirty="0" smtClean="0">
+            <a:endParaRPr lang="fi-FI" sz="1200" b="1" dirty="0">
               <a:solidFill>
                 <a:prstClr val="black"/>
               </a:solidFill>
@@ -7207,19 +8131,19 @@
           <a:lstStyle/>
           <a:p>
             <a:r>
-              <a:rPr lang="fi-FI" sz="1200" i="1" dirty="0" smtClean="0"/>
+              <a:rPr lang="fi-FI" sz="1200" i="1" dirty="0"/>
               <a:t>master  </a:t>
             </a:r>
             <a:r>
-              <a:rPr lang="fi-FI" sz="1200" i="1" dirty="0" err="1" smtClean="0"/>
+              <a:rPr lang="fi-FI" sz="1200" i="1" dirty="0" err="1"/>
               <a:t>bus</a:t>
             </a:r>
             <a:r>
-              <a:rPr lang="fi-FI" sz="1200" i="1" dirty="0" smtClean="0"/>
+              <a:rPr lang="fi-FI" sz="1200" i="1" dirty="0"/>
               <a:t> interface</a:t>
             </a:r>
             <a:r>
-              <a:rPr lang="fi-FI" sz="1200" dirty="0" smtClean="0"/>
+              <a:rPr lang="fi-FI" sz="1200" dirty="0"/>
               <a:t> MBIF</a:t>
             </a:r>
           </a:p>
@@ -7228,49 +8152,49 @@
               <a:rPr lang="fi-FI" sz="1200" dirty="0"/>
               <a:t> </a:t>
             </a:r>
-            <a:endParaRPr lang="fi-FI" sz="1200" i="1" dirty="0" smtClean="0"/>
-          </a:p>
-          <a:p>
-            <a:r>
-              <a:rPr lang="fi-FI" sz="1200" i="1" dirty="0" err="1" smtClean="0"/>
+            <a:endParaRPr lang="fi-FI" sz="1200" i="1" dirty="0"/>
+          </a:p>
+          <a:p>
+            <a:r>
+              <a:rPr lang="fi-FI" sz="1200" i="1" dirty="0" err="1"/>
               <a:t>port</a:t>
             </a:r>
             <a:r>
-              <a:rPr lang="fi-FI" sz="1200" i="1" dirty="0" smtClean="0"/>
+              <a:rPr lang="fi-FI" sz="1200" i="1" dirty="0"/>
               <a:t> </a:t>
             </a:r>
             <a:r>
-              <a:rPr lang="fi-FI" sz="1200" dirty="0" err="1" smtClean="0"/>
+              <a:rPr lang="fi-FI" sz="1200" dirty="0" err="1"/>
               <a:t>Data_out</a:t>
             </a:r>
-            <a:endParaRPr lang="fi-FI" sz="1200" dirty="0" smtClean="0"/>
-          </a:p>
-          <a:p>
-            <a:r>
-              <a:rPr lang="fi-FI" sz="1200" i="1" dirty="0" err="1" smtClean="0"/>
+            <a:endParaRPr lang="fi-FI" sz="1200" dirty="0"/>
+          </a:p>
+          <a:p>
+            <a:r>
+              <a:rPr lang="fi-FI" sz="1200" i="1" dirty="0" err="1"/>
               <a:t>port</a:t>
             </a:r>
             <a:r>
-              <a:rPr lang="fi-FI" sz="1200" i="1" dirty="0" smtClean="0"/>
+              <a:rPr lang="fi-FI" sz="1200" i="1" dirty="0"/>
               <a:t> </a:t>
             </a:r>
             <a:r>
-              <a:rPr lang="fi-FI" sz="1200" dirty="0" err="1" smtClean="0"/>
+              <a:rPr lang="fi-FI" sz="1200" dirty="0" err="1"/>
               <a:t>Req_out</a:t>
             </a:r>
-            <a:endParaRPr lang="fi-FI" sz="1200" dirty="0" smtClean="0"/>
-          </a:p>
-          <a:p>
-            <a:r>
-              <a:rPr lang="fi-FI" sz="1200" i="1" dirty="0" err="1" smtClean="0"/>
+            <a:endParaRPr lang="fi-FI" sz="1200" dirty="0"/>
+          </a:p>
+          <a:p>
+            <a:r>
+              <a:rPr lang="fi-FI" sz="1200" i="1" dirty="0" err="1"/>
               <a:t>port</a:t>
             </a:r>
             <a:r>
-              <a:rPr lang="fi-FI" sz="1200" i="1" dirty="0" smtClean="0"/>
+              <a:rPr lang="fi-FI" sz="1200" i="1" dirty="0"/>
               <a:t> </a:t>
             </a:r>
             <a:r>
-              <a:rPr lang="fi-FI" sz="1200" dirty="0" err="1" smtClean="0"/>
+              <a:rPr lang="fi-FI" sz="1200" dirty="0" err="1"/>
               <a:t>Ack_in</a:t>
             </a:r>
             <a:endParaRPr lang="en-US" sz="1200" dirty="0"/>
@@ -7956,15 +8880,15 @@
           <a:lstStyle/>
           <a:p>
             <a:r>
-              <a:rPr lang="fi-FI" sz="1200" i="1" dirty="0" err="1" smtClean="0"/>
+              <a:rPr lang="fi-FI" sz="1200" i="1" dirty="0" err="1"/>
               <a:t>port</a:t>
             </a:r>
             <a:r>
-              <a:rPr lang="fi-FI" sz="1200" i="1" dirty="0" smtClean="0"/>
+              <a:rPr lang="fi-FI" sz="1200" i="1" dirty="0"/>
               <a:t> </a:t>
             </a:r>
             <a:r>
-              <a:rPr lang="fi-FI" sz="1200" i="1" dirty="0" err="1" smtClean="0"/>
+              <a:rPr lang="fi-FI" sz="1200" i="1" dirty="0" err="1"/>
               <a:t>maps</a:t>
             </a:r>
             <a:endParaRPr lang="en-US" sz="1200" i="1" dirty="0"/>
@@ -8514,7 +9438,7 @@
           <a:lstStyle/>
           <a:p>
             <a:r>
-              <a:rPr lang="fi-FI" sz="1200" dirty="0" smtClean="0"/>
+              <a:rPr lang="fi-FI" sz="1200" dirty="0"/>
               <a:t>=</a:t>
             </a:r>
             <a:endParaRPr lang="en-US" sz="1200" dirty="0"/>
@@ -8531,17 +9455,10 @@
   <p:clrMapOvr>
     <a:masterClrMapping/>
   </p:clrMapOvr>
-  <p:timing>
-    <p:tnLst>
-      <p:par>
-        <p:cTn id="1" dur="indefinite" restart="never" nodeType="tmRoot"/>
-      </p:par>
-    </p:tnLst>
-  </p:timing>
 </p:sld>
 </file>
 
-<file path=ppt/slides/slide13.xml><?xml version="1.0" encoding="utf-8"?>
+<file path=ppt/slides/slide14.xml><?xml version="1.0" encoding="utf-8"?>
 <p:sld xmlns:a="http://schemas.openxmlformats.org/drawingml/2006/main" xmlns:r="http://schemas.openxmlformats.org/officeDocument/2006/relationships" xmlns:p="http://schemas.openxmlformats.org/presentationml/2006/main">
   <p:cSld>
     <p:spTree>
@@ -8574,11 +9491,11 @@
           <a:lstStyle/>
           <a:p>
             <a:r>
-              <a:rPr lang="fi-FI" dirty="0" smtClean="0"/>
+              <a:rPr lang="fi-FI" dirty="0"/>
               <a:t>Indirect </a:t>
             </a:r>
             <a:r>
-              <a:rPr lang="fi-FI" dirty="0" err="1" smtClean="0"/>
+              <a:rPr lang="fi-FI" dirty="0" err="1"/>
               <a:t>interfaces</a:t>
             </a:r>
             <a:endParaRPr lang="en-US" dirty="0"/>
@@ -8733,7 +9650,7 @@
               </a:spcAft>
             </a:pPr>
             <a:r>
-              <a:rPr lang="fi-FI" sz="1200" b="1" i="1" dirty="0" smtClean="0">
+              <a:rPr lang="fi-FI" sz="1200" b="1" i="1" dirty="0">
                 <a:solidFill>
                   <a:prstClr val="black"/>
                 </a:solidFill>
@@ -8743,7 +9660,7 @@
               <a:t>component</a:t>
             </a:r>
             <a:r>
-              <a:rPr lang="fi-FI" sz="1200" b="1" dirty="0" smtClean="0">
+              <a:rPr lang="fi-FI" sz="1200" b="1" dirty="0">
                 <a:solidFill>
                   <a:prstClr val="black"/>
                 </a:solidFill>
@@ -8826,11 +9743,11 @@
           <a:lstStyle/>
           <a:p>
             <a:r>
-              <a:rPr lang="fi-FI" sz="1200" i="1" dirty="0" smtClean="0"/>
+              <a:rPr lang="fi-FI" sz="1200" i="1" dirty="0"/>
               <a:t>memory map</a:t>
             </a:r>
             <a:r>
-              <a:rPr lang="fi-FI" sz="1200" dirty="0" smtClean="0"/>
+              <a:rPr lang="fi-FI" sz="1200" dirty="0"/>
               <a:t> MM0</a:t>
             </a:r>
             <a:endParaRPr lang="en-US" sz="1200" dirty="0"/>
@@ -8946,7 +9863,7 @@
           <a:lstStyle/>
           <a:p>
             <a:r>
-              <a:rPr lang="fi-FI" sz="1000" dirty="0" smtClean="0"/>
+              <a:rPr lang="fi-FI" sz="1000" dirty="0"/>
               <a:t>r0</a:t>
             </a:r>
             <a:endParaRPr lang="en-US" sz="1000" dirty="0"/>
@@ -8976,7 +9893,7 @@
           <a:lstStyle/>
           <a:p>
             <a:r>
-              <a:rPr lang="fi-FI" sz="1000" dirty="0" smtClean="0"/>
+              <a:rPr lang="fi-FI" sz="1000" dirty="0"/>
               <a:t>r1</a:t>
             </a:r>
             <a:endParaRPr lang="en-US" sz="1000" dirty="0"/>
@@ -9049,11 +9966,11 @@
           <a:lstStyle/>
           <a:p>
             <a:r>
-              <a:rPr lang="fi-FI" sz="1200" i="1" dirty="0" smtClean="0"/>
+              <a:rPr lang="fi-FI" sz="1200" i="1" dirty="0"/>
               <a:t>memory map</a:t>
             </a:r>
             <a:r>
-              <a:rPr lang="fi-FI" sz="1200" dirty="0" smtClean="0"/>
+              <a:rPr lang="fi-FI" sz="1200" dirty="0"/>
               <a:t> MM1</a:t>
             </a:r>
             <a:endParaRPr lang="en-US" sz="1200" dirty="0"/>
@@ -9133,17 +10050,17 @@
           <a:lstStyle/>
           <a:p>
             <a:r>
-              <a:rPr lang="fi-FI" sz="1200" i="1" dirty="0" smtClean="0"/>
+              <a:rPr lang="fi-FI" sz="1200" i="1" dirty="0"/>
               <a:t>Indirect </a:t>
             </a:r>
           </a:p>
           <a:p>
             <a:r>
-              <a:rPr lang="fi-FI" sz="1200" i="1" dirty="0" smtClean="0"/>
+              <a:rPr lang="fi-FI" sz="1200" i="1" dirty="0"/>
               <a:t>interface </a:t>
             </a:r>
             <a:r>
-              <a:rPr lang="fi-FI" sz="1200" dirty="0" smtClean="0"/>
+              <a:rPr lang="fi-FI" sz="1200" dirty="0"/>
               <a:t>II0</a:t>
             </a:r>
             <a:endParaRPr lang="en-US" sz="1200" dirty="0"/>
@@ -9303,11 +10220,11 @@
           <a:p>
             <a:pPr algn="ctr"/>
             <a:r>
-              <a:rPr lang="fi-FI" sz="1200" i="1" dirty="0" smtClean="0"/>
+              <a:rPr lang="fi-FI" sz="1200" i="1" dirty="0"/>
               <a:t>data</a:t>
             </a:r>
             <a:r>
-              <a:rPr lang="fi-FI" sz="1200" dirty="0" smtClean="0"/>
+              <a:rPr lang="fi-FI" sz="1200" dirty="0"/>
               <a:t>  address</a:t>
             </a:r>
             <a:endParaRPr lang="en-US" sz="1200" dirty="0"/>
@@ -9394,7 +10311,7 @@
             <a:lstStyle/>
             <a:p>
               <a:r>
-                <a:rPr lang="fi-FI" sz="1000" dirty="0" smtClean="0"/>
+                <a:rPr lang="fi-FI" sz="1000" dirty="0"/>
                 <a:t>r7</a:t>
               </a:r>
               <a:endParaRPr lang="en-US" sz="1000" dirty="0"/>
@@ -9467,7 +10384,7 @@
             <a:lstStyle/>
             <a:p>
               <a:r>
-                <a:rPr lang="fi-FI" sz="1000" dirty="0" smtClean="0"/>
+                <a:rPr lang="fi-FI" sz="1000" dirty="0"/>
                 <a:t>…</a:t>
               </a:r>
               <a:endParaRPr lang="en-US" sz="1000" dirty="0"/>
@@ -9540,7 +10457,7 @@
             <a:lstStyle/>
             <a:p>
               <a:r>
-                <a:rPr lang="fi-FI" sz="1000" dirty="0" smtClean="0"/>
+                <a:rPr lang="fi-FI" sz="1000" dirty="0"/>
                 <a:t>r6: (data)</a:t>
               </a:r>
               <a:endParaRPr lang="en-US" sz="1000" dirty="0"/>
@@ -9571,7 +10488,7 @@
           <a:lstStyle/>
           <a:p>
             <a:r>
-              <a:rPr lang="fi-FI" sz="1000" dirty="0" smtClean="0"/>
+              <a:rPr lang="fi-FI" sz="1000" dirty="0"/>
               <a:t>#(addr)</a:t>
             </a:r>
             <a:endParaRPr lang="en-US" sz="1000" dirty="0"/>
@@ -9726,7 +10643,7 @@
               </a:spcAft>
             </a:pPr>
             <a:r>
-              <a:rPr lang="fi-FI" sz="1200" b="1" i="1" dirty="0" smtClean="0">
+              <a:rPr lang="fi-FI" sz="1200" b="1" i="1" dirty="0">
                 <a:solidFill>
                   <a:prstClr val="black"/>
                 </a:solidFill>
@@ -9736,7 +10653,7 @@
               <a:t>component</a:t>
             </a:r>
             <a:r>
-              <a:rPr lang="fi-FI" sz="1200" b="1" dirty="0" smtClean="0">
+              <a:rPr lang="fi-FI" sz="1200" b="1" dirty="0">
                 <a:solidFill>
                   <a:prstClr val="black"/>
                 </a:solidFill>
@@ -9819,11 +10736,11 @@
           <a:lstStyle/>
           <a:p>
             <a:r>
-              <a:rPr lang="fi-FI" sz="1200" i="1" dirty="0" smtClean="0"/>
+              <a:rPr lang="fi-FI" sz="1200" i="1" dirty="0"/>
               <a:t>memory map</a:t>
             </a:r>
             <a:r>
-              <a:rPr lang="fi-FI" sz="1200" dirty="0" smtClean="0"/>
+              <a:rPr lang="fi-FI" sz="1200" dirty="0"/>
               <a:t> MM0</a:t>
             </a:r>
             <a:endParaRPr lang="en-US" sz="1200" dirty="0"/>
@@ -9939,7 +10856,7 @@
           <a:lstStyle/>
           <a:p>
             <a:r>
-              <a:rPr lang="fi-FI" sz="1000" dirty="0" smtClean="0"/>
+              <a:rPr lang="fi-FI" sz="1000" dirty="0"/>
               <a:t>r0</a:t>
             </a:r>
             <a:endParaRPr lang="en-US" sz="1000" dirty="0"/>
@@ -9969,7 +10886,7 @@
           <a:lstStyle/>
           <a:p>
             <a:r>
-              <a:rPr lang="fi-FI" sz="1000" dirty="0" smtClean="0"/>
+              <a:rPr lang="fi-FI" sz="1000" dirty="0"/>
               <a:t>r1</a:t>
             </a:r>
             <a:endParaRPr lang="en-US" sz="1000" dirty="0"/>
@@ -10092,17 +11009,17 @@
           <a:lstStyle/>
           <a:p>
             <a:r>
-              <a:rPr lang="fi-FI" sz="1200" i="1" dirty="0" smtClean="0"/>
+              <a:rPr lang="fi-FI" sz="1200" i="1" dirty="0"/>
               <a:t>Indirect </a:t>
             </a:r>
           </a:p>
           <a:p>
             <a:r>
-              <a:rPr lang="fi-FI" sz="1200" i="1" dirty="0" smtClean="0"/>
+              <a:rPr lang="fi-FI" sz="1200" i="1" dirty="0"/>
               <a:t>interface </a:t>
             </a:r>
             <a:r>
-              <a:rPr lang="fi-FI" sz="1200" dirty="0" smtClean="0"/>
+              <a:rPr lang="fi-FI" sz="1200" dirty="0"/>
               <a:t>II0</a:t>
             </a:r>
             <a:endParaRPr lang="en-US" sz="1200" dirty="0"/>
@@ -10262,11 +11179,11 @@
           <a:p>
             <a:pPr algn="ctr"/>
             <a:r>
-              <a:rPr lang="fi-FI" sz="1000" i="1" dirty="0" smtClean="0"/>
+              <a:rPr lang="fi-FI" sz="1000" i="1" dirty="0"/>
               <a:t>data</a:t>
             </a:r>
             <a:r>
-              <a:rPr lang="fi-FI" sz="1000" dirty="0" smtClean="0"/>
+              <a:rPr lang="fi-FI" sz="1000" dirty="0"/>
               <a:t>  address</a:t>
             </a:r>
             <a:endParaRPr lang="en-US" sz="1000" dirty="0"/>
@@ -10344,11 +11261,11 @@
           <a:lstStyle/>
           <a:p>
             <a:r>
-              <a:rPr lang="fi-FI" sz="1200" i="1" dirty="0" smtClean="0"/>
+              <a:rPr lang="fi-FI" sz="1200" i="1" dirty="0"/>
               <a:t>master</a:t>
             </a:r>
             <a:r>
-              <a:rPr lang="fi-FI" sz="1200" dirty="0" smtClean="0"/>
+              <a:rPr lang="fi-FI" sz="1200" dirty="0"/>
               <a:t>  outIF</a:t>
             </a:r>
             <a:endParaRPr lang="en-US" sz="1200" dirty="0"/>
@@ -10379,7 +11296,7 @@
           <a:p>
             <a:pPr algn="ctr"/>
             <a:r>
-              <a:rPr lang="fi-FI" sz="1000" i="1" dirty="0" smtClean="0"/>
+              <a:rPr lang="fi-FI" sz="1000" i="1" dirty="0"/>
               <a:t>transparent bridge</a:t>
             </a:r>
             <a:endParaRPr lang="en-US" sz="1000" dirty="0"/>
@@ -10409,11 +11326,11 @@
           <a:lstStyle/>
           <a:p>
             <a:r>
-              <a:rPr lang="fi-FI" sz="1200" i="1" dirty="0" smtClean="0"/>
+              <a:rPr lang="fi-FI" sz="1200" i="1" dirty="0"/>
               <a:t>slave</a:t>
             </a:r>
             <a:r>
-              <a:rPr lang="fi-FI" sz="1200" dirty="0" smtClean="0"/>
+              <a:rPr lang="fi-FI" sz="1200" dirty="0"/>
               <a:t>  accessIF</a:t>
             </a:r>
             <a:endParaRPr lang="en-US" sz="1200" dirty="0"/>
@@ -10443,11 +11360,11 @@
           <a:lstStyle/>
           <a:p>
             <a:r>
-              <a:rPr lang="fi-FI" sz="1200" i="1" dirty="0" smtClean="0"/>
+              <a:rPr lang="fi-FI" sz="1200" i="1" dirty="0"/>
               <a:t>slave</a:t>
             </a:r>
             <a:r>
-              <a:rPr lang="fi-FI" sz="1200" dirty="0" smtClean="0"/>
+              <a:rPr lang="fi-FI" sz="1200" dirty="0"/>
               <a:t>  accessIF</a:t>
             </a:r>
             <a:endParaRPr lang="en-US" sz="1200" dirty="0"/>
@@ -10467,7 +11384,7 @@
 </p:sld>
 </file>
 
-<file path=ppt/slides/slide14.xml><?xml version="1.0" encoding="utf-8"?>
+<file path=ppt/slides/slide15.xml><?xml version="1.0" encoding="utf-8"?>
 <p:sld xmlns:a="http://schemas.openxmlformats.org/drawingml/2006/main" xmlns:r="http://schemas.openxmlformats.org/officeDocument/2006/relationships" xmlns:p="http://schemas.openxmlformats.org/presentationml/2006/main">
   <p:cSld>
     <p:spTree>
@@ -10500,23 +11417,23 @@
           <a:lstStyle/>
           <a:p>
             <a:r>
-              <a:rPr lang="fi-FI" dirty="0" err="1" smtClean="0"/>
+              <a:rPr lang="fi-FI" dirty="0" err="1"/>
               <a:t>Other</a:t>
             </a:r>
             <a:r>
-              <a:rPr lang="fi-FI" dirty="0" smtClean="0"/>
+              <a:rPr lang="fi-FI" dirty="0"/>
               <a:t> </a:t>
             </a:r>
             <a:r>
-              <a:rPr lang="fi-FI" dirty="0" err="1" smtClean="0"/>
+              <a:rPr lang="fi-FI" dirty="0" err="1"/>
               <a:t>clock</a:t>
             </a:r>
             <a:r>
-              <a:rPr lang="fi-FI" dirty="0" smtClean="0"/>
+              <a:rPr lang="fi-FI" dirty="0"/>
               <a:t> </a:t>
             </a:r>
             <a:r>
-              <a:rPr lang="fi-FI" dirty="0" err="1" smtClean="0"/>
+              <a:rPr lang="fi-FI" dirty="0" err="1"/>
               <a:t>driver</a:t>
             </a:r>
             <a:endParaRPr lang="en-US" dirty="0"/>
@@ -10695,7 +11612,7 @@
               </a:spcAft>
             </a:pPr>
             <a:r>
-              <a:rPr lang="fi-FI" sz="1200" b="1" i="1" dirty="0" smtClean="0">
+              <a:rPr lang="fi-FI" sz="1200" b="1" i="1" dirty="0">
                 <a:solidFill>
                   <a:prstClr val="black"/>
                 </a:solidFill>
@@ -10705,7 +11622,7 @@
               <a:t>component</a:t>
             </a:r>
             <a:r>
-              <a:rPr lang="fi-FI" sz="1200" b="1" dirty="0" smtClean="0">
+              <a:rPr lang="fi-FI" sz="1200" b="1" dirty="0">
                 <a:solidFill>
                   <a:prstClr val="black"/>
                 </a:solidFill>
@@ -10715,7 +11632,7 @@
               <a:t> </a:t>
             </a:r>
             <a:r>
-              <a:rPr lang="fi-FI" sz="1200" b="1" dirty="0" err="1" smtClean="0">
+              <a:rPr lang="fi-FI" sz="1200" b="1" dirty="0" err="1">
                 <a:solidFill>
                   <a:prstClr val="black"/>
                 </a:solidFill>
@@ -10724,7 +11641,7 @@
               </a:rPr>
               <a:t>Foo</a:t>
             </a:r>
-            <a:endParaRPr lang="fi-FI" sz="1200" b="1" dirty="0" smtClean="0">
+            <a:endParaRPr lang="fi-FI" sz="1200" b="1" dirty="0">
               <a:solidFill>
                 <a:prstClr val="black"/>
               </a:solidFill>
@@ -11019,15 +11936,15 @@
           <a:lstStyle/>
           <a:p>
             <a:r>
-              <a:rPr lang="fi-FI" sz="1200" dirty="0" err="1" smtClean="0"/>
+              <a:rPr lang="fi-FI" sz="1200" dirty="0" err="1"/>
               <a:t>clockPeriod</a:t>
             </a:r>
             <a:r>
-              <a:rPr lang="fi-FI" sz="1200" dirty="0" smtClean="0"/>
+              <a:rPr lang="fi-FI" sz="1200" dirty="0"/>
               <a:t> = 10 </a:t>
             </a:r>
             <a:r>
-              <a:rPr lang="fi-FI" sz="1200" dirty="0" err="1" smtClean="0"/>
+              <a:rPr lang="fi-FI" sz="1200" dirty="0" err="1"/>
               <a:t>ns</a:t>
             </a:r>
             <a:endParaRPr lang="en-US" sz="1200" dirty="0"/>
@@ -11091,15 +12008,15 @@
           <a:lstStyle/>
           <a:p>
             <a:r>
-              <a:rPr lang="fi-FI" sz="1200" dirty="0" err="1" smtClean="0"/>
+              <a:rPr lang="fi-FI" sz="1200" dirty="0" err="1"/>
               <a:t>clockPulseDuration</a:t>
             </a:r>
             <a:r>
-              <a:rPr lang="fi-FI" sz="1200" dirty="0" smtClean="0"/>
+              <a:rPr lang="fi-FI" sz="1200" dirty="0"/>
               <a:t> = 5 </a:t>
             </a:r>
             <a:r>
-              <a:rPr lang="fi-FI" sz="1200" dirty="0" err="1" smtClean="0"/>
+              <a:rPr lang="fi-FI" sz="1200" dirty="0" err="1"/>
               <a:t>ns</a:t>
             </a:r>
             <a:endParaRPr lang="en-US" sz="1200" dirty="0"/>
@@ -11373,15 +12290,15 @@
           <a:lstStyle/>
           <a:p>
             <a:r>
-              <a:rPr lang="fi-FI" sz="1200" dirty="0" err="1" smtClean="0"/>
+              <a:rPr lang="fi-FI" sz="1200" dirty="0" err="1"/>
               <a:t>clockPeriod</a:t>
             </a:r>
             <a:r>
-              <a:rPr lang="fi-FI" sz="1200" dirty="0" smtClean="0"/>
+              <a:rPr lang="fi-FI" sz="1200" dirty="0"/>
               <a:t> = 10 </a:t>
             </a:r>
             <a:r>
-              <a:rPr lang="fi-FI" sz="1200" dirty="0" err="1" smtClean="0"/>
+              <a:rPr lang="fi-FI" sz="1200" dirty="0" err="1"/>
               <a:t>ns</a:t>
             </a:r>
             <a:endParaRPr lang="en-US" sz="1200" dirty="0"/>
@@ -11475,15 +12392,15 @@
           <a:lstStyle/>
           <a:p>
             <a:r>
-              <a:rPr lang="fi-FI" sz="1200" dirty="0" err="1" smtClean="0"/>
+              <a:rPr lang="fi-FI" sz="1200" dirty="0" err="1"/>
               <a:t>clockPulseDuration</a:t>
             </a:r>
             <a:r>
-              <a:rPr lang="fi-FI" sz="1200" dirty="0" smtClean="0"/>
+              <a:rPr lang="fi-FI" sz="1200" dirty="0"/>
               <a:t> = 4 </a:t>
             </a:r>
             <a:r>
-              <a:rPr lang="fi-FI" sz="1200" dirty="0" err="1" smtClean="0"/>
+              <a:rPr lang="fi-FI" sz="1200" dirty="0" err="1"/>
               <a:t>ns</a:t>
             </a:r>
             <a:endParaRPr lang="en-US" sz="1200" dirty="0"/>
@@ -11547,15 +12464,15 @@
           <a:lstStyle/>
           <a:p>
             <a:r>
-              <a:rPr lang="fi-FI" sz="1200" dirty="0" err="1" smtClean="0"/>
+              <a:rPr lang="fi-FI" sz="1200" dirty="0" err="1"/>
               <a:t>clockPulseOffset</a:t>
             </a:r>
             <a:r>
-              <a:rPr lang="fi-FI" sz="1200" dirty="0" smtClean="0"/>
+              <a:rPr lang="fi-FI" sz="1200" dirty="0"/>
               <a:t> = 1 </a:t>
             </a:r>
             <a:r>
-              <a:rPr lang="fi-FI" sz="1200" dirty="0" err="1" smtClean="0"/>
+              <a:rPr lang="fi-FI" sz="1200" dirty="0" err="1"/>
               <a:t>ns</a:t>
             </a:r>
             <a:endParaRPr lang="en-US" sz="1200" dirty="0"/>
@@ -11585,15 +12502,15 @@
           <a:lstStyle/>
           <a:p>
             <a:r>
-              <a:rPr lang="fi-FI" sz="1200" i="1" dirty="0" err="1" smtClean="0"/>
+              <a:rPr lang="fi-FI" sz="1200" i="1" dirty="0" err="1"/>
               <a:t>port</a:t>
             </a:r>
             <a:r>
-              <a:rPr lang="fi-FI" sz="1200" dirty="0" smtClean="0"/>
+              <a:rPr lang="fi-FI" sz="1200" dirty="0"/>
               <a:t> </a:t>
             </a:r>
             <a:r>
-              <a:rPr lang="fi-FI" sz="1200" dirty="0" err="1" smtClean="0"/>
+              <a:rPr lang="fi-FI" sz="1200" dirty="0" err="1"/>
               <a:t>ClkIn</a:t>
             </a:r>
             <a:endParaRPr lang="en-US" sz="1200" dirty="0"/>
@@ -11641,7 +12558,7 @@
           <a:p>
             <a:pPr algn="ctr"/>
             <a:r>
-              <a:rPr lang="fi-FI" sz="1200" dirty="0" err="1" smtClean="0">
+              <a:rPr lang="fi-FI" sz="1200" dirty="0" err="1">
                 <a:solidFill>
                   <a:schemeClr val="tx1"/>
                 </a:solidFill>
@@ -11697,7 +12614,7 @@
           <a:p>
             <a:pPr algn="ctr"/>
             <a:r>
-              <a:rPr lang="fi-FI" sz="1200" dirty="0" smtClean="0">
+              <a:rPr lang="fi-FI" sz="1200" dirty="0">
                 <a:solidFill>
                   <a:schemeClr val="tx1"/>
                 </a:solidFill>
@@ -11705,7 +12622,7 @@
               <a:t>*.</a:t>
             </a:r>
             <a:r>
-              <a:rPr lang="fi-FI" sz="1200" dirty="0" err="1" smtClean="0">
+              <a:rPr lang="fi-FI" sz="1200" dirty="0" err="1">
                 <a:solidFill>
                   <a:schemeClr val="tx1"/>
                 </a:solidFill>
@@ -11973,7 +12890,7 @@
           <a:lstStyle/>
           <a:p>
             <a:r>
-              <a:rPr lang="fi-FI" sz="1200" dirty="0" smtClean="0">
+              <a:rPr lang="fi-FI" sz="1200" dirty="0">
                 <a:solidFill>
                   <a:schemeClr val="tx2"/>
                 </a:solidFill>
@@ -12011,7 +12928,7 @@
           <a:lstStyle/>
           <a:p>
             <a:r>
-              <a:rPr lang="fi-FI" sz="1200" dirty="0" smtClean="0">
+              <a:rPr lang="fi-FI" sz="1200" dirty="0">
                 <a:solidFill>
                   <a:schemeClr val="tx2"/>
                 </a:solidFill>
@@ -12049,7 +12966,7 @@
           <a:lstStyle/>
           <a:p>
             <a:r>
-              <a:rPr lang="fi-FI" sz="1200" dirty="0" smtClean="0">
+              <a:rPr lang="fi-FI" sz="1200" dirty="0">
                 <a:solidFill>
                   <a:schemeClr val="tx2"/>
                 </a:solidFill>
@@ -12087,7 +13004,7 @@
           <a:lstStyle/>
           <a:p>
             <a:r>
-              <a:rPr lang="fi-FI" sz="1200" dirty="0" smtClean="0">
+              <a:rPr lang="fi-FI" sz="1200" dirty="0">
                 <a:solidFill>
                   <a:schemeClr val="tx2"/>
                 </a:solidFill>
@@ -12112,17 +13029,10 @@
   <p:clrMapOvr>
     <a:masterClrMapping/>
   </p:clrMapOvr>
-  <p:timing>
-    <p:tnLst>
-      <p:par>
-        <p:cTn id="1" dur="indefinite" restart="never" nodeType="tmRoot"/>
-      </p:par>
-    </p:tnLst>
-  </p:timing>
 </p:sld>
 </file>
 
-<file path=ppt/slides/slide15.xml><?xml version="1.0" encoding="utf-8"?>
+<file path=ppt/slides/slide16.xml><?xml version="1.0" encoding="utf-8"?>
 <p:sld xmlns:a="http://schemas.openxmlformats.org/drawingml/2006/main" xmlns:r="http://schemas.openxmlformats.org/officeDocument/2006/relationships" xmlns:p="http://schemas.openxmlformats.org/presentationml/2006/main">
   <p:cSld>
     <p:spTree>
@@ -12157,11 +13067,11 @@
           <a:lstStyle/>
           <a:p>
             <a:r>
-              <a:rPr lang="fi-FI" dirty="0" smtClean="0"/>
+              <a:rPr lang="fi-FI" dirty="0"/>
               <a:t>COM </a:t>
             </a:r>
             <a:r>
-              <a:rPr lang="fi-FI" dirty="0" err="1" smtClean="0"/>
+              <a:rPr lang="fi-FI" dirty="0" err="1"/>
               <a:t>interfaces</a:t>
             </a:r>
             <a:endParaRPr lang="en-US" dirty="0"/>
@@ -12330,17 +13240,10 @@
   <p:clrMapOvr>
     <a:masterClrMapping/>
   </p:clrMapOvr>
-  <p:timing>
-    <p:tnLst>
-      <p:par>
-        <p:cTn id="1" dur="indefinite" restart="never" nodeType="tmRoot"/>
-      </p:par>
-    </p:tnLst>
-  </p:timing>
 </p:sld>
 </file>
 
-<file path=ppt/slides/slide16.xml><?xml version="1.0" encoding="utf-8"?>
+<file path=ppt/slides/slide17.xml><?xml version="1.0" encoding="utf-8"?>
 <p:sld xmlns:a="http://schemas.openxmlformats.org/drawingml/2006/main" xmlns:r="http://schemas.openxmlformats.org/officeDocument/2006/relationships" xmlns:p="http://schemas.openxmlformats.org/presentationml/2006/main">
   <p:cSld>
     <p:spTree>
@@ -12373,11 +13276,11 @@
           <a:lstStyle/>
           <a:p>
             <a:r>
-              <a:rPr lang="fi-FI" dirty="0" smtClean="0"/>
+              <a:rPr lang="fi-FI" dirty="0"/>
               <a:t>API </a:t>
             </a:r>
             <a:r>
-              <a:rPr lang="fi-FI" dirty="0" err="1" smtClean="0"/>
+              <a:rPr lang="fi-FI" dirty="0" err="1"/>
               <a:t>interfaces</a:t>
             </a:r>
             <a:endParaRPr lang="en-US" dirty="0"/>
@@ -12546,13 +13449,6 @@
   <p:clrMapOvr>
     <a:masterClrMapping/>
   </p:clrMapOvr>
-  <p:timing>
-    <p:tnLst>
-      <p:par>
-        <p:cTn id="1" dur="indefinite" restart="never" nodeType="tmRoot"/>
-      </p:par>
-    </p:tnLst>
-  </p:timing>
 </p:sld>
 </file>
 
@@ -12589,7 +13485,7 @@
           <a:lstStyle/>
           <a:p>
             <a:r>
-              <a:rPr lang="fi-FI" dirty="0" err="1" smtClean="0"/>
+              <a:rPr lang="fi-FI" dirty="0" err="1"/>
               <a:t>Purpose</a:t>
             </a:r>
             <a:endParaRPr lang="en-US" dirty="0"/>
@@ -12612,102 +13508,102 @@
           <a:lstStyle/>
           <a:p>
             <a:r>
-              <a:rPr lang="fi-FI" dirty="0" err="1" smtClean="0"/>
+              <a:rPr lang="fi-FI" dirty="0" err="1"/>
               <a:t>Images</a:t>
             </a:r>
             <a:r>
-              <a:rPr lang="fi-FI" dirty="0" smtClean="0"/>
+              <a:rPr lang="fi-FI" dirty="0"/>
               <a:t> </a:t>
             </a:r>
             <a:r>
-              <a:rPr lang="fi-FI" dirty="0" err="1" smtClean="0"/>
+              <a:rPr lang="fi-FI" dirty="0" err="1"/>
               <a:t>orientate</a:t>
             </a:r>
             <a:r>
-              <a:rPr lang="fi-FI" dirty="0" smtClean="0"/>
+              <a:rPr lang="fi-FI" dirty="0"/>
               <a:t> </a:t>
             </a:r>
             <a:r>
-              <a:rPr lang="fi-FI" dirty="0" err="1" smtClean="0"/>
+              <a:rPr lang="fi-FI" dirty="0" err="1"/>
               <a:t>users</a:t>
             </a:r>
             <a:r>
-              <a:rPr lang="fi-FI" dirty="0" smtClean="0"/>
+              <a:rPr lang="fi-FI" dirty="0"/>
               <a:t> </a:t>
             </a:r>
             <a:r>
-              <a:rPr lang="fi-FI" dirty="0" err="1" smtClean="0"/>
+              <a:rPr lang="fi-FI" dirty="0" err="1"/>
               <a:t>better</a:t>
             </a:r>
             <a:r>
-              <a:rPr lang="fi-FI" dirty="0" smtClean="0"/>
+              <a:rPr lang="fi-FI" dirty="0"/>
               <a:t> </a:t>
             </a:r>
             <a:r>
-              <a:rPr lang="fi-FI" dirty="0" err="1" smtClean="0"/>
+              <a:rPr lang="fi-FI" dirty="0" err="1"/>
               <a:t>than</a:t>
             </a:r>
             <a:r>
-              <a:rPr lang="fi-FI" dirty="0" smtClean="0"/>
+              <a:rPr lang="fi-FI" dirty="0"/>
               <a:t> </a:t>
             </a:r>
             <a:r>
-              <a:rPr lang="fi-FI" dirty="0" err="1" smtClean="0"/>
+              <a:rPr lang="fi-FI" dirty="0" err="1"/>
               <a:t>text</a:t>
             </a:r>
-            <a:endParaRPr lang="fi-FI" dirty="0" smtClean="0"/>
-          </a:p>
-          <a:p>
-            <a:r>
-              <a:rPr lang="fi-FI" dirty="0" err="1" smtClean="0"/>
+            <a:endParaRPr lang="fi-FI" dirty="0"/>
+          </a:p>
+          <a:p>
+            <a:r>
+              <a:rPr lang="fi-FI" dirty="0" err="1"/>
               <a:t>They</a:t>
             </a:r>
             <a:r>
-              <a:rPr lang="fi-FI" dirty="0" smtClean="0"/>
+              <a:rPr lang="fi-FI" dirty="0"/>
               <a:t> </a:t>
             </a:r>
             <a:r>
-              <a:rPr lang="fi-FI" dirty="0" err="1" smtClean="0"/>
+              <a:rPr lang="fi-FI" dirty="0" err="1"/>
               <a:t>provide</a:t>
             </a:r>
             <a:r>
-              <a:rPr lang="fi-FI" dirty="0" smtClean="0"/>
+              <a:rPr lang="fi-FI" dirty="0"/>
               <a:t> </a:t>
             </a:r>
             <a:r>
-              <a:rPr lang="fi-FI" dirty="0" err="1" smtClean="0"/>
+              <a:rPr lang="fi-FI" dirty="0" err="1"/>
               <a:t>simplified</a:t>
             </a:r>
             <a:r>
-              <a:rPr lang="fi-FI" dirty="0" smtClean="0"/>
+              <a:rPr lang="fi-FI" dirty="0"/>
               <a:t> </a:t>
             </a:r>
             <a:r>
-              <a:rPr lang="fi-FI" dirty="0" err="1" smtClean="0"/>
+              <a:rPr lang="fi-FI" dirty="0" err="1"/>
               <a:t>overlook</a:t>
             </a:r>
             <a:r>
-              <a:rPr lang="fi-FI" dirty="0" smtClean="0"/>
+              <a:rPr lang="fi-FI" dirty="0"/>
               <a:t> </a:t>
             </a:r>
             <a:r>
-              <a:rPr lang="fi-FI" dirty="0" err="1" smtClean="0"/>
+              <a:rPr lang="fi-FI" dirty="0" err="1"/>
               <a:t>what</a:t>
             </a:r>
             <a:r>
-              <a:rPr lang="fi-FI" dirty="0" smtClean="0"/>
+              <a:rPr lang="fi-FI" dirty="0"/>
               <a:t> is the main idea in </a:t>
             </a:r>
             <a:r>
-              <a:rPr lang="fi-FI" dirty="0" err="1" smtClean="0"/>
+              <a:rPr lang="fi-FI" dirty="0" err="1"/>
               <a:t>each</a:t>
             </a:r>
             <a:r>
-              <a:rPr lang="fi-FI" dirty="0" smtClean="0"/>
+              <a:rPr lang="fi-FI" dirty="0"/>
               <a:t> </a:t>
             </a:r>
             <a:r>
-              <a:rPr lang="fi-FI" dirty="0" err="1" smtClean="0"/>
+              <a:rPr lang="fi-FI" dirty="0" err="1"/>
               <a:t>editor</a:t>
             </a:r>
             <a:endParaRPr lang="en-US" dirty="0"/>
@@ -12724,13 +13620,6 @@
   <p:clrMapOvr>
     <a:masterClrMapping/>
   </p:clrMapOvr>
-  <p:timing>
-    <p:tnLst>
-      <p:par>
-        <p:cTn id="1" dur="indefinite" restart="never" nodeType="tmRoot"/>
-      </p:par>
-    </p:tnLst>
-  </p:timing>
 </p:sld>
 </file>
 
@@ -12769,7 +13658,7 @@
           <a:lstStyle/>
           <a:p>
             <a:r>
-              <a:rPr lang="fi-FI" dirty="0" err="1" smtClean="0"/>
+              <a:rPr lang="fi-FI" dirty="0" err="1"/>
               <a:t>Filesets</a:t>
             </a:r>
             <a:endParaRPr lang="en-US" dirty="0"/>
@@ -12923,13 +13812,6 @@
   <p:clrMapOvr>
     <a:masterClrMapping/>
   </p:clrMapOvr>
-  <p:timing>
-    <p:tnLst>
-      <p:par>
-        <p:cTn id="1" dur="indefinite" restart="never" nodeType="tmRoot"/>
-      </p:par>
-    </p:tnLst>
-  </p:timing>
 </p:sld>
 </file>
 
@@ -12966,7 +13848,7 @@
           <a:lstStyle/>
           <a:p>
             <a:r>
-              <a:rPr lang="fi-FI" dirty="0" err="1" smtClean="0"/>
+              <a:rPr lang="fi-FI" dirty="0" err="1"/>
               <a:t>Views</a:t>
             </a:r>
             <a:endParaRPr lang="en-US" dirty="0"/>
@@ -13145,7 +14027,7 @@
               </a:spcAft>
             </a:pPr>
             <a:r>
-              <a:rPr lang="fi-FI" sz="1000" b="1" i="1" dirty="0" smtClean="0">
+              <a:rPr lang="fi-FI" sz="1000" b="1" i="1" dirty="0">
                 <a:solidFill>
                   <a:prstClr val="black"/>
                 </a:solidFill>
@@ -13155,7 +14037,7 @@
               <a:t>component</a:t>
             </a:r>
             <a:r>
-              <a:rPr lang="fi-FI" sz="1000" b="1" dirty="0" smtClean="0">
+              <a:rPr lang="fi-FI" sz="1000" b="1" dirty="0">
                 <a:solidFill>
                   <a:prstClr val="black"/>
                 </a:solidFill>
@@ -13165,7 +14047,7 @@
               <a:t> </a:t>
             </a:r>
             <a:r>
-              <a:rPr lang="fi-FI" sz="1000" b="1" dirty="0" err="1" smtClean="0">
+              <a:rPr lang="fi-FI" sz="1000" b="1" dirty="0" err="1">
                 <a:solidFill>
                   <a:prstClr val="black"/>
                 </a:solidFill>
@@ -13174,7 +14056,7 @@
               </a:rPr>
               <a:t>AccelA</a:t>
             </a:r>
-            <a:endParaRPr lang="fi-FI" sz="1000" b="1" dirty="0" smtClean="0">
+            <a:endParaRPr lang="fi-FI" sz="1000" b="1" dirty="0">
               <a:solidFill>
                 <a:prstClr val="black"/>
               </a:solidFill>
@@ -13207,25 +14089,25 @@
           <a:lstStyle/>
           <a:p>
             <a:r>
-              <a:rPr lang="fi-FI" sz="1000" i="1" dirty="0" err="1" smtClean="0"/>
+              <a:rPr lang="fi-FI" sz="1000" i="1" dirty="0" err="1"/>
               <a:t>View</a:t>
             </a:r>
             <a:r>
-              <a:rPr lang="fi-FI" sz="1000" dirty="0" smtClean="0"/>
+              <a:rPr lang="fi-FI" sz="1000" dirty="0"/>
               <a:t> V0 </a:t>
             </a:r>
           </a:p>
           <a:p>
             <a:r>
-              <a:rPr lang="fi-FI" sz="1000" dirty="0" smtClean="0"/>
+              <a:rPr lang="fi-FI" sz="1000" dirty="0"/>
               <a:t>(</a:t>
             </a:r>
             <a:r>
-              <a:rPr lang="fi-FI" sz="1000" i="1" dirty="0" err="1" smtClean="0"/>
+              <a:rPr lang="fi-FI" sz="1000" i="1" dirty="0" err="1"/>
               <a:t>non-hier</a:t>
             </a:r>
             <a:r>
-              <a:rPr lang="fi-FI" sz="1000" dirty="0" smtClean="0"/>
+              <a:rPr lang="fi-FI" sz="1000" dirty="0"/>
               <a:t>)</a:t>
             </a:r>
             <a:endParaRPr lang="en-US" sz="1000" dirty="0"/>
@@ -13272,7 +14154,7 @@
           <a:p>
             <a:pPr algn="ctr"/>
             <a:r>
-              <a:rPr lang="fi-FI" sz="1000" dirty="0" err="1" smtClean="0">
+              <a:rPr lang="fi-FI" sz="1000" dirty="0" err="1">
                 <a:solidFill>
                   <a:schemeClr val="tx1"/>
                 </a:solidFill>
@@ -13280,7 +14162,7 @@
               <a:t>Fileset</a:t>
             </a:r>
             <a:r>
-              <a:rPr lang="fi-FI" sz="1000" dirty="0" smtClean="0">
+              <a:rPr lang="fi-FI" sz="1000" dirty="0">
                 <a:solidFill>
                   <a:schemeClr val="tx1"/>
                 </a:solidFill>
@@ -13288,7 +14170,7 @@
               <a:t> </a:t>
             </a:r>
             <a:r>
-              <a:rPr lang="fi-FI" sz="1000" dirty="0" err="1" smtClean="0">
+              <a:rPr lang="fi-FI" sz="1000" dirty="0" err="1">
                 <a:solidFill>
                   <a:schemeClr val="tx1"/>
                 </a:solidFill>
@@ -13296,7 +14178,7 @@
               <a:t>ref</a:t>
             </a:r>
             <a:r>
-              <a:rPr lang="fi-FI" sz="1000" dirty="0" smtClean="0">
+              <a:rPr lang="fi-FI" sz="1000" dirty="0">
                 <a:solidFill>
                   <a:schemeClr val="tx1"/>
                 </a:solidFill>
@@ -13334,19 +14216,19 @@
           <a:lstStyle/>
           <a:p>
             <a:r>
-              <a:rPr lang="fi-FI" sz="1000" i="1" dirty="0" err="1" smtClean="0"/>
+              <a:rPr lang="fi-FI" sz="1000" i="1" dirty="0" err="1"/>
               <a:t>View</a:t>
             </a:r>
             <a:r>
-              <a:rPr lang="fi-FI" sz="1000" dirty="0" smtClean="0"/>
+              <a:rPr lang="fi-FI" sz="1000" dirty="0"/>
               <a:t> V1 (</a:t>
             </a:r>
             <a:r>
-              <a:rPr lang="fi-FI" sz="1000" i="1" dirty="0" err="1" smtClean="0"/>
+              <a:rPr lang="fi-FI" sz="1000" i="1" dirty="0" err="1"/>
               <a:t>hier</a:t>
             </a:r>
             <a:r>
-              <a:rPr lang="fi-FI" sz="1000" dirty="0" smtClean="0"/>
+              <a:rPr lang="fi-FI" sz="1000" dirty="0"/>
               <a:t>)</a:t>
             </a:r>
             <a:endParaRPr lang="en-US" sz="1000" dirty="0"/>
@@ -13393,7 +14275,7 @@
           <a:p>
             <a:pPr algn="ctr"/>
             <a:r>
-              <a:rPr lang="fi-FI" sz="1000" dirty="0" err="1" smtClean="0">
+              <a:rPr lang="fi-FI" sz="1000" dirty="0" err="1">
                 <a:solidFill>
                   <a:schemeClr val="tx1"/>
                 </a:solidFill>
@@ -13401,7 +14283,7 @@
               <a:t>Hier</a:t>
             </a:r>
             <a:r>
-              <a:rPr lang="fi-FI" sz="1000" dirty="0" smtClean="0">
+              <a:rPr lang="fi-FI" sz="1000" dirty="0">
                 <a:solidFill>
                   <a:schemeClr val="tx1"/>
                 </a:solidFill>
@@ -13409,7 +14291,7 @@
               <a:t>. </a:t>
             </a:r>
             <a:r>
-              <a:rPr lang="fi-FI" sz="1000" dirty="0" err="1" smtClean="0">
+              <a:rPr lang="fi-FI" sz="1000" dirty="0" err="1">
                 <a:solidFill>
                   <a:schemeClr val="tx1"/>
                 </a:solidFill>
@@ -13417,7 +14299,7 @@
               <a:t>ref</a:t>
             </a:r>
             <a:r>
-              <a:rPr lang="fi-FI" sz="1000" dirty="0" smtClean="0">
+              <a:rPr lang="fi-FI" sz="1000" dirty="0">
                 <a:solidFill>
                   <a:schemeClr val="tx1"/>
                 </a:solidFill>
@@ -13720,7 +14602,7 @@
             <a:lstStyle/>
             <a:p>
               <a:r>
-                <a:rPr lang="fi-FI" sz="1000" b="1" dirty="0" err="1" smtClean="0"/>
+                <a:rPr lang="fi-FI" sz="1000" b="1" dirty="0" err="1"/>
                 <a:t>Fileset</a:t>
               </a:r>
               <a:endParaRPr lang="en-US" sz="1000" b="1" dirty="0"/>
@@ -13751,7 +14633,7 @@
           <a:lstStyle/>
           <a:p>
             <a:r>
-              <a:rPr lang="fi-FI" sz="1000" b="1" dirty="0" smtClean="0"/>
+              <a:rPr lang="fi-FI" sz="1000" b="1" dirty="0"/>
               <a:t>Design</a:t>
             </a:r>
             <a:endParaRPr lang="en-US" sz="1000" b="1" dirty="0"/>
@@ -13768,13 +14650,6 @@
   <p:clrMapOvr>
     <a:masterClrMapping/>
   </p:clrMapOvr>
-  <p:timing>
-    <p:tnLst>
-      <p:par>
-        <p:cTn id="1" dur="indefinite" restart="never" nodeType="tmRoot"/>
-      </p:par>
-    </p:tnLst>
-  </p:timing>
 </p:sld>
 </file>
 
@@ -13811,11 +14686,11 @@
           <a:lstStyle/>
           <a:p>
             <a:r>
-              <a:rPr lang="fi-FI" dirty="0" smtClean="0"/>
+              <a:rPr lang="fi-FI" dirty="0"/>
               <a:t>SW </a:t>
             </a:r>
             <a:r>
-              <a:rPr lang="fi-FI" dirty="0" err="1" smtClean="0"/>
+              <a:rPr lang="fi-FI" dirty="0" err="1"/>
               <a:t>Views</a:t>
             </a:r>
             <a:endParaRPr lang="en-US" dirty="0"/>
@@ -13994,7 +14869,7 @@
               </a:spcAft>
             </a:pPr>
             <a:r>
-              <a:rPr lang="fi-FI" sz="1000" b="1" i="1" dirty="0" smtClean="0">
+              <a:rPr lang="fi-FI" sz="1000" b="1" i="1" dirty="0">
                 <a:solidFill>
                   <a:prstClr val="black"/>
                 </a:solidFill>
@@ -14004,7 +14879,7 @@
               <a:t>component</a:t>
             </a:r>
             <a:r>
-              <a:rPr lang="fi-FI" sz="1000" b="1" dirty="0" smtClean="0">
+              <a:rPr lang="fi-FI" sz="1000" b="1" dirty="0">
                 <a:solidFill>
                   <a:prstClr val="black"/>
                 </a:solidFill>
@@ -14014,7 +14889,7 @@
               <a:t> </a:t>
             </a:r>
             <a:r>
-              <a:rPr lang="fi-FI" sz="1000" b="1" dirty="0" err="1" smtClean="0">
+              <a:rPr lang="fi-FI" sz="1000" b="1" dirty="0" err="1">
                 <a:solidFill>
                   <a:prstClr val="black"/>
                 </a:solidFill>
@@ -14023,7 +14898,7 @@
               </a:rPr>
               <a:t>GizmoCpu</a:t>
             </a:r>
-            <a:endParaRPr lang="fi-FI" sz="1000" b="1" dirty="0" smtClean="0">
+            <a:endParaRPr lang="fi-FI" sz="1000" b="1" dirty="0">
               <a:solidFill>
                 <a:prstClr val="black"/>
               </a:solidFill>
@@ -14056,15 +14931,15 @@
           <a:lstStyle/>
           <a:p>
             <a:r>
-              <a:rPr lang="fi-FI" sz="1000" i="1" dirty="0" smtClean="0"/>
+              <a:rPr lang="fi-FI" sz="1000" i="1" dirty="0"/>
               <a:t>SW </a:t>
             </a:r>
             <a:r>
-              <a:rPr lang="fi-FI" sz="1000" i="1" dirty="0" err="1" smtClean="0"/>
+              <a:rPr lang="fi-FI" sz="1000" i="1" dirty="0" err="1"/>
               <a:t>View</a:t>
             </a:r>
             <a:r>
-              <a:rPr lang="fi-FI" sz="1000" dirty="0" smtClean="0"/>
+              <a:rPr lang="fi-FI" sz="1000" dirty="0"/>
               <a:t> SV0 </a:t>
             </a:r>
           </a:p>
@@ -14149,7 +15024,7 @@
           <a:p>
             <a:pPr algn="ctr"/>
             <a:r>
-              <a:rPr lang="fi-FI" sz="1000" dirty="0" err="1" smtClean="0">
+              <a:rPr lang="fi-FI" sz="1000" dirty="0" err="1">
                 <a:solidFill>
                   <a:schemeClr val="tx1"/>
                 </a:solidFill>
@@ -14157,7 +15032,7 @@
               <a:t>Hier</a:t>
             </a:r>
             <a:r>
-              <a:rPr lang="fi-FI" sz="1000" dirty="0" smtClean="0">
+              <a:rPr lang="fi-FI" sz="1000" dirty="0">
                 <a:solidFill>
                   <a:schemeClr val="tx1"/>
                 </a:solidFill>
@@ -14165,7 +15040,7 @@
               <a:t>. </a:t>
             </a:r>
             <a:r>
-              <a:rPr lang="fi-FI" sz="1000" dirty="0" err="1" smtClean="0">
+              <a:rPr lang="fi-FI" sz="1000" dirty="0" err="1">
                 <a:solidFill>
                   <a:schemeClr val="tx1"/>
                 </a:solidFill>
@@ -14173,7 +15048,7 @@
               <a:t>ref</a:t>
             </a:r>
             <a:r>
-              <a:rPr lang="fi-FI" sz="1000" dirty="0" smtClean="0">
+              <a:rPr lang="fi-FI" sz="1000" dirty="0">
                 <a:solidFill>
                   <a:schemeClr val="tx1"/>
                 </a:solidFill>
@@ -14284,7 +15159,7 @@
             <a:lstStyle/>
             <a:p>
               <a:r>
-                <a:rPr lang="fi-FI" sz="1000" b="1" i="1" dirty="0" smtClean="0"/>
+                <a:rPr lang="fi-FI" sz="1000" b="1" i="1" dirty="0"/>
                 <a:t>SW Design</a:t>
               </a:r>
               <a:endParaRPr lang="en-US" sz="1000" b="1" i="1" dirty="0"/>
@@ -14302,13 +15177,6 @@
   <p:clrMapOvr>
     <a:masterClrMapping/>
   </p:clrMapOvr>
-  <p:timing>
-    <p:tnLst>
-      <p:par>
-        <p:cTn id="1" dur="indefinite" restart="never" nodeType="tmRoot"/>
-      </p:par>
-    </p:tnLst>
-  </p:timing>
 </p:sld>
 </file>
 
@@ -14345,7 +15213,7 @@
           <a:lstStyle/>
           <a:p>
             <a:r>
-              <a:rPr lang="fi-FI" dirty="0" err="1" smtClean="0"/>
+              <a:rPr lang="fi-FI" dirty="0" err="1"/>
               <a:t>SystemViews</a:t>
             </a:r>
             <a:endParaRPr lang="en-US" dirty="0"/>
@@ -14524,7 +15392,7 @@
               </a:spcAft>
             </a:pPr>
             <a:r>
-              <a:rPr lang="fi-FI" sz="1000" b="1" i="1" dirty="0" smtClean="0">
+              <a:rPr lang="fi-FI" sz="1000" b="1" i="1" dirty="0">
                 <a:solidFill>
                   <a:prstClr val="black"/>
                 </a:solidFill>
@@ -14534,7 +15402,7 @@
               <a:t>component</a:t>
             </a:r>
             <a:r>
-              <a:rPr lang="fi-FI" sz="1000" b="1" dirty="0" smtClean="0">
+              <a:rPr lang="fi-FI" sz="1000" b="1" dirty="0">
                 <a:solidFill>
                   <a:prstClr val="black"/>
                 </a:solidFill>
@@ -14544,7 +15412,7 @@
               <a:t> </a:t>
             </a:r>
             <a:r>
-              <a:rPr lang="fi-FI" sz="1000" b="1" dirty="0" err="1" smtClean="0">
+              <a:rPr lang="fi-FI" sz="1000" b="1" dirty="0" err="1">
                 <a:solidFill>
                   <a:prstClr val="black"/>
                 </a:solidFill>
@@ -14553,7 +15421,7 @@
               </a:rPr>
               <a:t>CoolProduct</a:t>
             </a:r>
-            <a:endParaRPr lang="fi-FI" sz="1000" b="1" dirty="0" smtClean="0">
+            <a:endParaRPr lang="fi-FI" sz="1000" b="1" dirty="0">
               <a:solidFill>
                 <a:prstClr val="black"/>
               </a:solidFill>
@@ -14586,15 +15454,15 @@
           <a:lstStyle/>
           <a:p>
             <a:r>
-              <a:rPr lang="fi-FI" sz="1000" i="1" dirty="0" smtClean="0"/>
+              <a:rPr lang="fi-FI" sz="1000" i="1" dirty="0"/>
               <a:t>System </a:t>
             </a:r>
             <a:r>
-              <a:rPr lang="fi-FI" sz="1000" i="1" dirty="0" err="1" smtClean="0"/>
+              <a:rPr lang="fi-FI" sz="1000" i="1" dirty="0" err="1"/>
               <a:t>View</a:t>
             </a:r>
             <a:r>
-              <a:rPr lang="fi-FI" sz="1000" dirty="0" smtClean="0"/>
+              <a:rPr lang="fi-FI" sz="1000" dirty="0"/>
               <a:t> SyV0 </a:t>
             </a:r>
           </a:p>
@@ -14679,7 +15547,7 @@
           <a:p>
             <a:pPr algn="ctr"/>
             <a:r>
-              <a:rPr lang="fi-FI" sz="1000" dirty="0" err="1" smtClean="0">
+              <a:rPr lang="fi-FI" sz="1000" dirty="0" err="1">
                 <a:solidFill>
                   <a:schemeClr val="tx1"/>
                 </a:solidFill>
@@ -14687,7 +15555,7 @@
               <a:t>Hier</a:t>
             </a:r>
             <a:r>
-              <a:rPr lang="fi-FI" sz="1000" dirty="0" smtClean="0">
+              <a:rPr lang="fi-FI" sz="1000" dirty="0">
                 <a:solidFill>
                   <a:schemeClr val="tx1"/>
                 </a:solidFill>
@@ -14695,7 +15563,7 @@
               <a:t>. </a:t>
             </a:r>
             <a:r>
-              <a:rPr lang="fi-FI" sz="1000" dirty="0" err="1" smtClean="0">
+              <a:rPr lang="fi-FI" sz="1000" dirty="0" err="1">
                 <a:solidFill>
                   <a:schemeClr val="tx1"/>
                 </a:solidFill>
@@ -14703,7 +15571,7 @@
               <a:t>ref</a:t>
             </a:r>
             <a:r>
-              <a:rPr lang="fi-FI" sz="1000" dirty="0" smtClean="0">
+              <a:rPr lang="fi-FI" sz="1000" dirty="0">
                 <a:solidFill>
                   <a:schemeClr val="tx1"/>
                 </a:solidFill>
@@ -14800,7 +15668,7 @@
           <a:lstStyle/>
           <a:p>
             <a:r>
-              <a:rPr lang="fi-FI" sz="1000" b="1" i="1" dirty="0" smtClean="0"/>
+              <a:rPr lang="fi-FI" sz="1000" b="1" i="1" dirty="0"/>
               <a:t>System Design</a:t>
             </a:r>
             <a:endParaRPr lang="en-US" sz="1000" b="1" i="1" dirty="0"/>
@@ -14817,13 +15685,6 @@
   <p:clrMapOvr>
     <a:masterClrMapping/>
   </p:clrMapOvr>
-  <p:timing>
-    <p:tnLst>
-      <p:par>
-        <p:cTn id="1" dur="indefinite" restart="never" nodeType="tmRoot"/>
-      </p:par>
-    </p:tnLst>
-  </p:timing>
 </p:sld>
 </file>
 
@@ -14860,15 +15721,15 @@
           <a:lstStyle/>
           <a:p>
             <a:r>
-              <a:rPr lang="fi-FI" dirty="0" err="1" smtClean="0"/>
+              <a:rPr lang="fi-FI" dirty="0" err="1"/>
               <a:t>Generic</a:t>
             </a:r>
             <a:r>
-              <a:rPr lang="fi-FI" dirty="0" smtClean="0"/>
+              <a:rPr lang="fi-FI" dirty="0"/>
               <a:t> </a:t>
             </a:r>
             <a:r>
-              <a:rPr lang="fi-FI" dirty="0" err="1" smtClean="0"/>
+              <a:rPr lang="fi-FI" dirty="0" err="1"/>
               <a:t>editor</a:t>
             </a:r>
             <a:endParaRPr lang="en-US" dirty="0"/>
@@ -14896,7 +15757,7 @@
           <a:lstStyle/>
           <a:p>
             <a:r>
-              <a:rPr lang="fi-FI" dirty="0" err="1" smtClean="0"/>
+              <a:rPr lang="fi-FI" dirty="0" err="1"/>
               <a:t>sad</a:t>
             </a:r>
             <a:endParaRPr lang="en-US" dirty="0"/>
@@ -15067,21 +15928,21 @@
               <a:buNone/>
             </a:pPr>
             <a:r>
-              <a:rPr lang="en-US" sz="900" b="1" dirty="0" smtClean="0">
+              <a:rPr lang="en-US" sz="900" b="1" dirty="0">
                 <a:latin typeface="Courier New" pitchFamily="49" charset="0"/>
                 <a:cs typeface="Courier New" pitchFamily="49" charset="0"/>
               </a:rPr>
               <a:t>library </a:t>
             </a:r>
             <a:r>
-              <a:rPr lang="en-US" sz="900" b="1" dirty="0" err="1" smtClean="0">
+              <a:rPr lang="en-US" sz="900" b="1" dirty="0" err="1">
                 <a:latin typeface="Courier New" pitchFamily="49" charset="0"/>
                 <a:cs typeface="Courier New" pitchFamily="49" charset="0"/>
               </a:rPr>
               <a:t>ieee</a:t>
             </a:r>
             <a:r>
-              <a:rPr lang="en-US" sz="900" b="1" dirty="0" smtClean="0">
+              <a:rPr lang="en-US" sz="900" b="1" dirty="0">
                 <a:latin typeface="Courier New" pitchFamily="49" charset="0"/>
                 <a:cs typeface="Courier New" pitchFamily="49" charset="0"/>
               </a:rPr>
@@ -15094,7 +15955,7 @@
               <a:buNone/>
             </a:pPr>
             <a:r>
-              <a:rPr lang="en-US" sz="900" b="1" dirty="0" smtClean="0">
+              <a:rPr lang="en-US" sz="900" b="1" dirty="0">
                 <a:latin typeface="Courier New" pitchFamily="49" charset="0"/>
                 <a:cs typeface="Courier New" pitchFamily="49" charset="0"/>
               </a:rPr>
@@ -15106,7 +15967,7 @@
               <a:buFont typeface="Arial" pitchFamily="34" charset="0"/>
               <a:buNone/>
             </a:pPr>
-            <a:endParaRPr lang="en-US" sz="900" b="1" dirty="0" smtClean="0">
+            <a:endParaRPr lang="en-US" sz="900" b="1" dirty="0">
               <a:latin typeface="Courier New" pitchFamily="49" charset="0"/>
               <a:cs typeface="Courier New" pitchFamily="49" charset="0"/>
             </a:endParaRPr>
@@ -15117,7 +15978,7 @@
               <a:buNone/>
             </a:pPr>
             <a:r>
-              <a:rPr lang="en-US" sz="900" b="1" dirty="0" smtClean="0">
+              <a:rPr lang="en-US" sz="900" b="1" dirty="0">
                 <a:latin typeface="Courier New" pitchFamily="49" charset="0"/>
                 <a:cs typeface="Courier New" pitchFamily="49" charset="0"/>
               </a:rPr>
@@ -15129,7 +15990,7 @@
               <a:buNone/>
             </a:pPr>
             <a:r>
-              <a:rPr lang="en-US" sz="900" b="1" dirty="0" smtClean="0">
+              <a:rPr lang="en-US" sz="900" b="1" dirty="0">
                 <a:latin typeface="Courier New" pitchFamily="49" charset="0"/>
                 <a:cs typeface="Courier New" pitchFamily="49" charset="0"/>
               </a:rPr>
@@ -15141,21 +16002,21 @@
               <a:buNone/>
             </a:pPr>
             <a:r>
-              <a:rPr lang="en-US" sz="900" b="1" dirty="0" smtClean="0">
+              <a:rPr lang="en-US" sz="900" b="1" dirty="0">
                 <a:latin typeface="Courier New" pitchFamily="49" charset="0"/>
                 <a:cs typeface="Courier New" pitchFamily="49" charset="0"/>
               </a:rPr>
               <a:t>    </a:t>
             </a:r>
             <a:r>
-              <a:rPr lang="en-US" sz="900" b="1" dirty="0" err="1" smtClean="0">
+              <a:rPr lang="en-US" sz="900" b="1" dirty="0" err="1">
                 <a:latin typeface="Courier New" pitchFamily="49" charset="0"/>
                 <a:cs typeface="Courier New" pitchFamily="49" charset="0"/>
               </a:rPr>
               <a:t>id_g</a:t>
             </a:r>
             <a:r>
-              <a:rPr lang="en-US" sz="900" b="1" dirty="0" smtClean="0">
+              <a:rPr lang="en-US" sz="900" b="1" dirty="0">
                 <a:latin typeface="Courier New" pitchFamily="49" charset="0"/>
                 <a:cs typeface="Courier New" pitchFamily="49" charset="0"/>
               </a:rPr>
@@ -15167,21 +16028,21 @@
               <a:buNone/>
             </a:pPr>
             <a:r>
-              <a:rPr lang="en-US" sz="900" b="1" dirty="0" smtClean="0">
+              <a:rPr lang="en-US" sz="900" b="1" dirty="0">
                 <a:latin typeface="Courier New" pitchFamily="49" charset="0"/>
                 <a:cs typeface="Courier New" pitchFamily="49" charset="0"/>
               </a:rPr>
               <a:t>    </a:t>
             </a:r>
             <a:r>
-              <a:rPr lang="en-US" sz="900" b="1" dirty="0" err="1" smtClean="0">
+              <a:rPr lang="en-US" sz="900" b="1" dirty="0" err="1">
                 <a:latin typeface="Courier New" pitchFamily="49" charset="0"/>
                 <a:cs typeface="Courier New" pitchFamily="49" charset="0"/>
               </a:rPr>
               <a:t>addr_g</a:t>
             </a:r>
             <a:r>
-              <a:rPr lang="en-US" sz="900" b="1" dirty="0" smtClean="0">
+              <a:rPr lang="en-US" sz="900" b="1" dirty="0">
                 <a:latin typeface="Courier New" pitchFamily="49" charset="0"/>
                 <a:cs typeface="Courier New" pitchFamily="49" charset="0"/>
               </a:rPr>
@@ -15193,21 +16054,21 @@
               <a:buNone/>
             </a:pPr>
             <a:r>
-              <a:rPr lang="en-US" sz="900" b="1" dirty="0" smtClean="0">
+              <a:rPr lang="en-US" sz="900" b="1" dirty="0">
                 <a:latin typeface="Courier New" pitchFamily="49" charset="0"/>
                 <a:cs typeface="Courier New" pitchFamily="49" charset="0"/>
               </a:rPr>
               <a:t>    </a:t>
             </a:r>
             <a:r>
-              <a:rPr lang="en-US" sz="900" b="1" dirty="0" err="1" smtClean="0">
+              <a:rPr lang="en-US" sz="900" b="1" dirty="0" err="1">
                 <a:latin typeface="Courier New" pitchFamily="49" charset="0"/>
                 <a:cs typeface="Courier New" pitchFamily="49" charset="0"/>
               </a:rPr>
               <a:t>cfg_file_g</a:t>
             </a:r>
             <a:r>
-              <a:rPr lang="en-US" sz="900" b="1" dirty="0" smtClean="0">
+              <a:rPr lang="en-US" sz="900" b="1" dirty="0">
                 <a:latin typeface="Courier New" pitchFamily="49" charset="0"/>
                 <a:cs typeface="Courier New" pitchFamily="49" charset="0"/>
               </a:rPr>
@@ -15219,21 +16080,21 @@
               <a:buNone/>
             </a:pPr>
             <a:r>
-              <a:rPr lang="en-US" sz="900" b="1" dirty="0" smtClean="0">
+              <a:rPr lang="en-US" sz="900" b="1" dirty="0">
                 <a:latin typeface="Courier New" pitchFamily="49" charset="0"/>
                 <a:cs typeface="Courier New" pitchFamily="49" charset="0"/>
               </a:rPr>
               <a:t>    </a:t>
             </a:r>
             <a:r>
-              <a:rPr lang="en-US" sz="900" b="1" dirty="0" err="1" smtClean="0">
+              <a:rPr lang="en-US" sz="900" b="1" dirty="0" err="1">
                 <a:latin typeface="Courier New" pitchFamily="49" charset="0"/>
                 <a:cs typeface="Courier New" pitchFamily="49" charset="0"/>
               </a:rPr>
               <a:t>pipeline_depth_g</a:t>
             </a:r>
             <a:r>
-              <a:rPr lang="en-US" sz="900" b="1" dirty="0" smtClean="0">
+              <a:rPr lang="en-US" sz="900" b="1" dirty="0">
                 <a:latin typeface="Courier New" pitchFamily="49" charset="0"/>
                 <a:cs typeface="Courier New" pitchFamily="49" charset="0"/>
               </a:rPr>
@@ -15245,13 +16106,13 @@
               <a:buNone/>
             </a:pPr>
             <a:r>
-              <a:rPr lang="fi-FI" sz="900" b="1" dirty="0" smtClean="0">
+              <a:rPr lang="fi-FI" sz="900" b="1" dirty="0">
                 <a:latin typeface="Courier New" pitchFamily="49" charset="0"/>
                 <a:cs typeface="Courier New" pitchFamily="49" charset="0"/>
               </a:rPr>
               <a:t>    . . .</a:t>
             </a:r>
-            <a:endParaRPr lang="en-US" sz="900" b="1" dirty="0" smtClean="0">
+            <a:endParaRPr lang="en-US" sz="900" b="1" dirty="0">
               <a:latin typeface="Courier New" pitchFamily="49" charset="0"/>
               <a:cs typeface="Courier New" pitchFamily="49" charset="0"/>
             </a:endParaRPr>
@@ -15261,13 +16122,13 @@
               <a:buNone/>
             </a:pPr>
             <a:r>
-              <a:rPr lang="fi-FI" sz="900" b="1" dirty="0" smtClean="0">
+              <a:rPr lang="fi-FI" sz="900" b="1" dirty="0">
                 <a:latin typeface="Courier New" pitchFamily="49" charset="0"/>
                 <a:cs typeface="Courier New" pitchFamily="49" charset="0"/>
               </a:rPr>
               <a:t>);</a:t>
             </a:r>
-            <a:endParaRPr lang="en-US" sz="900" b="1" dirty="0" smtClean="0">
+            <a:endParaRPr lang="en-US" sz="900" b="1" dirty="0">
               <a:latin typeface="Courier New" pitchFamily="49" charset="0"/>
               <a:cs typeface="Courier New" pitchFamily="49" charset="0"/>
             </a:endParaRPr>
@@ -15278,16 +16139,12 @@
               <a:buNone/>
             </a:pPr>
             <a:r>
-              <a:rPr lang="en-US" sz="900" b="1" dirty="0" smtClean="0">
+              <a:rPr lang="en-US" sz="900" b="1" dirty="0">
                 <a:latin typeface="Courier New" pitchFamily="49" charset="0"/>
                 <a:cs typeface="Courier New" pitchFamily="49" charset="0"/>
               </a:rPr>
               <a:t>port ( . . .</a:t>
             </a:r>
-            <a:endParaRPr lang="en-US" sz="900" b="1" dirty="0">
-              <a:latin typeface="Courier New" pitchFamily="49" charset="0"/>
-              <a:cs typeface="Courier New" pitchFamily="49" charset="0"/>
-            </a:endParaRPr>
           </a:p>
         </p:txBody>
       </p:sp>
@@ -15365,13 +16222,6 @@
   <p:clrMapOvr>
     <a:masterClrMapping/>
   </p:clrMapOvr>
-  <p:timing>
-    <p:tnLst>
-      <p:par>
-        <p:cTn id="1" dur="indefinite" restart="never" nodeType="tmRoot"/>
-      </p:par>
-    </p:tnLst>
-  </p:timing>
 </p:sld>
 </file>
 
@@ -15408,15 +16258,15 @@
           <a:lstStyle/>
           <a:p>
             <a:r>
-              <a:rPr lang="fi-FI" dirty="0" err="1" smtClean="0"/>
+              <a:rPr lang="fi-FI" dirty="0" err="1"/>
               <a:t>Ports</a:t>
             </a:r>
             <a:r>
-              <a:rPr lang="fi-FI" dirty="0" smtClean="0"/>
+              <a:rPr lang="fi-FI" dirty="0"/>
               <a:t> </a:t>
             </a:r>
             <a:r>
-              <a:rPr lang="fi-FI" dirty="0" err="1" smtClean="0"/>
+              <a:rPr lang="fi-FI" dirty="0" err="1"/>
               <a:t>editor</a:t>
             </a:r>
             <a:endParaRPr lang="en-US" dirty="0"/>
@@ -15449,21 +16299,21 @@
               <a:buNone/>
             </a:pPr>
             <a:r>
-              <a:rPr lang="en-US" sz="900" b="1" dirty="0" smtClean="0">
+              <a:rPr lang="en-US" sz="900" b="1" dirty="0">
                 <a:latin typeface="Courier New" pitchFamily="49" charset="0"/>
                 <a:cs typeface="Courier New" pitchFamily="49" charset="0"/>
               </a:rPr>
               <a:t>library </a:t>
             </a:r>
             <a:r>
-              <a:rPr lang="en-US" sz="900" b="1" dirty="0" err="1" smtClean="0">
+              <a:rPr lang="en-US" sz="900" b="1" dirty="0" err="1">
                 <a:latin typeface="Courier New" pitchFamily="49" charset="0"/>
                 <a:cs typeface="Courier New" pitchFamily="49" charset="0"/>
               </a:rPr>
               <a:t>ieee</a:t>
             </a:r>
             <a:r>
-              <a:rPr lang="en-US" sz="900" b="1" dirty="0" smtClean="0">
+              <a:rPr lang="en-US" sz="900" b="1" dirty="0">
                 <a:latin typeface="Courier New" pitchFamily="49" charset="0"/>
                 <a:cs typeface="Courier New" pitchFamily="49" charset="0"/>
               </a:rPr>
@@ -15475,7 +16325,7 @@
               <a:buNone/>
             </a:pPr>
             <a:r>
-              <a:rPr lang="en-US" sz="900" b="1" dirty="0" smtClean="0">
+              <a:rPr lang="en-US" sz="900" b="1" dirty="0">
                 <a:latin typeface="Courier New" pitchFamily="49" charset="0"/>
                 <a:cs typeface="Courier New" pitchFamily="49" charset="0"/>
               </a:rPr>
@@ -15486,7 +16336,7 @@
             <a:pPr marL="0" indent="0">
               <a:buNone/>
             </a:pPr>
-            <a:endParaRPr lang="en-US" sz="900" b="1" dirty="0" smtClean="0">
+            <a:endParaRPr lang="en-US" sz="900" b="1" dirty="0">
               <a:latin typeface="Courier New" pitchFamily="49" charset="0"/>
               <a:cs typeface="Courier New" pitchFamily="49" charset="0"/>
             </a:endParaRPr>
@@ -15496,7 +16346,7 @@
               <a:buNone/>
             </a:pPr>
             <a:r>
-              <a:rPr lang="en-US" sz="900" b="1" dirty="0" smtClean="0">
+              <a:rPr lang="en-US" sz="900" b="1" dirty="0">
                 <a:latin typeface="Courier New" pitchFamily="49" charset="0"/>
                 <a:cs typeface="Courier New" pitchFamily="49" charset="0"/>
               </a:rPr>
@@ -15508,7 +16358,7 @@
               <a:buNone/>
             </a:pPr>
             <a:r>
-              <a:rPr lang="en-US" sz="900" b="1" dirty="0" smtClean="0">
+              <a:rPr lang="en-US" sz="900" b="1" dirty="0">
                 <a:latin typeface="Courier New" pitchFamily="49" charset="0"/>
                 <a:cs typeface="Courier New" pitchFamily="49" charset="0"/>
               </a:rPr>
@@ -15520,35 +16370,35 @@
               <a:buNone/>
             </a:pPr>
             <a:r>
-              <a:rPr lang="en-US" sz="900" b="1" dirty="0" smtClean="0">
+              <a:rPr lang="en-US" sz="900" b="1" dirty="0">
                 <a:latin typeface="Courier New" pitchFamily="49" charset="0"/>
                 <a:cs typeface="Courier New" pitchFamily="49" charset="0"/>
               </a:rPr>
               <a:t>    </a:t>
             </a:r>
             <a:r>
-              <a:rPr lang="en-US" sz="900" b="1" dirty="0" err="1" smtClean="0">
+              <a:rPr lang="en-US" sz="900" b="1" dirty="0" err="1">
                 <a:latin typeface="Courier New" pitchFamily="49" charset="0"/>
                 <a:cs typeface="Courier New" pitchFamily="49" charset="0"/>
               </a:rPr>
               <a:t>clk</a:t>
             </a:r>
             <a:r>
-              <a:rPr lang="en-US" sz="900" b="1" dirty="0" smtClean="0">
+              <a:rPr lang="en-US" sz="900" b="1" dirty="0">
                 <a:latin typeface="Courier New" pitchFamily="49" charset="0"/>
                 <a:cs typeface="Courier New" pitchFamily="49" charset="0"/>
               </a:rPr>
               <a:t>   : in </a:t>
             </a:r>
             <a:r>
-              <a:rPr lang="en-US" sz="900" b="1" dirty="0" err="1" smtClean="0">
+              <a:rPr lang="en-US" sz="900" b="1" dirty="0" err="1">
                 <a:latin typeface="Courier New" pitchFamily="49" charset="0"/>
                 <a:cs typeface="Courier New" pitchFamily="49" charset="0"/>
               </a:rPr>
               <a:t>std_logic</a:t>
             </a:r>
             <a:r>
-              <a:rPr lang="en-US" sz="900" b="1" dirty="0" smtClean="0">
+              <a:rPr lang="en-US" sz="900" b="1" dirty="0">
                 <a:latin typeface="Courier New" pitchFamily="49" charset="0"/>
                 <a:cs typeface="Courier New" pitchFamily="49" charset="0"/>
               </a:rPr>
@@ -15560,35 +16410,35 @@
               <a:buNone/>
             </a:pPr>
             <a:r>
-              <a:rPr lang="en-US" sz="900" b="1" dirty="0" smtClean="0">
+              <a:rPr lang="en-US" sz="900" b="1" dirty="0">
                 <a:latin typeface="Courier New" pitchFamily="49" charset="0"/>
                 <a:cs typeface="Courier New" pitchFamily="49" charset="0"/>
               </a:rPr>
               <a:t>    </a:t>
             </a:r>
             <a:r>
-              <a:rPr lang="en-US" sz="900" b="1" dirty="0" err="1" smtClean="0">
+              <a:rPr lang="en-US" sz="900" b="1" dirty="0" err="1">
                 <a:latin typeface="Courier New" pitchFamily="49" charset="0"/>
                 <a:cs typeface="Courier New" pitchFamily="49" charset="0"/>
               </a:rPr>
               <a:t>rst_n</a:t>
             </a:r>
             <a:r>
-              <a:rPr lang="en-US" sz="900" b="1" dirty="0" smtClean="0">
+              <a:rPr lang="en-US" sz="900" b="1" dirty="0">
                 <a:latin typeface="Courier New" pitchFamily="49" charset="0"/>
                 <a:cs typeface="Courier New" pitchFamily="49" charset="0"/>
               </a:rPr>
               <a:t> : in </a:t>
             </a:r>
             <a:r>
-              <a:rPr lang="en-US" sz="900" b="1" dirty="0" err="1" smtClean="0">
+              <a:rPr lang="en-US" sz="900" b="1" dirty="0" err="1">
                 <a:latin typeface="Courier New" pitchFamily="49" charset="0"/>
                 <a:cs typeface="Courier New" pitchFamily="49" charset="0"/>
               </a:rPr>
               <a:t>std_logic</a:t>
             </a:r>
             <a:r>
-              <a:rPr lang="en-US" sz="900" b="1" dirty="0" smtClean="0">
+              <a:rPr lang="en-US" sz="900" b="1" dirty="0">
                 <a:latin typeface="Courier New" pitchFamily="49" charset="0"/>
                 <a:cs typeface="Courier New" pitchFamily="49" charset="0"/>
               </a:rPr>
@@ -15599,7 +16449,7 @@
             <a:pPr marL="0" indent="0">
               <a:buNone/>
             </a:pPr>
-            <a:endParaRPr lang="en-US" sz="900" b="1" dirty="0" smtClean="0">
+            <a:endParaRPr lang="en-US" sz="900" b="1" dirty="0">
               <a:latin typeface="Courier New" pitchFamily="49" charset="0"/>
               <a:cs typeface="Courier New" pitchFamily="49" charset="0"/>
             </a:endParaRPr>
@@ -15609,49 +16459,49 @@
               <a:buNone/>
             </a:pPr>
             <a:r>
-              <a:rPr lang="en-US" sz="900" b="1" dirty="0" smtClean="0">
+              <a:rPr lang="en-US" sz="900" b="1" dirty="0">
                 <a:latin typeface="Courier New" pitchFamily="49" charset="0"/>
                 <a:cs typeface="Courier New" pitchFamily="49" charset="0"/>
               </a:rPr>
               <a:t>    </a:t>
             </a:r>
             <a:r>
-              <a:rPr lang="en-US" sz="900" b="1" dirty="0" err="1" smtClean="0">
+              <a:rPr lang="en-US" sz="900" b="1" dirty="0" err="1">
                 <a:latin typeface="Courier New" pitchFamily="49" charset="0"/>
                 <a:cs typeface="Courier New" pitchFamily="49" charset="0"/>
               </a:rPr>
               <a:t>data_in</a:t>
             </a:r>
             <a:r>
-              <a:rPr lang="en-US" sz="900" b="1" dirty="0" smtClean="0">
+              <a:rPr lang="en-US" sz="900" b="1" dirty="0">
                 <a:latin typeface="Courier New" pitchFamily="49" charset="0"/>
                 <a:cs typeface="Courier New" pitchFamily="49" charset="0"/>
               </a:rPr>
               <a:t>  : in  </a:t>
             </a:r>
             <a:r>
-              <a:rPr lang="en-US" sz="900" b="1" dirty="0" err="1" smtClean="0">
+              <a:rPr lang="en-US" sz="900" b="1" dirty="0" err="1">
                 <a:latin typeface="Courier New" pitchFamily="49" charset="0"/>
                 <a:cs typeface="Courier New" pitchFamily="49" charset="0"/>
               </a:rPr>
               <a:t>std_logic_vector</a:t>
             </a:r>
             <a:r>
-              <a:rPr lang="en-US" sz="900" b="1" dirty="0" smtClean="0">
+              <a:rPr lang="en-US" sz="900" b="1" dirty="0">
                 <a:latin typeface="Courier New" pitchFamily="49" charset="0"/>
                 <a:cs typeface="Courier New" pitchFamily="49" charset="0"/>
               </a:rPr>
               <a:t> (3 </a:t>
             </a:r>
             <a:r>
-              <a:rPr lang="en-US" sz="900" b="1" dirty="0" err="1" smtClean="0">
+              <a:rPr lang="en-US" sz="900" b="1" dirty="0" err="1">
                 <a:latin typeface="Courier New" pitchFamily="49" charset="0"/>
                 <a:cs typeface="Courier New" pitchFamily="49" charset="0"/>
               </a:rPr>
               <a:t>downto</a:t>
             </a:r>
             <a:r>
-              <a:rPr lang="en-US" sz="900" b="1" dirty="0" smtClean="0">
+              <a:rPr lang="en-US" sz="900" b="1" dirty="0">
                 <a:latin typeface="Courier New" pitchFamily="49" charset="0"/>
                 <a:cs typeface="Courier New" pitchFamily="49" charset="0"/>
               </a:rPr>
@@ -15663,49 +16513,49 @@
               <a:buNone/>
             </a:pPr>
             <a:r>
-              <a:rPr lang="en-US" sz="900" b="1" dirty="0" smtClean="0">
+              <a:rPr lang="en-US" sz="900" b="1" dirty="0">
                 <a:latin typeface="Courier New" pitchFamily="49" charset="0"/>
                 <a:cs typeface="Courier New" pitchFamily="49" charset="0"/>
               </a:rPr>
               <a:t>    </a:t>
             </a:r>
             <a:r>
-              <a:rPr lang="en-US" sz="900" b="1" dirty="0" err="1" smtClean="0">
+              <a:rPr lang="en-US" sz="900" b="1" dirty="0" err="1">
                 <a:latin typeface="Courier New" pitchFamily="49" charset="0"/>
                 <a:cs typeface="Courier New" pitchFamily="49" charset="0"/>
               </a:rPr>
               <a:t>data_out</a:t>
             </a:r>
             <a:r>
-              <a:rPr lang="en-US" sz="900" b="1" dirty="0" smtClean="0">
+              <a:rPr lang="en-US" sz="900" b="1" dirty="0">
                 <a:latin typeface="Courier New" pitchFamily="49" charset="0"/>
                 <a:cs typeface="Courier New" pitchFamily="49" charset="0"/>
               </a:rPr>
               <a:t> : out </a:t>
             </a:r>
             <a:r>
-              <a:rPr lang="en-US" sz="900" b="1" dirty="0" err="1" smtClean="0">
+              <a:rPr lang="en-US" sz="900" b="1" dirty="0" err="1">
                 <a:latin typeface="Courier New" pitchFamily="49" charset="0"/>
                 <a:cs typeface="Courier New" pitchFamily="49" charset="0"/>
               </a:rPr>
               <a:t>std_logic_vector</a:t>
             </a:r>
             <a:r>
-              <a:rPr lang="en-US" sz="900" b="1" dirty="0" smtClean="0">
+              <a:rPr lang="en-US" sz="900" b="1" dirty="0">
                 <a:latin typeface="Courier New" pitchFamily="49" charset="0"/>
                 <a:cs typeface="Courier New" pitchFamily="49" charset="0"/>
               </a:rPr>
               <a:t> (7 </a:t>
             </a:r>
             <a:r>
-              <a:rPr lang="en-US" sz="900" b="1" dirty="0" err="1" smtClean="0">
+              <a:rPr lang="en-US" sz="900" b="1" dirty="0" err="1">
                 <a:latin typeface="Courier New" pitchFamily="49" charset="0"/>
                 <a:cs typeface="Courier New" pitchFamily="49" charset="0"/>
               </a:rPr>
               <a:t>downto</a:t>
             </a:r>
             <a:r>
-              <a:rPr lang="en-US" sz="900" b="1" dirty="0" smtClean="0">
+              <a:rPr lang="en-US" sz="900" b="1" dirty="0">
                 <a:latin typeface="Courier New" pitchFamily="49" charset="0"/>
                 <a:cs typeface="Courier New" pitchFamily="49" charset="0"/>
               </a:rPr>
@@ -15717,7 +16567,7 @@
               <a:buNone/>
             </a:pPr>
             <a:r>
-              <a:rPr lang="en-US" sz="900" b="1" dirty="0" smtClean="0">
+              <a:rPr lang="en-US" sz="900" b="1" dirty="0">
                 <a:latin typeface="Courier New" pitchFamily="49" charset="0"/>
                 <a:cs typeface="Courier New" pitchFamily="49" charset="0"/>
               </a:rPr>
@@ -15728,7 +16578,7 @@
             <a:pPr marL="0" indent="0">
               <a:buNone/>
             </a:pPr>
-            <a:endParaRPr lang="en-US" sz="900" b="1" dirty="0" smtClean="0">
+            <a:endParaRPr lang="en-US" sz="900" b="1" dirty="0">
               <a:latin typeface="Courier New" pitchFamily="49" charset="0"/>
               <a:cs typeface="Courier New" pitchFamily="49" charset="0"/>
             </a:endParaRPr>
@@ -15738,16 +16588,12 @@
               <a:buNone/>
             </a:pPr>
             <a:r>
-              <a:rPr lang="en-US" sz="900" b="1" dirty="0" smtClean="0">
+              <a:rPr lang="en-US" sz="900" b="1" dirty="0">
                 <a:latin typeface="Courier New" pitchFamily="49" charset="0"/>
                 <a:cs typeface="Courier New" pitchFamily="49" charset="0"/>
               </a:rPr>
               <a:t>end foo;</a:t>
             </a:r>
-            <a:endParaRPr lang="en-US" sz="900" b="1" dirty="0">
-              <a:latin typeface="Courier New" pitchFamily="49" charset="0"/>
-              <a:cs typeface="Courier New" pitchFamily="49" charset="0"/>
-            </a:endParaRPr>
           </a:p>
         </p:txBody>
       </p:sp>
@@ -15911,55 +16757,55 @@
           </a:lstStyle>
           <a:p>
             <a:r>
-              <a:rPr lang="fi-FI" dirty="0" err="1" smtClean="0"/>
+              <a:rPr lang="fi-FI" dirty="0" err="1"/>
               <a:t>Relation</a:t>
             </a:r>
             <a:r>
-              <a:rPr lang="fi-FI" dirty="0" smtClean="0"/>
+              <a:rPr lang="fi-FI" dirty="0"/>
               <a:t> </a:t>
             </a:r>
             <a:r>
-              <a:rPr lang="fi-FI" dirty="0" err="1" smtClean="0"/>
+              <a:rPr lang="fi-FI" dirty="0" err="1"/>
               <a:t>between</a:t>
             </a:r>
             <a:r>
-              <a:rPr lang="fi-FI" dirty="0" smtClean="0"/>
+              <a:rPr lang="fi-FI" dirty="0"/>
               <a:t> </a:t>
             </a:r>
             <a:r>
-              <a:rPr lang="fi-FI" dirty="0" err="1" smtClean="0"/>
+              <a:rPr lang="fi-FI" dirty="0" err="1"/>
               <a:t>code</a:t>
             </a:r>
             <a:r>
-              <a:rPr lang="fi-FI" dirty="0" smtClean="0"/>
+              <a:rPr lang="fi-FI" dirty="0"/>
               <a:t> and </a:t>
             </a:r>
             <a:r>
-              <a:rPr lang="fi-FI" dirty="0" err="1" smtClean="0"/>
+              <a:rPr lang="fi-FI" dirty="0" err="1"/>
               <a:t>Kactus</a:t>
             </a:r>
             <a:r>
-              <a:rPr lang="fi-FI" dirty="0" smtClean="0"/>
+              <a:rPr lang="fi-FI" dirty="0"/>
               <a:t> </a:t>
             </a:r>
             <a:r>
-              <a:rPr lang="fi-FI" dirty="0" err="1" smtClean="0"/>
+              <a:rPr lang="fi-FI" dirty="0" err="1"/>
               <a:t>should</a:t>
             </a:r>
             <a:r>
-              <a:rPr lang="fi-FI" dirty="0" smtClean="0"/>
+              <a:rPr lang="fi-FI" dirty="0"/>
               <a:t> </a:t>
             </a:r>
             <a:r>
-              <a:rPr lang="fi-FI" dirty="0" err="1" smtClean="0"/>
+              <a:rPr lang="fi-FI" dirty="0" err="1"/>
               <a:t>be</a:t>
             </a:r>
             <a:r>
-              <a:rPr lang="fi-FI" dirty="0" smtClean="0"/>
+              <a:rPr lang="fi-FI" dirty="0"/>
               <a:t> </a:t>
             </a:r>
             <a:r>
-              <a:rPr lang="fi-FI" dirty="0" err="1" smtClean="0"/>
+              <a:rPr lang="fi-FI" dirty="0" err="1"/>
               <a:t>obvious</a:t>
             </a:r>
             <a:endParaRPr lang="en-US" dirty="0"/>
@@ -16000,13 +16846,6 @@
   <p:clrMapOvr>
     <a:masterClrMapping/>
   </p:clrMapOvr>
-  <p:timing>
-    <p:tnLst>
-      <p:par>
-        <p:cTn id="1" dur="indefinite" restart="never" nodeType="tmRoot"/>
-      </p:par>
-    </p:tnLst>
-  </p:timing>
 </p:sld>
 </file>
 
@@ -16043,7 +16882,7 @@
           <a:lstStyle/>
           <a:p>
             <a:r>
-              <a:rPr lang="fi-FI" dirty="0" smtClean="0"/>
+              <a:rPr lang="fi-FI" dirty="0"/>
               <a:t>Memory map</a:t>
             </a:r>
             <a:endParaRPr lang="en-US" dirty="0"/>
@@ -16071,7 +16910,7 @@
           <a:lstStyle/>
           <a:p>
             <a:r>
-              <a:rPr lang="fi-FI" dirty="0" smtClean="0"/>
+              <a:rPr lang="fi-FI" dirty="0"/>
               <a:t>a</a:t>
             </a:r>
             <a:endParaRPr lang="en-US" dirty="0"/>
@@ -16226,7 +17065,7 @@
               </a:spcAft>
             </a:pPr>
             <a:r>
-              <a:rPr lang="fi-FI" sz="1200" b="1" i="1" dirty="0" smtClean="0">
+              <a:rPr lang="fi-FI" sz="1200" b="1" i="1" dirty="0">
                 <a:solidFill>
                   <a:prstClr val="black"/>
                 </a:solidFill>
@@ -16236,7 +17075,7 @@
               <a:t>component</a:t>
             </a:r>
             <a:r>
-              <a:rPr lang="fi-FI" sz="1200" b="1" dirty="0" smtClean="0">
+              <a:rPr lang="fi-FI" sz="1200" b="1" dirty="0">
                 <a:solidFill>
                   <a:prstClr val="black"/>
                 </a:solidFill>
@@ -16246,7 +17085,7 @@
               <a:t> </a:t>
             </a:r>
             <a:r>
-              <a:rPr lang="fi-FI" sz="1200" b="1" dirty="0" err="1" smtClean="0">
+              <a:rPr lang="fi-FI" sz="1200" b="1" dirty="0" err="1">
                 <a:solidFill>
                   <a:prstClr val="black"/>
                 </a:solidFill>
@@ -16255,7 +17094,7 @@
               </a:rPr>
               <a:t>AccelA</a:t>
             </a:r>
-            <a:endParaRPr lang="fi-FI" sz="1200" b="1" dirty="0" smtClean="0">
+            <a:endParaRPr lang="fi-FI" sz="1200" b="1" dirty="0">
               <a:solidFill>
                 <a:prstClr val="black"/>
               </a:solidFill>
@@ -16336,15 +17175,15 @@
           <a:lstStyle/>
           <a:p>
             <a:r>
-              <a:rPr lang="fi-FI" sz="1200" i="1" dirty="0" smtClean="0"/>
+              <a:rPr lang="fi-FI" sz="1200" i="1" dirty="0"/>
               <a:t>slave</a:t>
             </a:r>
             <a:r>
-              <a:rPr lang="fi-FI" sz="1200" dirty="0" smtClean="0"/>
+              <a:rPr lang="fi-FI" sz="1200" dirty="0"/>
               <a:t> </a:t>
             </a:r>
             <a:r>
-              <a:rPr lang="fi-FI" sz="1200" dirty="0" err="1" smtClean="0"/>
+              <a:rPr lang="fi-FI" sz="1200" dirty="0" err="1"/>
               <a:t>RegsIF</a:t>
             </a:r>
             <a:endParaRPr lang="en-US" sz="1200" dirty="0"/>
@@ -16411,11 +17250,11 @@
           <a:lstStyle/>
           <a:p>
             <a:r>
-              <a:rPr lang="fi-FI" sz="1200" i="1" dirty="0" smtClean="0"/>
+              <a:rPr lang="fi-FI" sz="1200" i="1" dirty="0"/>
               <a:t>memory map</a:t>
             </a:r>
             <a:r>
-              <a:rPr lang="fi-FI" sz="1200" dirty="0" smtClean="0"/>
+              <a:rPr lang="fi-FI" sz="1200" dirty="0"/>
               <a:t> MM0</a:t>
             </a:r>
             <a:endParaRPr lang="en-US" sz="1200" dirty="0"/>
@@ -16617,7 +17456,7 @@
           <a:lstStyle/>
           <a:p>
             <a:r>
-              <a:rPr lang="fi-FI" sz="1000" dirty="0" smtClean="0"/>
+              <a:rPr lang="fi-FI" sz="1000" dirty="0"/>
               <a:t>r0</a:t>
             </a:r>
             <a:endParaRPr lang="en-US" sz="1000" dirty="0"/>
@@ -16647,7 +17486,7 @@
           <a:lstStyle/>
           <a:p>
             <a:r>
-              <a:rPr lang="fi-FI" sz="1000" dirty="0" smtClean="0"/>
+              <a:rPr lang="fi-FI" sz="1000" dirty="0"/>
               <a:t>r1</a:t>
             </a:r>
             <a:endParaRPr lang="en-US" sz="1000" dirty="0"/>
@@ -16677,7 +17516,7 @@
           <a:lstStyle/>
           <a:p>
             <a:r>
-              <a:rPr lang="fi-FI" sz="1000" dirty="0" smtClean="0"/>
+              <a:rPr lang="fi-FI" sz="1000" dirty="0"/>
               <a:t>r2</a:t>
             </a:r>
             <a:endParaRPr lang="en-US" sz="1000" dirty="0"/>
@@ -16707,11 +17546,11 @@
           <a:lstStyle/>
           <a:p>
             <a:r>
-              <a:rPr lang="fi-FI" sz="1200" i="1" dirty="0" smtClean="0"/>
+              <a:rPr lang="fi-FI" sz="1200" i="1" dirty="0"/>
               <a:t>memory map</a:t>
             </a:r>
             <a:r>
-              <a:rPr lang="fi-FI" sz="1200" dirty="0" smtClean="0"/>
+              <a:rPr lang="fi-FI" sz="1200" dirty="0"/>
               <a:t> MM1</a:t>
             </a:r>
             <a:endParaRPr lang="en-US" sz="1200" dirty="0"/>
@@ -16827,7 +17666,7 @@
           <a:lstStyle/>
           <a:p>
             <a:r>
-              <a:rPr lang="fi-FI" sz="1000" dirty="0" err="1" smtClean="0"/>
+              <a:rPr lang="fi-FI" sz="1000" dirty="0" err="1"/>
               <a:t>mem</a:t>
             </a:r>
             <a:endParaRPr lang="en-US" sz="1000" dirty="0"/>
@@ -17255,13 +18094,6 @@
   <p:clrMapOvr>
     <a:masterClrMapping/>
   </p:clrMapOvr>
-  <p:timing>
-    <p:tnLst>
-      <p:par>
-        <p:cTn id="1" dur="indefinite" restart="never" nodeType="tmRoot"/>
-      </p:par>
-    </p:tnLst>
-  </p:timing>
 </p:sld>
 </file>
 

</xml_diff>

<commit_message>
[ADDITIVE] Add editor for a single CPU in Component editor
</commit_message>
<xml_diff>
--- a/Help/images/img_sources.pptx
+++ b/Help/images/img_sources.pptx
@@ -318,7 +318,7 @@
           <a:p>
             <a:fld id="{54379204-0DE5-4A8F-A5DB-A53F02487498}" type="datetimeFigureOut">
               <a:rPr lang="en-US" smtClean="0"/>
-              <a:t>3/9/2022</a:t>
+              <a:t>6/16/2023</a:t>
             </a:fld>
             <a:endParaRPr lang="en-US"/>
           </a:p>
@@ -486,7 +486,7 @@
           <a:p>
             <a:fld id="{54379204-0DE5-4A8F-A5DB-A53F02487498}" type="datetimeFigureOut">
               <a:rPr lang="en-US" smtClean="0"/>
-              <a:t>3/9/2022</a:t>
+              <a:t>6/16/2023</a:t>
             </a:fld>
             <a:endParaRPr lang="en-US"/>
           </a:p>
@@ -664,7 +664,7 @@
           <a:p>
             <a:fld id="{54379204-0DE5-4A8F-A5DB-A53F02487498}" type="datetimeFigureOut">
               <a:rPr lang="en-US" smtClean="0"/>
-              <a:t>3/9/2022</a:t>
+              <a:t>6/16/2023</a:t>
             </a:fld>
             <a:endParaRPr lang="en-US"/>
           </a:p>
@@ -832,7 +832,7 @@
           <a:p>
             <a:fld id="{54379204-0DE5-4A8F-A5DB-A53F02487498}" type="datetimeFigureOut">
               <a:rPr lang="en-US" smtClean="0"/>
-              <a:t>3/9/2022</a:t>
+              <a:t>6/16/2023</a:t>
             </a:fld>
             <a:endParaRPr lang="en-US"/>
           </a:p>
@@ -1077,7 +1077,7 @@
           <a:p>
             <a:fld id="{54379204-0DE5-4A8F-A5DB-A53F02487498}" type="datetimeFigureOut">
               <a:rPr lang="en-US" smtClean="0"/>
-              <a:t>3/9/2022</a:t>
+              <a:t>6/16/2023</a:t>
             </a:fld>
             <a:endParaRPr lang="en-US"/>
           </a:p>
@@ -1362,7 +1362,7 @@
           <a:p>
             <a:fld id="{54379204-0DE5-4A8F-A5DB-A53F02487498}" type="datetimeFigureOut">
               <a:rPr lang="en-US" smtClean="0"/>
-              <a:t>3/9/2022</a:t>
+              <a:t>6/16/2023</a:t>
             </a:fld>
             <a:endParaRPr lang="en-US"/>
           </a:p>
@@ -1781,7 +1781,7 @@
           <a:p>
             <a:fld id="{54379204-0DE5-4A8F-A5DB-A53F02487498}" type="datetimeFigureOut">
               <a:rPr lang="en-US" smtClean="0"/>
-              <a:t>3/9/2022</a:t>
+              <a:t>6/16/2023</a:t>
             </a:fld>
             <a:endParaRPr lang="en-US"/>
           </a:p>
@@ -1898,7 +1898,7 @@
           <a:p>
             <a:fld id="{54379204-0DE5-4A8F-A5DB-A53F02487498}" type="datetimeFigureOut">
               <a:rPr lang="en-US" smtClean="0"/>
-              <a:t>3/9/2022</a:t>
+              <a:t>6/16/2023</a:t>
             </a:fld>
             <a:endParaRPr lang="en-US"/>
           </a:p>
@@ -1993,7 +1993,7 @@
           <a:p>
             <a:fld id="{54379204-0DE5-4A8F-A5DB-A53F02487498}" type="datetimeFigureOut">
               <a:rPr lang="en-US" smtClean="0"/>
-              <a:t>3/9/2022</a:t>
+              <a:t>6/16/2023</a:t>
             </a:fld>
             <a:endParaRPr lang="en-US"/>
           </a:p>
@@ -2268,7 +2268,7 @@
           <a:p>
             <a:fld id="{54379204-0DE5-4A8F-A5DB-A53F02487498}" type="datetimeFigureOut">
               <a:rPr lang="en-US" smtClean="0"/>
-              <a:t>3/9/2022</a:t>
+              <a:t>6/16/2023</a:t>
             </a:fld>
             <a:endParaRPr lang="en-US"/>
           </a:p>
@@ -2520,7 +2520,7 @@
           <a:p>
             <a:fld id="{54379204-0DE5-4A8F-A5DB-A53F02487498}" type="datetimeFigureOut">
               <a:rPr lang="en-US" smtClean="0"/>
-              <a:t>3/9/2022</a:t>
+              <a:t>6/16/2023</a:t>
             </a:fld>
             <a:endParaRPr lang="en-US"/>
           </a:p>
@@ -2731,7 +2731,7 @@
           <a:p>
             <a:fld id="{54379204-0DE5-4A8F-A5DB-A53F02487498}" type="datetimeFigureOut">
               <a:rPr lang="en-US" smtClean="0"/>
-              <a:t>3/9/2022</a:t>
+              <a:t>6/16/2023</a:t>
             </a:fld>
             <a:endParaRPr lang="en-US"/>
           </a:p>
@@ -3597,11 +3597,7 @@
           <a:p>
             <a:r>
               <a:rPr lang="fi-FI" dirty="0"/>
-              <a:t>Address </a:t>
-            </a:r>
-            <a:r>
-              <a:rPr lang="fi-FI" dirty="0" err="1"/>
-              <a:t>space</a:t>
+              <a:t>Address space</a:t>
             </a:r>
             <a:endParaRPr lang="en-US" dirty="0"/>
           </a:p>
@@ -3954,12 +3950,12 @@
           <a:lstStyle/>
           <a:p>
             <a:r>
+              <a:rPr lang="fi-FI" sz="1200" i="1" dirty="0" err="1"/>
+              <a:t>addr</a:t>
+            </a:r>
+            <a:r>
               <a:rPr lang="fi-FI" sz="1200" i="1" dirty="0"/>
-              <a:t>addr </a:t>
-            </a:r>
-            <a:r>
-              <a:rPr lang="fi-FI" sz="1200" i="1" dirty="0" err="1"/>
-              <a:t>space</a:t>
+              <a:t> space</a:t>
             </a:r>
             <a:r>
               <a:rPr lang="fi-FI" sz="1200" dirty="0"/>
@@ -5684,11 +5680,7 @@
             </a:r>
             <a:r>
               <a:rPr lang="fi-FI" dirty="0"/>
-              <a:t> </a:t>
-            </a:r>
-            <a:r>
-              <a:rPr lang="fi-FI" dirty="0" err="1"/>
-              <a:t>map</a:t>
+              <a:t> map</a:t>
             </a:r>
             <a:endParaRPr lang="en-US" dirty="0"/>
           </a:p>
@@ -6144,15 +6136,7 @@
             </a:r>
             <a:r>
               <a:rPr lang="fi-FI" sz="1200" i="1" dirty="0"/>
-              <a:t> </a:t>
-            </a:r>
-            <a:r>
-              <a:rPr lang="fi-FI" sz="1200" i="1" dirty="0" err="1"/>
-              <a:t>space</a:t>
-            </a:r>
-            <a:r>
-              <a:rPr lang="fi-FI" sz="1200" i="1" dirty="0"/>
-              <a:t> </a:t>
+              <a:t> space </a:t>
             </a:r>
           </a:p>
           <a:p>
@@ -6708,8 +6692,8 @@
         </p:nvSpPr>
         <p:spPr>
           <a:xfrm>
-            <a:off x="1655676" y="1988840"/>
-            <a:ext cx="2428843" cy="1332148"/>
+            <a:off x="1655676" y="1988839"/>
+            <a:ext cx="2428843" cy="1588393"/>
           </a:xfrm>
           <a:prstGeom prst="rect">
             <a:avLst/>
@@ -6865,25 +6849,8 @@
                 <a:latin typeface="Calibri" pitchFamily="34" charset="0"/>
                 <a:cs typeface="Calibri" pitchFamily="34" charset="0"/>
               </a:rPr>
-              <a:t> </a:t>
-            </a:r>
-            <a:r>
-              <a:rPr lang="fi-FI" sz="1200" b="1" dirty="0" err="1">
-                <a:solidFill>
-                  <a:prstClr val="black"/>
-                </a:solidFill>
-                <a:latin typeface="Calibri" pitchFamily="34" charset="0"/>
-                <a:cs typeface="Calibri" pitchFamily="34" charset="0"/>
-              </a:rPr>
-              <a:t>DualCoreSoC</a:t>
-            </a:r>
-            <a:endParaRPr lang="fi-FI" sz="1200" b="1" dirty="0">
-              <a:solidFill>
-                <a:prstClr val="black"/>
-              </a:solidFill>
-              <a:latin typeface="Calibri" pitchFamily="34" charset="0"/>
-              <a:cs typeface="Calibri" pitchFamily="34" charset="0"/>
-            </a:endParaRPr>
+              <a:t> DualCoreSoC</a:t>
+            </a:r>
           </a:p>
         </p:txBody>
       </p:sp>
@@ -6939,6 +6906,7 @@
         <p:nvCxnSpPr>
           <p:cNvPr id="13" name="Straight Connector 12"/>
           <p:cNvCxnSpPr>
+            <a:cxnSpLocks/>
             <a:stCxn id="5" idx="2"/>
           </p:cNvCxnSpPr>
           <p:nvPr/>
@@ -6946,7 +6914,7 @@
         <p:spPr>
           <a:xfrm>
             <a:off x="4247946" y="2510607"/>
-            <a:ext cx="324076" cy="0"/>
+            <a:ext cx="180038" cy="0"/>
           </a:xfrm>
           <a:prstGeom prst="line">
             <a:avLst/>
@@ -6980,8 +6948,8 @@
         </p:nvSpPr>
         <p:spPr>
           <a:xfrm>
-            <a:off x="3491880" y="2391202"/>
-            <a:ext cx="360040" cy="215804"/>
+            <a:off x="3452716" y="2391202"/>
+            <a:ext cx="405554" cy="215804"/>
           </a:xfrm>
           <a:prstGeom prst="leftRightArrow">
             <a:avLst/>
@@ -7030,7 +6998,7 @@
             <a:avLst/>
           </a:prstGeom>
           <a:solidFill>
-            <a:schemeClr val="bg1"/>
+            <a:srgbClr val="C6EFD7"/>
           </a:solidFill>
         </p:spPr>
         <p:style>
@@ -7060,23 +7028,7 @@
                   <a:schemeClr val="tx1"/>
                 </a:solidFill>
               </a:rPr>
-              <a:t>Addr </a:t>
-            </a:r>
-            <a:r>
-              <a:rPr lang="fi-FI" sz="1100" i="1" dirty="0" err="1">
-                <a:solidFill>
-                  <a:schemeClr val="tx1"/>
-                </a:solidFill>
-              </a:rPr>
-              <a:t>space</a:t>
-            </a:r>
-            <a:r>
-              <a:rPr lang="fi-FI" sz="1100" i="1" dirty="0">
-                <a:solidFill>
-                  <a:schemeClr val="tx1"/>
-                </a:solidFill>
-              </a:rPr>
-              <a:t> AS0</a:t>
+              <a:t>Addr space AS0</a:t>
             </a:r>
             <a:endParaRPr lang="en-US" sz="1100" i="1" dirty="0">
               <a:solidFill>
@@ -7537,7 +7489,7 @@
           <a:p>
             <a:pPr algn="ctr"/>
             <a:r>
-              <a:rPr lang="fi-FI" sz="1100" i="1" dirty="0" err="1">
+              <a:rPr lang="fi-FI" sz="1100" i="1" dirty="0">
                 <a:solidFill>
                   <a:schemeClr val="tx1"/>
                 </a:solidFill>
@@ -7560,14 +7512,14 @@
         </p:nvSpPr>
         <p:spPr>
           <a:xfrm>
-            <a:off x="2643990" y="2816932"/>
-            <a:ext cx="1351946" cy="349188"/>
+            <a:off x="2618212" y="2816932"/>
+            <a:ext cx="801580" cy="349188"/>
           </a:xfrm>
           <a:prstGeom prst="flowChartProcess">
             <a:avLst/>
           </a:prstGeom>
           <a:solidFill>
-            <a:schemeClr val="bg1"/>
+            <a:srgbClr val="C6EFD7"/>
           </a:solidFill>
         </p:spPr>
         <p:style>
@@ -7597,55 +7549,7 @@
                   <a:schemeClr val="tx1"/>
                 </a:solidFill>
               </a:rPr>
-              <a:t>Addr </a:t>
-            </a:r>
-            <a:r>
-              <a:rPr lang="fi-FI" sz="1100" i="1" dirty="0" err="1">
-                <a:solidFill>
-                  <a:schemeClr val="tx1"/>
-                </a:solidFill>
-              </a:rPr>
-              <a:t>space</a:t>
-            </a:r>
-            <a:r>
-              <a:rPr lang="fi-FI" sz="1100" i="1" dirty="0">
-                <a:solidFill>
-                  <a:schemeClr val="tx1"/>
-                </a:solidFill>
-              </a:rPr>
-              <a:t> w/ </a:t>
-            </a:r>
-            <a:r>
-              <a:rPr lang="fi-FI" sz="1100" i="1" dirty="0" err="1">
-                <a:solidFill>
-                  <a:schemeClr val="tx1"/>
-                </a:solidFill>
-              </a:rPr>
-              <a:t>local</a:t>
-            </a:r>
-            <a:r>
-              <a:rPr lang="fi-FI" sz="1100" i="1" dirty="0">
-                <a:solidFill>
-                  <a:schemeClr val="tx1"/>
-                </a:solidFill>
-              </a:rPr>
-              <a:t> </a:t>
-            </a:r>
-            <a:r>
-              <a:rPr lang="fi-FI" sz="1100" i="1" dirty="0" err="1">
-                <a:solidFill>
-                  <a:schemeClr val="tx1"/>
-                </a:solidFill>
-              </a:rPr>
-              <a:t>mem</a:t>
-            </a:r>
-            <a:r>
-              <a:rPr lang="fi-FI" sz="1100" i="1" dirty="0">
-                <a:solidFill>
-                  <a:schemeClr val="tx1"/>
-                </a:solidFill>
-              </a:rPr>
-              <a:t> map AS1</a:t>
+              <a:t>Addr space AS1</a:t>
             </a:r>
             <a:endParaRPr lang="en-US" sz="1100" i="1" dirty="0">
               <a:solidFill>
@@ -7734,7 +7638,7 @@
           <a:p>
             <a:pPr algn="ctr"/>
             <a:r>
-              <a:rPr lang="fi-FI" sz="1100" i="1" dirty="0" err="1">
+              <a:rPr lang="fi-FI" sz="1100" i="1" dirty="0">
                 <a:solidFill>
                   <a:schemeClr val="tx1"/>
                 </a:solidFill>
@@ -7753,6 +7657,7 @@
         <p:nvCxnSpPr>
           <p:cNvPr id="55" name="Curved Connector 54"/>
           <p:cNvCxnSpPr>
+            <a:cxnSpLocks/>
             <a:stCxn id="53" idx="3"/>
             <a:endCxn id="49" idx="1"/>
           </p:cNvCxnSpPr>
@@ -7761,7 +7666,7 @@
         <p:spPr>
           <a:xfrm flipV="1">
             <a:off x="2447684" y="2991526"/>
-            <a:ext cx="196306" cy="43413"/>
+            <a:ext cx="170528" cy="43413"/>
           </a:xfrm>
           <a:prstGeom prst="curvedConnector3">
             <a:avLst>
@@ -7796,7 +7701,7 @@
         </p:nvSpPr>
         <p:spPr>
           <a:xfrm>
-            <a:off x="4572022" y="2312876"/>
+            <a:off x="4355976" y="2312876"/>
             <a:ext cx="343364" cy="369332"/>
           </a:xfrm>
           <a:prstGeom prst="rect">
@@ -7815,6 +7720,821 @@
               <a:t>…</a:t>
             </a:r>
             <a:endParaRPr lang="en-US" dirty="0"/>
+          </a:p>
+        </p:txBody>
+      </p:sp>
+      <p:sp>
+        <p:nvSpPr>
+          <p:cNvPr id="6" name="Flowchart: Process 5">
+            <a:extLst>
+              <a:ext uri="{FF2B5EF4-FFF2-40B4-BE49-F238E27FC236}">
+                <a16:creationId xmlns:a16="http://schemas.microsoft.com/office/drawing/2014/main" id="{3C3C8B70-EF13-EC2B-5348-0D147DFE8D47}"/>
+              </a:ext>
+            </a:extLst>
+          </p:cNvPr>
+          <p:cNvSpPr/>
+          <p:nvPr/>
+        </p:nvSpPr>
+        <p:spPr>
+          <a:xfrm>
+            <a:off x="2769070" y="3140968"/>
+            <a:ext cx="801580" cy="349188"/>
+          </a:xfrm>
+          <a:prstGeom prst="flowChartProcess">
+            <a:avLst/>
+          </a:prstGeom>
+          <a:solidFill>
+            <a:srgbClr val="A5C3EF"/>
+          </a:solidFill>
+        </p:spPr>
+        <p:style>
+          <a:lnRef idx="2">
+            <a:schemeClr val="accent1">
+              <a:shade val="50000"/>
+            </a:schemeClr>
+          </a:lnRef>
+          <a:fillRef idx="1">
+            <a:schemeClr val="accent1"/>
+          </a:fillRef>
+          <a:effectRef idx="0">
+            <a:schemeClr val="accent1"/>
+          </a:effectRef>
+          <a:fontRef idx="minor">
+            <a:schemeClr val="lt1"/>
+          </a:fontRef>
+        </p:style>
+        <p:txBody>
+          <a:bodyPr rtlCol="0" anchor="ctr"/>
+          <a:lstStyle/>
+          <a:p>
+            <a:pPr algn="ctr"/>
+            <a:r>
+              <a:rPr lang="fi-FI" sz="1100" i="1" dirty="0">
+                <a:solidFill>
+                  <a:schemeClr val="tx1"/>
+                </a:solidFill>
+              </a:rPr>
+              <a:t>Local mem map</a:t>
+            </a:r>
+            <a:endParaRPr lang="en-US" sz="1100" i="1" dirty="0">
+              <a:solidFill>
+                <a:schemeClr val="tx1"/>
+              </a:solidFill>
+            </a:endParaRPr>
+          </a:p>
+        </p:txBody>
+      </p:sp>
+      <p:sp>
+        <p:nvSpPr>
+          <p:cNvPr id="9" name="Rectangle 8">
+            <a:extLst>
+              <a:ext uri="{FF2B5EF4-FFF2-40B4-BE49-F238E27FC236}">
+                <a16:creationId xmlns:a16="http://schemas.microsoft.com/office/drawing/2014/main" id="{44D837D7-623D-42AE-3009-E5BD427B0406}"/>
+              </a:ext>
+            </a:extLst>
+          </p:cNvPr>
+          <p:cNvSpPr/>
+          <p:nvPr/>
+        </p:nvSpPr>
+        <p:spPr>
+          <a:xfrm>
+            <a:off x="5249328" y="1988143"/>
+            <a:ext cx="2428843" cy="1588393"/>
+          </a:xfrm>
+          <a:prstGeom prst="rect">
+            <a:avLst/>
+          </a:prstGeom>
+          <a:solidFill>
+            <a:srgbClr val="C3D0F0"/>
+          </a:solidFill>
+          <a:ln w="12700">
+            <a:solidFill>
+              <a:schemeClr val="tx1"/>
+            </a:solidFill>
+            <a:tailEnd type="none"/>
+          </a:ln>
+          <a:effectLst/>
+        </p:spPr>
+        <p:style>
+          <a:lnRef idx="1">
+            <a:schemeClr val="accent4"/>
+          </a:lnRef>
+          <a:fillRef idx="2">
+            <a:schemeClr val="accent4"/>
+          </a:fillRef>
+          <a:effectRef idx="1">
+            <a:schemeClr val="accent4"/>
+          </a:effectRef>
+          <a:fontRef idx="minor">
+            <a:schemeClr val="dk1"/>
+          </a:fontRef>
+        </p:style>
+        <p:txBody>
+          <a:bodyPr tIns="0" bIns="0" anchor="t" anchorCtr="0">
+            <a:noAutofit/>
+          </a:bodyPr>
+          <a:lstStyle>
+            <a:defPPr>
+              <a:defRPr lang="en-US"/>
+            </a:defPPr>
+            <a:lvl1pPr marL="0" algn="l" defTabSz="914400" rtl="0" eaLnBrk="1" latinLnBrk="0" hangingPunct="1">
+              <a:defRPr sz="1800" kern="1200">
+                <a:solidFill>
+                  <a:schemeClr val="dk1"/>
+                </a:solidFill>
+                <a:latin typeface="+mn-lt"/>
+                <a:ea typeface="+mn-ea"/>
+                <a:cs typeface="+mn-cs"/>
+              </a:defRPr>
+            </a:lvl1pPr>
+            <a:lvl2pPr marL="457200" algn="l" defTabSz="914400" rtl="0" eaLnBrk="1" latinLnBrk="0" hangingPunct="1">
+              <a:defRPr sz="1800" kern="1200">
+                <a:solidFill>
+                  <a:schemeClr val="dk1"/>
+                </a:solidFill>
+                <a:latin typeface="+mn-lt"/>
+                <a:ea typeface="+mn-ea"/>
+                <a:cs typeface="+mn-cs"/>
+              </a:defRPr>
+            </a:lvl2pPr>
+            <a:lvl3pPr marL="914400" algn="l" defTabSz="914400" rtl="0" eaLnBrk="1" latinLnBrk="0" hangingPunct="1">
+              <a:defRPr sz="1800" kern="1200">
+                <a:solidFill>
+                  <a:schemeClr val="dk1"/>
+                </a:solidFill>
+                <a:latin typeface="+mn-lt"/>
+                <a:ea typeface="+mn-ea"/>
+                <a:cs typeface="+mn-cs"/>
+              </a:defRPr>
+            </a:lvl3pPr>
+            <a:lvl4pPr marL="1371600" algn="l" defTabSz="914400" rtl="0" eaLnBrk="1" latinLnBrk="0" hangingPunct="1">
+              <a:defRPr sz="1800" kern="1200">
+                <a:solidFill>
+                  <a:schemeClr val="dk1"/>
+                </a:solidFill>
+                <a:latin typeface="+mn-lt"/>
+                <a:ea typeface="+mn-ea"/>
+                <a:cs typeface="+mn-cs"/>
+              </a:defRPr>
+            </a:lvl4pPr>
+            <a:lvl5pPr marL="1828800" algn="l" defTabSz="914400" rtl="0" eaLnBrk="1" latinLnBrk="0" hangingPunct="1">
+              <a:defRPr sz="1800" kern="1200">
+                <a:solidFill>
+                  <a:schemeClr val="dk1"/>
+                </a:solidFill>
+                <a:latin typeface="+mn-lt"/>
+                <a:ea typeface="+mn-ea"/>
+                <a:cs typeface="+mn-cs"/>
+              </a:defRPr>
+            </a:lvl5pPr>
+            <a:lvl6pPr marL="2286000" algn="l" defTabSz="914400" rtl="0" eaLnBrk="1" latinLnBrk="0" hangingPunct="1">
+              <a:defRPr sz="1800" kern="1200">
+                <a:solidFill>
+                  <a:schemeClr val="dk1"/>
+                </a:solidFill>
+                <a:latin typeface="+mn-lt"/>
+                <a:ea typeface="+mn-ea"/>
+                <a:cs typeface="+mn-cs"/>
+              </a:defRPr>
+            </a:lvl6pPr>
+            <a:lvl7pPr marL="2743200" algn="l" defTabSz="914400" rtl="0" eaLnBrk="1" latinLnBrk="0" hangingPunct="1">
+              <a:defRPr sz="1800" kern="1200">
+                <a:solidFill>
+                  <a:schemeClr val="dk1"/>
+                </a:solidFill>
+                <a:latin typeface="+mn-lt"/>
+                <a:ea typeface="+mn-ea"/>
+                <a:cs typeface="+mn-cs"/>
+              </a:defRPr>
+            </a:lvl7pPr>
+            <a:lvl8pPr marL="3200400" algn="l" defTabSz="914400" rtl="0" eaLnBrk="1" latinLnBrk="0" hangingPunct="1">
+              <a:defRPr sz="1800" kern="1200">
+                <a:solidFill>
+                  <a:schemeClr val="dk1"/>
+                </a:solidFill>
+                <a:latin typeface="+mn-lt"/>
+                <a:ea typeface="+mn-ea"/>
+                <a:cs typeface="+mn-cs"/>
+              </a:defRPr>
+            </a:lvl8pPr>
+            <a:lvl9pPr marL="3657600" algn="l" defTabSz="914400" rtl="0" eaLnBrk="1" latinLnBrk="0" hangingPunct="1">
+              <a:defRPr sz="1800" kern="1200">
+                <a:solidFill>
+                  <a:schemeClr val="dk1"/>
+                </a:solidFill>
+                <a:latin typeface="+mn-lt"/>
+                <a:ea typeface="+mn-ea"/>
+                <a:cs typeface="+mn-cs"/>
+              </a:defRPr>
+            </a:lvl9pPr>
+          </a:lstStyle>
+          <a:p>
+            <a:pPr algn="ctr" fontAlgn="base">
+              <a:spcBef>
+                <a:spcPct val="0"/>
+              </a:spcBef>
+              <a:spcAft>
+                <a:spcPct val="0"/>
+              </a:spcAft>
+            </a:pPr>
+            <a:r>
+              <a:rPr lang="fi-FI" sz="1200" b="1" i="1" dirty="0">
+                <a:solidFill>
+                  <a:prstClr val="black"/>
+                </a:solidFill>
+                <a:latin typeface="Calibri" pitchFamily="34" charset="0"/>
+                <a:cs typeface="Calibri" pitchFamily="34" charset="0"/>
+              </a:rPr>
+              <a:t>component</a:t>
+            </a:r>
+            <a:r>
+              <a:rPr lang="fi-FI" sz="1200" b="1" dirty="0">
+                <a:solidFill>
+                  <a:prstClr val="black"/>
+                </a:solidFill>
+                <a:latin typeface="Calibri" pitchFamily="34" charset="0"/>
+                <a:cs typeface="Calibri" pitchFamily="34" charset="0"/>
+              </a:rPr>
+              <a:t> DualCoreSoC</a:t>
+            </a:r>
+          </a:p>
+        </p:txBody>
+      </p:sp>
+      <p:sp>
+        <p:nvSpPr>
+          <p:cNvPr id="10" name="Flowchart: Off-page Connector 9">
+            <a:extLst>
+              <a:ext uri="{FF2B5EF4-FFF2-40B4-BE49-F238E27FC236}">
+                <a16:creationId xmlns:a16="http://schemas.microsoft.com/office/drawing/2014/main" id="{7970F78E-7F04-F376-51D9-3C30EFE11EDA}"/>
+              </a:ext>
+            </a:extLst>
+          </p:cNvPr>
+          <p:cNvSpPr/>
+          <p:nvPr/>
+        </p:nvSpPr>
+        <p:spPr>
+          <a:xfrm rot="16200000" flipH="1">
+            <a:off x="7481578" y="2600928"/>
+            <a:ext cx="360040" cy="360000"/>
+          </a:xfrm>
+          <a:prstGeom prst="flowChartOffpageConnector">
+            <a:avLst/>
+          </a:prstGeom>
+          <a:solidFill>
+            <a:srgbClr val="00B050"/>
+          </a:solidFill>
+          <a:ln>
+            <a:solidFill>
+              <a:schemeClr val="tx1"/>
+            </a:solidFill>
+          </a:ln>
+        </p:spPr>
+        <p:style>
+          <a:lnRef idx="2">
+            <a:schemeClr val="accent1">
+              <a:shade val="50000"/>
+            </a:schemeClr>
+          </a:lnRef>
+          <a:fillRef idx="1">
+            <a:schemeClr val="accent1"/>
+          </a:fillRef>
+          <a:effectRef idx="0">
+            <a:schemeClr val="accent1"/>
+          </a:effectRef>
+          <a:fontRef idx="minor">
+            <a:schemeClr val="lt1"/>
+          </a:fontRef>
+        </p:style>
+        <p:txBody>
+          <a:bodyPr rtlCol="0" anchor="ctr"/>
+          <a:lstStyle/>
+          <a:p>
+            <a:pPr algn="ctr"/>
+            <a:endParaRPr lang="en-US" sz="1200"/>
+          </a:p>
+        </p:txBody>
+      </p:sp>
+      <p:cxnSp>
+        <p:nvCxnSpPr>
+          <p:cNvPr id="11" name="Straight Connector 10">
+            <a:extLst>
+              <a:ext uri="{FF2B5EF4-FFF2-40B4-BE49-F238E27FC236}">
+                <a16:creationId xmlns:a16="http://schemas.microsoft.com/office/drawing/2014/main" id="{AFD7093F-87C6-A203-C550-59F983FB2559}"/>
+              </a:ext>
+            </a:extLst>
+          </p:cNvPr>
+          <p:cNvCxnSpPr>
+            <a:stCxn id="10" idx="2"/>
+          </p:cNvCxnSpPr>
+          <p:nvPr/>
+        </p:nvCxnSpPr>
+        <p:spPr>
+          <a:xfrm>
+            <a:off x="7841598" y="2780928"/>
+            <a:ext cx="180000" cy="0"/>
+          </a:xfrm>
+          <a:prstGeom prst="line">
+            <a:avLst/>
+          </a:prstGeom>
+          <a:ln w="28575">
+            <a:solidFill>
+              <a:schemeClr val="tx1"/>
+            </a:solidFill>
+          </a:ln>
+        </p:spPr>
+        <p:style>
+          <a:lnRef idx="1">
+            <a:schemeClr val="accent1"/>
+          </a:lnRef>
+          <a:fillRef idx="0">
+            <a:schemeClr val="accent1"/>
+          </a:fillRef>
+          <a:effectRef idx="0">
+            <a:schemeClr val="accent1"/>
+          </a:effectRef>
+          <a:fontRef idx="minor">
+            <a:schemeClr val="tx1"/>
+          </a:fontRef>
+        </p:style>
+      </p:cxnSp>
+      <p:sp>
+        <p:nvSpPr>
+          <p:cNvPr id="17" name="Flowchart: Process 16">
+            <a:extLst>
+              <a:ext uri="{FF2B5EF4-FFF2-40B4-BE49-F238E27FC236}">
+                <a16:creationId xmlns:a16="http://schemas.microsoft.com/office/drawing/2014/main" id="{61DFC007-A018-249F-A7F8-FDA7E1DD6CB1}"/>
+              </a:ext>
+            </a:extLst>
+          </p:cNvPr>
+          <p:cNvSpPr/>
+          <p:nvPr/>
+        </p:nvSpPr>
+        <p:spPr>
+          <a:xfrm>
+            <a:off x="5322904" y="2276176"/>
+            <a:ext cx="720000" cy="262363"/>
+          </a:xfrm>
+          <a:prstGeom prst="flowChartProcess">
+            <a:avLst/>
+          </a:prstGeom>
+          <a:solidFill>
+            <a:schemeClr val="bg1"/>
+          </a:solidFill>
+        </p:spPr>
+        <p:style>
+          <a:lnRef idx="2">
+            <a:schemeClr val="accent1">
+              <a:shade val="50000"/>
+            </a:schemeClr>
+          </a:lnRef>
+          <a:fillRef idx="1">
+            <a:schemeClr val="accent1"/>
+          </a:fillRef>
+          <a:effectRef idx="0">
+            <a:schemeClr val="accent1"/>
+          </a:effectRef>
+          <a:fontRef idx="minor">
+            <a:schemeClr val="lt1"/>
+          </a:fontRef>
+        </p:style>
+        <p:txBody>
+          <a:bodyPr rtlCol="0" anchor="ctr"/>
+          <a:lstStyle/>
+          <a:p>
+            <a:pPr algn="ctr"/>
+            <a:r>
+              <a:rPr lang="fi-FI" sz="1100" i="1" dirty="0">
+                <a:solidFill>
+                  <a:schemeClr val="tx1"/>
+                </a:solidFill>
+              </a:rPr>
+              <a:t>cpuA</a:t>
+            </a:r>
+            <a:endParaRPr lang="en-US" sz="1100" i="1" dirty="0">
+              <a:solidFill>
+                <a:schemeClr val="tx1"/>
+              </a:solidFill>
+            </a:endParaRPr>
+          </a:p>
+        </p:txBody>
+      </p:sp>
+      <p:sp>
+        <p:nvSpPr>
+          <p:cNvPr id="18" name="Flowchart: Process 17">
+            <a:extLst>
+              <a:ext uri="{FF2B5EF4-FFF2-40B4-BE49-F238E27FC236}">
+                <a16:creationId xmlns:a16="http://schemas.microsoft.com/office/drawing/2014/main" id="{C83A6F94-8D14-2C8F-37D2-29A506095B46}"/>
+              </a:ext>
+            </a:extLst>
+          </p:cNvPr>
+          <p:cNvSpPr/>
+          <p:nvPr/>
+        </p:nvSpPr>
+        <p:spPr>
+          <a:xfrm>
+            <a:off x="6213432" y="3077282"/>
+            <a:ext cx="801580" cy="349188"/>
+          </a:xfrm>
+          <a:prstGeom prst="flowChartProcess">
+            <a:avLst/>
+          </a:prstGeom>
+          <a:solidFill>
+            <a:srgbClr val="A5C3EF"/>
+          </a:solidFill>
+        </p:spPr>
+        <p:style>
+          <a:lnRef idx="2">
+            <a:schemeClr val="accent1">
+              <a:shade val="50000"/>
+            </a:schemeClr>
+          </a:lnRef>
+          <a:fillRef idx="1">
+            <a:schemeClr val="accent1"/>
+          </a:fillRef>
+          <a:effectRef idx="0">
+            <a:schemeClr val="accent1"/>
+          </a:effectRef>
+          <a:fontRef idx="minor">
+            <a:schemeClr val="lt1"/>
+          </a:fontRef>
+        </p:style>
+        <p:txBody>
+          <a:bodyPr rtlCol="0" anchor="ctr"/>
+          <a:lstStyle/>
+          <a:p>
+            <a:pPr algn="ctr"/>
+            <a:r>
+              <a:rPr lang="fi-FI" sz="1100" i="1" dirty="0">
+                <a:solidFill>
+                  <a:schemeClr val="tx1"/>
+                </a:solidFill>
+              </a:rPr>
+              <a:t>Mem map MM1</a:t>
+            </a:r>
+            <a:endParaRPr lang="en-US" sz="1100" i="1" dirty="0">
+              <a:solidFill>
+                <a:schemeClr val="tx1"/>
+              </a:solidFill>
+            </a:endParaRPr>
+          </a:p>
+        </p:txBody>
+      </p:sp>
+      <p:cxnSp>
+        <p:nvCxnSpPr>
+          <p:cNvPr id="19" name="Curved Connector 51">
+            <a:extLst>
+              <a:ext uri="{FF2B5EF4-FFF2-40B4-BE49-F238E27FC236}">
+                <a16:creationId xmlns:a16="http://schemas.microsoft.com/office/drawing/2014/main" id="{384E14CA-4FF5-C5F4-FEB8-E0F2D59B928A}"/>
+              </a:ext>
+            </a:extLst>
+          </p:cNvPr>
+          <p:cNvCxnSpPr>
+            <a:cxnSpLocks/>
+            <a:stCxn id="17" idx="3"/>
+          </p:cNvCxnSpPr>
+          <p:nvPr/>
+        </p:nvCxnSpPr>
+        <p:spPr>
+          <a:xfrm>
+            <a:off x="6042904" y="2407358"/>
+            <a:ext cx="168960" cy="53030"/>
+          </a:xfrm>
+          <a:prstGeom prst="curvedConnector3">
+            <a:avLst>
+              <a:gd name="adj1" fmla="val 50000"/>
+            </a:avLst>
+          </a:prstGeom>
+          <a:ln w="19050">
+            <a:headEnd type="none" w="med" len="med"/>
+            <a:tailEnd type="triangle" w="med" len="med"/>
+          </a:ln>
+        </p:spPr>
+        <p:style>
+          <a:lnRef idx="1">
+            <a:schemeClr val="accent1"/>
+          </a:lnRef>
+          <a:fillRef idx="0">
+            <a:schemeClr val="accent1"/>
+          </a:fillRef>
+          <a:effectRef idx="0">
+            <a:schemeClr val="accent1"/>
+          </a:effectRef>
+          <a:fontRef idx="minor">
+            <a:schemeClr val="tx1"/>
+          </a:fontRef>
+        </p:style>
+      </p:cxnSp>
+      <p:sp>
+        <p:nvSpPr>
+          <p:cNvPr id="20" name="Flowchart: Process 19">
+            <a:extLst>
+              <a:ext uri="{FF2B5EF4-FFF2-40B4-BE49-F238E27FC236}">
+                <a16:creationId xmlns:a16="http://schemas.microsoft.com/office/drawing/2014/main" id="{EE97DD5C-128A-4698-57B2-48B8658CF54E}"/>
+              </a:ext>
+            </a:extLst>
+          </p:cNvPr>
+          <p:cNvSpPr/>
+          <p:nvPr/>
+        </p:nvSpPr>
+        <p:spPr>
+          <a:xfrm>
+            <a:off x="5322904" y="3164107"/>
+            <a:ext cx="720000" cy="262363"/>
+          </a:xfrm>
+          <a:prstGeom prst="flowChartProcess">
+            <a:avLst/>
+          </a:prstGeom>
+          <a:solidFill>
+            <a:schemeClr val="bg1"/>
+          </a:solidFill>
+        </p:spPr>
+        <p:style>
+          <a:lnRef idx="2">
+            <a:schemeClr val="accent1">
+              <a:shade val="50000"/>
+            </a:schemeClr>
+          </a:lnRef>
+          <a:fillRef idx="1">
+            <a:schemeClr val="accent1"/>
+          </a:fillRef>
+          <a:effectRef idx="0">
+            <a:schemeClr val="accent1"/>
+          </a:effectRef>
+          <a:fontRef idx="minor">
+            <a:schemeClr val="lt1"/>
+          </a:fontRef>
+        </p:style>
+        <p:txBody>
+          <a:bodyPr rtlCol="0" anchor="ctr"/>
+          <a:lstStyle/>
+          <a:p>
+            <a:pPr algn="ctr"/>
+            <a:r>
+              <a:rPr lang="fi-FI" sz="1100" i="1" dirty="0">
+                <a:solidFill>
+                  <a:schemeClr val="tx1"/>
+                </a:solidFill>
+              </a:rPr>
+              <a:t>cpuB</a:t>
+            </a:r>
+            <a:endParaRPr lang="en-US" sz="1100" i="1" dirty="0">
+              <a:solidFill>
+                <a:schemeClr val="tx1"/>
+              </a:solidFill>
+            </a:endParaRPr>
+          </a:p>
+        </p:txBody>
+      </p:sp>
+      <p:cxnSp>
+        <p:nvCxnSpPr>
+          <p:cNvPr id="21" name="Curved Connector 54">
+            <a:extLst>
+              <a:ext uri="{FF2B5EF4-FFF2-40B4-BE49-F238E27FC236}">
+                <a16:creationId xmlns:a16="http://schemas.microsoft.com/office/drawing/2014/main" id="{04B18DD8-ABF3-D22B-24D3-91568871650A}"/>
+              </a:ext>
+            </a:extLst>
+          </p:cNvPr>
+          <p:cNvCxnSpPr>
+            <a:cxnSpLocks/>
+            <a:stCxn id="20" idx="3"/>
+            <a:endCxn id="18" idx="1"/>
+          </p:cNvCxnSpPr>
+          <p:nvPr/>
+        </p:nvCxnSpPr>
+        <p:spPr>
+          <a:xfrm flipV="1">
+            <a:off x="6042904" y="3251876"/>
+            <a:ext cx="170528" cy="43413"/>
+          </a:xfrm>
+          <a:prstGeom prst="curvedConnector3">
+            <a:avLst>
+              <a:gd name="adj1" fmla="val 50000"/>
+            </a:avLst>
+          </a:prstGeom>
+          <a:ln w="19050">
+            <a:headEnd type="none" w="med" len="med"/>
+            <a:tailEnd type="triangle" w="med" len="med"/>
+          </a:ln>
+        </p:spPr>
+        <p:style>
+          <a:lnRef idx="1">
+            <a:schemeClr val="accent1"/>
+          </a:lnRef>
+          <a:fillRef idx="0">
+            <a:schemeClr val="accent1"/>
+          </a:fillRef>
+          <a:effectRef idx="0">
+            <a:schemeClr val="accent1"/>
+          </a:effectRef>
+          <a:fontRef idx="minor">
+            <a:schemeClr val="tx1"/>
+          </a:fontRef>
+        </p:style>
+      </p:cxnSp>
+      <p:sp>
+        <p:nvSpPr>
+          <p:cNvPr id="22" name="TextBox 21">
+            <a:extLst>
+              <a:ext uri="{FF2B5EF4-FFF2-40B4-BE49-F238E27FC236}">
+                <a16:creationId xmlns:a16="http://schemas.microsoft.com/office/drawing/2014/main" id="{36E89258-8884-0539-3D27-489213178523}"/>
+              </a:ext>
+            </a:extLst>
+          </p:cNvPr>
+          <p:cNvSpPr txBox="1"/>
+          <p:nvPr/>
+        </p:nvSpPr>
+        <p:spPr>
+          <a:xfrm>
+            <a:off x="7956376" y="2583197"/>
+            <a:ext cx="343364" cy="369332"/>
+          </a:xfrm>
+          <a:prstGeom prst="rect">
+            <a:avLst/>
+          </a:prstGeom>
+          <a:noFill/>
+        </p:spPr>
+        <p:txBody>
+          <a:bodyPr wrap="none" rtlCol="0">
+            <a:spAutoFit/>
+          </a:bodyPr>
+          <a:lstStyle/>
+          <a:p>
+            <a:r>
+              <a:rPr lang="fi-FI" dirty="0"/>
+              <a:t>…</a:t>
+            </a:r>
+            <a:endParaRPr lang="en-US" dirty="0"/>
+          </a:p>
+        </p:txBody>
+      </p:sp>
+      <p:sp>
+        <p:nvSpPr>
+          <p:cNvPr id="23" name="Flowchart: Process 22">
+            <a:extLst>
+              <a:ext uri="{FF2B5EF4-FFF2-40B4-BE49-F238E27FC236}">
+                <a16:creationId xmlns:a16="http://schemas.microsoft.com/office/drawing/2014/main" id="{BC469D81-9C4F-24AC-2F56-572D10652937}"/>
+              </a:ext>
+            </a:extLst>
+          </p:cNvPr>
+          <p:cNvSpPr/>
+          <p:nvPr/>
+        </p:nvSpPr>
+        <p:spPr>
+          <a:xfrm>
+            <a:off x="6211864" y="2279394"/>
+            <a:ext cx="801580" cy="349188"/>
+          </a:xfrm>
+          <a:prstGeom prst="flowChartProcess">
+            <a:avLst/>
+          </a:prstGeom>
+          <a:solidFill>
+            <a:srgbClr val="A5C3EF"/>
+          </a:solidFill>
+        </p:spPr>
+        <p:style>
+          <a:lnRef idx="2">
+            <a:schemeClr val="accent1">
+              <a:shade val="50000"/>
+            </a:schemeClr>
+          </a:lnRef>
+          <a:fillRef idx="1">
+            <a:schemeClr val="accent1"/>
+          </a:fillRef>
+          <a:effectRef idx="0">
+            <a:schemeClr val="accent1"/>
+          </a:effectRef>
+          <a:fontRef idx="minor">
+            <a:schemeClr val="lt1"/>
+          </a:fontRef>
+        </p:style>
+        <p:txBody>
+          <a:bodyPr rtlCol="0" anchor="ctr"/>
+          <a:lstStyle/>
+          <a:p>
+            <a:pPr algn="ctr"/>
+            <a:r>
+              <a:rPr lang="fi-FI" sz="1100" i="1" dirty="0">
+                <a:solidFill>
+                  <a:schemeClr val="tx1"/>
+                </a:solidFill>
+              </a:rPr>
+              <a:t>Mem map MM0</a:t>
+            </a:r>
+            <a:endParaRPr lang="en-US" sz="1100" i="1" dirty="0">
+              <a:solidFill>
+                <a:schemeClr val="tx1"/>
+              </a:solidFill>
+            </a:endParaRPr>
+          </a:p>
+        </p:txBody>
+      </p:sp>
+      <p:sp>
+        <p:nvSpPr>
+          <p:cNvPr id="25" name="Flowchart: Process 24">
+            <a:extLst>
+              <a:ext uri="{FF2B5EF4-FFF2-40B4-BE49-F238E27FC236}">
+                <a16:creationId xmlns:a16="http://schemas.microsoft.com/office/drawing/2014/main" id="{5AB2352F-D62E-C829-0605-2423F64A0E64}"/>
+              </a:ext>
+            </a:extLst>
+          </p:cNvPr>
+          <p:cNvSpPr/>
+          <p:nvPr/>
+        </p:nvSpPr>
+        <p:spPr>
+          <a:xfrm>
+            <a:off x="6362708" y="2600908"/>
+            <a:ext cx="801580" cy="349188"/>
+          </a:xfrm>
+          <a:prstGeom prst="flowChartProcess">
+            <a:avLst/>
+          </a:prstGeom>
+          <a:solidFill>
+            <a:srgbClr val="A54AAA"/>
+          </a:solidFill>
+        </p:spPr>
+        <p:style>
+          <a:lnRef idx="2">
+            <a:schemeClr val="accent1">
+              <a:shade val="50000"/>
+            </a:schemeClr>
+          </a:lnRef>
+          <a:fillRef idx="1">
+            <a:schemeClr val="accent1"/>
+          </a:fillRef>
+          <a:effectRef idx="0">
+            <a:schemeClr val="accent1"/>
+          </a:effectRef>
+          <a:fontRef idx="minor">
+            <a:schemeClr val="lt1"/>
+          </a:fontRef>
+        </p:style>
+        <p:txBody>
+          <a:bodyPr rtlCol="0" anchor="ctr"/>
+          <a:lstStyle/>
+          <a:p>
+            <a:pPr algn="ctr"/>
+            <a:r>
+              <a:rPr lang="fi-FI" sz="1100" i="1" dirty="0">
+                <a:solidFill>
+                  <a:schemeClr val="tx1"/>
+                </a:solidFill>
+              </a:rPr>
+              <a:t>Sub space map SSM0</a:t>
+            </a:r>
+            <a:endParaRPr lang="en-US" sz="1100" i="1" dirty="0">
+              <a:solidFill>
+                <a:schemeClr val="tx1"/>
+              </a:solidFill>
+            </a:endParaRPr>
+          </a:p>
+        </p:txBody>
+      </p:sp>
+      <p:sp>
+        <p:nvSpPr>
+          <p:cNvPr id="29" name="Arrow: Right 28">
+            <a:extLst>
+              <a:ext uri="{FF2B5EF4-FFF2-40B4-BE49-F238E27FC236}">
+                <a16:creationId xmlns:a16="http://schemas.microsoft.com/office/drawing/2014/main" id="{3FA10C2A-E151-C8E4-6AE1-7D84F6ECC853}"/>
+              </a:ext>
+            </a:extLst>
+          </p:cNvPr>
+          <p:cNvSpPr/>
+          <p:nvPr/>
+        </p:nvSpPr>
+        <p:spPr>
+          <a:xfrm>
+            <a:off x="7196692" y="2649765"/>
+            <a:ext cx="261978" cy="236196"/>
+          </a:xfrm>
+          <a:prstGeom prst="rightArrow">
+            <a:avLst/>
+          </a:prstGeom>
+          <a:solidFill>
+            <a:schemeClr val="bg1"/>
+          </a:solidFill>
+        </p:spPr>
+        <p:style>
+          <a:lnRef idx="2">
+            <a:schemeClr val="accent1">
+              <a:shade val="50000"/>
+            </a:schemeClr>
+          </a:lnRef>
+          <a:fillRef idx="1">
+            <a:schemeClr val="accent1"/>
+          </a:fillRef>
+          <a:effectRef idx="0">
+            <a:schemeClr val="accent1"/>
+          </a:effectRef>
+          <a:fontRef idx="minor">
+            <a:schemeClr val="lt1"/>
+          </a:fontRef>
+        </p:style>
+        <p:txBody>
+          <a:bodyPr rtlCol="0" anchor="ctr"/>
+          <a:lstStyle/>
+          <a:p>
+            <a:pPr algn="ctr"/>
+            <a:endParaRPr lang="fi-FI" sz="1200"/>
           </a:p>
         </p:txBody>
       </p:sp>
@@ -17666,7 +18386,7 @@
           <a:lstStyle/>
           <a:p>
             <a:r>
-              <a:rPr lang="fi-FI" sz="1000" dirty="0" err="1"/>
+              <a:rPr lang="fi-FI" sz="1000" dirty="0"/>
               <a:t>mem</a:t>
             </a:r>
             <a:endParaRPr lang="en-US" sz="1000" dirty="0"/>

</xml_diff>

<commit_message>
[ADDITIVE] Add CPUs and CPU regions in parameter reference counting
</commit_message>
<xml_diff>
--- a/Help/images/img_sources.pptx
+++ b/Help/images/img_sources.pptx
@@ -318,7 +318,7 @@
           <a:p>
             <a:fld id="{54379204-0DE5-4A8F-A5DB-A53F02487498}" type="datetimeFigureOut">
               <a:rPr lang="en-US" smtClean="0"/>
-              <a:t>6/16/2023</a:t>
+              <a:t>6/21/2023</a:t>
             </a:fld>
             <a:endParaRPr lang="en-US"/>
           </a:p>
@@ -486,7 +486,7 @@
           <a:p>
             <a:fld id="{54379204-0DE5-4A8F-A5DB-A53F02487498}" type="datetimeFigureOut">
               <a:rPr lang="en-US" smtClean="0"/>
-              <a:t>6/16/2023</a:t>
+              <a:t>6/21/2023</a:t>
             </a:fld>
             <a:endParaRPr lang="en-US"/>
           </a:p>
@@ -664,7 +664,7 @@
           <a:p>
             <a:fld id="{54379204-0DE5-4A8F-A5DB-A53F02487498}" type="datetimeFigureOut">
               <a:rPr lang="en-US" smtClean="0"/>
-              <a:t>6/16/2023</a:t>
+              <a:t>6/21/2023</a:t>
             </a:fld>
             <a:endParaRPr lang="en-US"/>
           </a:p>
@@ -832,7 +832,7 @@
           <a:p>
             <a:fld id="{54379204-0DE5-4A8F-A5DB-A53F02487498}" type="datetimeFigureOut">
               <a:rPr lang="en-US" smtClean="0"/>
-              <a:t>6/16/2023</a:t>
+              <a:t>6/21/2023</a:t>
             </a:fld>
             <a:endParaRPr lang="en-US"/>
           </a:p>
@@ -1077,7 +1077,7 @@
           <a:p>
             <a:fld id="{54379204-0DE5-4A8F-A5DB-A53F02487498}" type="datetimeFigureOut">
               <a:rPr lang="en-US" smtClean="0"/>
-              <a:t>6/16/2023</a:t>
+              <a:t>6/21/2023</a:t>
             </a:fld>
             <a:endParaRPr lang="en-US"/>
           </a:p>
@@ -1362,7 +1362,7 @@
           <a:p>
             <a:fld id="{54379204-0DE5-4A8F-A5DB-A53F02487498}" type="datetimeFigureOut">
               <a:rPr lang="en-US" smtClean="0"/>
-              <a:t>6/16/2023</a:t>
+              <a:t>6/21/2023</a:t>
             </a:fld>
             <a:endParaRPr lang="en-US"/>
           </a:p>
@@ -1781,7 +1781,7 @@
           <a:p>
             <a:fld id="{54379204-0DE5-4A8F-A5DB-A53F02487498}" type="datetimeFigureOut">
               <a:rPr lang="en-US" smtClean="0"/>
-              <a:t>6/16/2023</a:t>
+              <a:t>6/21/2023</a:t>
             </a:fld>
             <a:endParaRPr lang="en-US"/>
           </a:p>
@@ -1898,7 +1898,7 @@
           <a:p>
             <a:fld id="{54379204-0DE5-4A8F-A5DB-A53F02487498}" type="datetimeFigureOut">
               <a:rPr lang="en-US" smtClean="0"/>
-              <a:t>6/16/2023</a:t>
+              <a:t>6/21/2023</a:t>
             </a:fld>
             <a:endParaRPr lang="en-US"/>
           </a:p>
@@ -1993,7 +1993,7 @@
           <a:p>
             <a:fld id="{54379204-0DE5-4A8F-A5DB-A53F02487498}" type="datetimeFigureOut">
               <a:rPr lang="en-US" smtClean="0"/>
-              <a:t>6/16/2023</a:t>
+              <a:t>6/21/2023</a:t>
             </a:fld>
             <a:endParaRPr lang="en-US"/>
           </a:p>
@@ -2268,7 +2268,7 @@
           <a:p>
             <a:fld id="{54379204-0DE5-4A8F-A5DB-A53F02487498}" type="datetimeFigureOut">
               <a:rPr lang="en-US" smtClean="0"/>
-              <a:t>6/16/2023</a:t>
+              <a:t>6/21/2023</a:t>
             </a:fld>
             <a:endParaRPr lang="en-US"/>
           </a:p>
@@ -2520,7 +2520,7 @@
           <a:p>
             <a:fld id="{54379204-0DE5-4A8F-A5DB-A53F02487498}" type="datetimeFigureOut">
               <a:rPr lang="en-US" smtClean="0"/>
-              <a:t>6/16/2023</a:t>
+              <a:t>6/21/2023</a:t>
             </a:fld>
             <a:endParaRPr lang="en-US"/>
           </a:p>
@@ -2731,7 +2731,7 @@
           <a:p>
             <a:fld id="{54379204-0DE5-4A8F-A5DB-A53F02487498}" type="datetimeFigureOut">
               <a:rPr lang="en-US" smtClean="0"/>
-              <a:t>6/16/2023</a:t>
+              <a:t>6/21/2023</a:t>
             </a:fld>
             <a:endParaRPr lang="en-US"/>
           </a:p>
@@ -5675,12 +5675,8 @@
           <a:lstStyle/>
           <a:p>
             <a:r>
-              <a:rPr lang="fi-FI" dirty="0" err="1"/>
-              <a:t>Subspace</a:t>
-            </a:r>
-            <a:r>
               <a:rPr lang="fi-FI" dirty="0"/>
-              <a:t> map</a:t>
+              <a:t>Subspace map</a:t>
             </a:r>
             <a:endParaRPr lang="en-US" dirty="0"/>
           </a:p>
@@ -6131,12 +6127,8 @@
           <a:lstStyle/>
           <a:p>
             <a:r>
-              <a:rPr lang="fi-FI" sz="1200" i="1" dirty="0" err="1"/>
-              <a:t>Address</a:t>
-            </a:r>
-            <a:r>
               <a:rPr lang="fi-FI" sz="1200" i="1" dirty="0"/>
-              <a:t> space </a:t>
+              <a:t>Address space </a:t>
             </a:r>
           </a:p>
           <a:p>
@@ -7028,7 +7020,7 @@
                   <a:schemeClr val="tx1"/>
                 </a:solidFill>
               </a:rPr>
-              <a:t>Addr space AS0</a:t>
+              <a:t>Address space AS0</a:t>
             </a:r>
             <a:endParaRPr lang="en-US" sz="1100" i="1" dirty="0">
               <a:solidFill>
@@ -7549,7 +7541,7 @@
                   <a:schemeClr val="tx1"/>
                 </a:solidFill>
               </a:rPr>
-              <a:t>Addr space AS1</a:t>
+              <a:t>Address space AS1</a:t>
             </a:r>
             <a:endParaRPr lang="en-US" sz="1100" i="1" dirty="0">
               <a:solidFill>
@@ -7737,7 +7729,7 @@
         </p:nvSpPr>
         <p:spPr>
           <a:xfrm>
-            <a:off x="2769070" y="3140968"/>
+            <a:off x="2769070" y="3158724"/>
             <a:ext cx="801580" cy="349188"/>
           </a:xfrm>
           <a:prstGeom prst="flowChartProcess">
@@ -7974,7 +7966,7 @@
         </p:nvSpPr>
         <p:spPr>
           <a:xfrm rot="16200000" flipH="1">
-            <a:off x="7481578" y="2600928"/>
+            <a:off x="7481578" y="2619176"/>
             <a:ext cx="360040" cy="360000"/>
           </a:xfrm>
           <a:prstGeom prst="flowChartOffpageConnector">
@@ -8030,7 +8022,7 @@
         </p:nvCxnSpPr>
         <p:spPr>
           <a:xfrm>
-            <a:off x="7841598" y="2780928"/>
+            <a:off x="7841598" y="2799176"/>
             <a:ext cx="180000" cy="0"/>
           </a:xfrm>
           <a:prstGeom prst="line">
@@ -8169,7 +8161,7 @@
                   <a:schemeClr val="tx1"/>
                 </a:solidFill>
               </a:rPr>
-              <a:t>Mem map MM1</a:t>
+              <a:t>Memory map MM1</a:t>
             </a:r>
             <a:endParaRPr lang="en-US" sz="1100" i="1" dirty="0">
               <a:solidFill>
@@ -8345,7 +8337,7 @@
         </p:nvSpPr>
         <p:spPr>
           <a:xfrm>
-            <a:off x="7956376" y="2583197"/>
+            <a:off x="7956376" y="2601445"/>
             <a:ext cx="343364" cy="369332"/>
           </a:xfrm>
           <a:prstGeom prst="rect">
@@ -8418,7 +8410,7 @@
                   <a:schemeClr val="tx1"/>
                 </a:solidFill>
               </a:rPr>
-              <a:t>Mem map MM0</a:t>
+              <a:t>Memory map MM0</a:t>
             </a:r>
             <a:endParaRPr lang="en-US" sz="1100" i="1" dirty="0">
               <a:solidFill>
@@ -8442,7 +8434,7 @@
         </p:nvSpPr>
         <p:spPr>
           <a:xfrm>
-            <a:off x="6362708" y="2600908"/>
+            <a:off x="6362708" y="2619156"/>
             <a:ext cx="801580" cy="349188"/>
           </a:xfrm>
           <a:prstGeom prst="flowChartProcess">
@@ -8479,7 +8471,7 @@
                   <a:schemeClr val="tx1"/>
                 </a:solidFill>
               </a:rPr>
-              <a:t>Sub space map SSM0</a:t>
+              <a:t>Subspace map SSM0</a:t>
             </a:r>
             <a:endParaRPr lang="en-US" sz="1100" i="1" dirty="0">
               <a:solidFill>
@@ -8503,7 +8495,7 @@
         </p:nvSpPr>
         <p:spPr>
           <a:xfrm>
-            <a:off x="7196692" y="2649765"/>
+            <a:off x="7196692" y="2668013"/>
             <a:ext cx="261978" cy="236196"/>
           </a:xfrm>
           <a:prstGeom prst="rightArrow">
@@ -10945,7 +10937,11 @@
             </a:r>
             <a:r>
               <a:rPr lang="fi-FI" sz="1200" dirty="0"/>
-              <a:t>  address</a:t>
+              <a:t>  </a:t>
+            </a:r>
+            <a:r>
+              <a:rPr lang="fi-FI" sz="1200" dirty="0" err="1"/>
+              <a:t>address</a:t>
             </a:r>
             <a:endParaRPr lang="en-US" sz="1200" dirty="0"/>
           </a:p>
@@ -11904,7 +11900,11 @@
             </a:r>
             <a:r>
               <a:rPr lang="fi-FI" sz="1000" dirty="0"/>
-              <a:t>  address</a:t>
+              <a:t>  </a:t>
+            </a:r>
+            <a:r>
+              <a:rPr lang="fi-FI" sz="1000" dirty="0" err="1"/>
+              <a:t>address</a:t>
             </a:r>
             <a:endParaRPr lang="en-US" sz="1000" dirty="0"/>
           </a:p>

</xml_diff>